<commit_message>
Updated Phase Four Presentation
Updated Patrick's "Lessons Learned" Slide.
</commit_message>
<xml_diff>
--- a/docs/phase_four_docs/Phase_Four_Presentation.pptx
+++ b/docs/phase_four_docs/Phase_Four_Presentation.pptx
@@ -5,14 +5,17 @@
     <p:sldMasterId id="2147483648" r:id="rId1"/>
     <p:sldMasterId id="2147483660" r:id="rId2"/>
   </p:sldMasterIdLst>
+  <p:notesMasterIdLst>
+    <p:notesMasterId r:id="rId13"/>
+  </p:notesMasterIdLst>
   <p:sldIdLst>
     <p:sldId id="256" r:id="rId3"/>
     <p:sldId id="257" r:id="rId4"/>
     <p:sldId id="258" r:id="rId5"/>
     <p:sldId id="261" r:id="rId6"/>
     <p:sldId id="260" r:id="rId7"/>
-    <p:sldId id="262" r:id="rId8"/>
-    <p:sldId id="266" r:id="rId9"/>
+    <p:sldId id="266" r:id="rId8"/>
+    <p:sldId id="268" r:id="rId9"/>
     <p:sldId id="267" r:id="rId10"/>
     <p:sldId id="264" r:id="rId11"/>
     <p:sldId id="263" r:id="rId12"/>
@@ -2127,6 +2130,935 @@
 </file>
 
 <file path=ppt/diagrams/colors3.xml><?xml version="1.0" encoding="utf-8"?>
+<dgm:colorsDef xmlns:dgm="http://schemas.openxmlformats.org/drawingml/2006/diagram" xmlns:a="http://schemas.openxmlformats.org/drawingml/2006/main" uniqueId="urn:microsoft.com/office/officeart/2018/5/colors/Iconchunking_coloredtext_colorful1">
+  <dgm:title val=""/>
+  <dgm:desc val=""/>
+  <dgm:catLst>
+    <dgm:cat type="colorful" pri="10100"/>
+  </dgm:catLst>
+  <dgm:styleLbl name="node0">
+    <dgm:fillClrLst meth="repeat">
+      <a:schemeClr val="accent1"/>
+    </dgm:fillClrLst>
+    <dgm:linClrLst meth="repeat">
+      <a:schemeClr val="lt1"/>
+    </dgm:linClrLst>
+    <dgm:effectClrLst/>
+    <dgm:txLinClrLst/>
+    <dgm:txFillClrLst/>
+    <dgm:txEffectClrLst/>
+  </dgm:styleLbl>
+  <dgm:styleLbl name="node1">
+    <dgm:fillClrLst meth="repeat">
+      <a:schemeClr val="bg1"/>
+    </dgm:fillClrLst>
+    <dgm:linClrLst meth="repeat">
+      <a:schemeClr val="lt1">
+        <a:alpha val="0"/>
+      </a:schemeClr>
+    </dgm:linClrLst>
+    <dgm:effectClrLst/>
+    <dgm:txLinClrLst/>
+    <dgm:txFillClrLst meth="repeat">
+      <a:schemeClr val="dk1"/>
+    </dgm:txFillClrLst>
+    <dgm:txEffectClrLst/>
+  </dgm:styleLbl>
+  <dgm:styleLbl name="alignNode1">
+    <dgm:fillClrLst meth="repeat">
+      <a:schemeClr val="accent2"/>
+      <a:schemeClr val="accent3"/>
+      <a:schemeClr val="accent4"/>
+      <a:schemeClr val="accent5"/>
+      <a:schemeClr val="accent6"/>
+    </dgm:fillClrLst>
+    <dgm:linClrLst meth="repeat">
+      <a:schemeClr val="accent2"/>
+      <a:schemeClr val="accent3"/>
+      <a:schemeClr val="accent4"/>
+      <a:schemeClr val="accent5"/>
+      <a:schemeClr val="accent6"/>
+    </dgm:linClrLst>
+    <dgm:effectClrLst/>
+    <dgm:txLinClrLst/>
+    <dgm:txFillClrLst/>
+    <dgm:txEffectClrLst/>
+  </dgm:styleLbl>
+  <dgm:styleLbl name="lnNode1">
+    <dgm:fillClrLst meth="repeat">
+      <a:schemeClr val="accent2"/>
+      <a:schemeClr val="accent3"/>
+      <a:schemeClr val="accent4"/>
+      <a:schemeClr val="accent5"/>
+      <a:schemeClr val="accent6"/>
+    </dgm:fillClrLst>
+    <dgm:linClrLst meth="repeat">
+      <a:schemeClr val="lt1"/>
+    </dgm:linClrLst>
+    <dgm:effectClrLst/>
+    <dgm:txLinClrLst/>
+    <dgm:txFillClrLst/>
+    <dgm:txEffectClrLst/>
+  </dgm:styleLbl>
+  <dgm:styleLbl name="vennNode1">
+    <dgm:fillClrLst meth="repeat">
+      <a:schemeClr val="accent2">
+        <a:alpha val="50000"/>
+      </a:schemeClr>
+      <a:schemeClr val="accent3">
+        <a:alpha val="50000"/>
+      </a:schemeClr>
+      <a:schemeClr val="accent4">
+        <a:alpha val="50000"/>
+      </a:schemeClr>
+      <a:schemeClr val="accent5">
+        <a:alpha val="50000"/>
+      </a:schemeClr>
+      <a:schemeClr val="accent6">
+        <a:alpha val="50000"/>
+      </a:schemeClr>
+    </dgm:fillClrLst>
+    <dgm:linClrLst meth="repeat">
+      <a:schemeClr val="lt1"/>
+    </dgm:linClrLst>
+    <dgm:effectClrLst/>
+    <dgm:txLinClrLst/>
+    <dgm:txFillClrLst/>
+    <dgm:txEffectClrLst/>
+  </dgm:styleLbl>
+  <dgm:styleLbl name="node2">
+    <dgm:fillClrLst>
+      <a:schemeClr val="accent2"/>
+    </dgm:fillClrLst>
+    <dgm:linClrLst meth="repeat">
+      <a:schemeClr val="lt1"/>
+    </dgm:linClrLst>
+    <dgm:effectClrLst/>
+    <dgm:txLinClrLst/>
+    <dgm:txFillClrLst/>
+    <dgm:txEffectClrLst/>
+  </dgm:styleLbl>
+  <dgm:styleLbl name="node3">
+    <dgm:fillClrLst>
+      <a:schemeClr val="accent3"/>
+    </dgm:fillClrLst>
+    <dgm:linClrLst meth="repeat">
+      <a:schemeClr val="lt1"/>
+    </dgm:linClrLst>
+    <dgm:effectClrLst/>
+    <dgm:txLinClrLst/>
+    <dgm:txFillClrLst/>
+    <dgm:txEffectClrLst/>
+  </dgm:styleLbl>
+  <dgm:styleLbl name="node4">
+    <dgm:fillClrLst>
+      <a:schemeClr val="accent4"/>
+    </dgm:fillClrLst>
+    <dgm:linClrLst meth="repeat">
+      <a:schemeClr val="lt1"/>
+    </dgm:linClrLst>
+    <dgm:effectClrLst/>
+    <dgm:txLinClrLst/>
+    <dgm:txFillClrLst/>
+    <dgm:txEffectClrLst/>
+  </dgm:styleLbl>
+  <dgm:styleLbl name="fgImgPlace1">
+    <dgm:fillClrLst meth="repeat">
+      <a:schemeClr val="accent2">
+        <a:tint val="50000"/>
+      </a:schemeClr>
+      <a:schemeClr val="accent3">
+        <a:tint val="50000"/>
+      </a:schemeClr>
+      <a:schemeClr val="accent4">
+        <a:tint val="50000"/>
+      </a:schemeClr>
+      <a:schemeClr val="accent5">
+        <a:tint val="50000"/>
+      </a:schemeClr>
+      <a:schemeClr val="accent6">
+        <a:tint val="50000"/>
+      </a:schemeClr>
+    </dgm:fillClrLst>
+    <dgm:linClrLst meth="repeat">
+      <a:schemeClr val="lt1"/>
+    </dgm:linClrLst>
+    <dgm:effectClrLst/>
+    <dgm:txLinClrLst/>
+    <dgm:txFillClrLst meth="repeat">
+      <a:schemeClr val="lt1"/>
+    </dgm:txFillClrLst>
+    <dgm:txEffectClrLst/>
+  </dgm:styleLbl>
+  <dgm:styleLbl name="alignImgPlace1">
+    <dgm:fillClrLst>
+      <a:schemeClr val="accent1">
+        <a:tint val="50000"/>
+      </a:schemeClr>
+      <a:schemeClr val="accent2">
+        <a:tint val="20000"/>
+      </a:schemeClr>
+    </dgm:fillClrLst>
+    <dgm:linClrLst meth="repeat">
+      <a:schemeClr val="lt1"/>
+    </dgm:linClrLst>
+    <dgm:effectClrLst/>
+    <dgm:txLinClrLst/>
+    <dgm:txFillClrLst meth="repeat">
+      <a:schemeClr val="lt1"/>
+    </dgm:txFillClrLst>
+    <dgm:txEffectClrLst/>
+  </dgm:styleLbl>
+  <dgm:styleLbl name="bgImgPlace1">
+    <dgm:fillClrLst>
+      <a:schemeClr val="accent1">
+        <a:tint val="50000"/>
+      </a:schemeClr>
+      <a:schemeClr val="accent2">
+        <a:tint val="20000"/>
+      </a:schemeClr>
+    </dgm:fillClrLst>
+    <dgm:linClrLst meth="repeat">
+      <a:schemeClr val="lt1"/>
+    </dgm:linClrLst>
+    <dgm:effectClrLst/>
+    <dgm:txLinClrLst/>
+    <dgm:txFillClrLst meth="repeat">
+      <a:schemeClr val="lt1"/>
+    </dgm:txFillClrLst>
+    <dgm:txEffectClrLst/>
+  </dgm:styleLbl>
+  <dgm:styleLbl name="sibTrans2D1">
+    <dgm:fillClrLst meth="repeat">
+      <a:schemeClr val="accent2"/>
+      <a:schemeClr val="accent3"/>
+      <a:schemeClr val="accent4"/>
+      <a:schemeClr val="accent5"/>
+      <a:schemeClr val="accent6"/>
+    </dgm:fillClrLst>
+    <dgm:linClrLst meth="cycle">
+      <a:schemeClr val="lt1"/>
+    </dgm:linClrLst>
+    <dgm:effectClrLst/>
+    <dgm:txLinClrLst/>
+    <dgm:txFillClrLst/>
+    <dgm:txEffectClrLst/>
+  </dgm:styleLbl>
+  <dgm:styleLbl name="fgSibTrans2D1">
+    <dgm:fillClrLst meth="repeat">
+      <a:schemeClr val="accent2"/>
+      <a:schemeClr val="accent3"/>
+      <a:schemeClr val="accent4"/>
+      <a:schemeClr val="accent5"/>
+      <a:schemeClr val="accent6"/>
+    </dgm:fillClrLst>
+    <dgm:linClrLst meth="cycle">
+      <a:schemeClr val="lt1"/>
+    </dgm:linClrLst>
+    <dgm:effectClrLst/>
+    <dgm:txLinClrLst/>
+    <dgm:txFillClrLst meth="repeat">
+      <a:schemeClr val="lt1"/>
+    </dgm:txFillClrLst>
+    <dgm:txEffectClrLst/>
+  </dgm:styleLbl>
+  <dgm:styleLbl name="bgSibTrans2D1">
+    <dgm:fillClrLst meth="repeat">
+      <a:schemeClr val="accent2"/>
+      <a:schemeClr val="accent3"/>
+      <a:schemeClr val="accent4"/>
+      <a:schemeClr val="accent5"/>
+      <a:schemeClr val="accent6"/>
+    </dgm:fillClrLst>
+    <dgm:linClrLst meth="cycle">
+      <a:schemeClr val="lt1"/>
+    </dgm:linClrLst>
+    <dgm:effectClrLst/>
+    <dgm:txLinClrLst/>
+    <dgm:txFillClrLst meth="repeat">
+      <a:schemeClr val="lt1"/>
+    </dgm:txFillClrLst>
+    <dgm:txEffectClrLst/>
+  </dgm:styleLbl>
+  <dgm:styleLbl name="sibTrans1D1">
+    <dgm:fillClrLst meth="repeat">
+      <a:schemeClr val="accent2"/>
+      <a:schemeClr val="accent3"/>
+      <a:schemeClr val="accent4"/>
+      <a:schemeClr val="accent5"/>
+      <a:schemeClr val="accent6"/>
+    </dgm:fillClrLst>
+    <dgm:linClrLst meth="repeat">
+      <a:schemeClr val="accent2"/>
+      <a:schemeClr val="accent3"/>
+      <a:schemeClr val="accent4"/>
+      <a:schemeClr val="accent5"/>
+      <a:schemeClr val="accent6"/>
+    </dgm:linClrLst>
+    <dgm:effectClrLst/>
+    <dgm:txLinClrLst/>
+    <dgm:txFillClrLst meth="repeat">
+      <a:schemeClr val="tx1"/>
+    </dgm:txFillClrLst>
+    <dgm:txEffectClrLst/>
+  </dgm:styleLbl>
+  <dgm:styleLbl name="callout">
+    <dgm:fillClrLst meth="repeat">
+      <a:schemeClr val="accent2"/>
+    </dgm:fillClrLst>
+    <dgm:linClrLst meth="repeat">
+      <a:schemeClr val="accent2">
+        <a:tint val="50000"/>
+      </a:schemeClr>
+    </dgm:linClrLst>
+    <dgm:effectClrLst/>
+    <dgm:txLinClrLst/>
+    <dgm:txFillClrLst meth="repeat">
+      <a:schemeClr val="tx1"/>
+    </dgm:txFillClrLst>
+    <dgm:txEffectClrLst/>
+  </dgm:styleLbl>
+  <dgm:styleLbl name="asst0">
+    <dgm:fillClrLst meth="repeat">
+      <a:schemeClr val="accent1"/>
+    </dgm:fillClrLst>
+    <dgm:linClrLst meth="repeat">
+      <a:schemeClr val="lt1"/>
+    </dgm:linClrLst>
+    <dgm:effectClrLst/>
+    <dgm:txLinClrLst/>
+    <dgm:txFillClrLst/>
+    <dgm:txEffectClrLst/>
+  </dgm:styleLbl>
+  <dgm:styleLbl name="asst1">
+    <dgm:fillClrLst meth="repeat">
+      <a:schemeClr val="accent2"/>
+    </dgm:fillClrLst>
+    <dgm:linClrLst meth="repeat">
+      <a:schemeClr val="lt1"/>
+    </dgm:linClrLst>
+    <dgm:effectClrLst/>
+    <dgm:txLinClrLst/>
+    <dgm:txFillClrLst/>
+    <dgm:txEffectClrLst/>
+  </dgm:styleLbl>
+  <dgm:styleLbl name="asst2">
+    <dgm:fillClrLst>
+      <a:schemeClr val="accent3"/>
+    </dgm:fillClrLst>
+    <dgm:linClrLst meth="repeat">
+      <a:schemeClr val="lt1"/>
+    </dgm:linClrLst>
+    <dgm:effectClrLst/>
+    <dgm:txLinClrLst/>
+    <dgm:txFillClrLst/>
+    <dgm:txEffectClrLst/>
+  </dgm:styleLbl>
+  <dgm:styleLbl name="asst3">
+    <dgm:fillClrLst>
+      <a:schemeClr val="accent4"/>
+    </dgm:fillClrLst>
+    <dgm:linClrLst meth="repeat">
+      <a:schemeClr val="lt1"/>
+    </dgm:linClrLst>
+    <dgm:effectClrLst/>
+    <dgm:txLinClrLst/>
+    <dgm:txFillClrLst/>
+    <dgm:txEffectClrLst/>
+  </dgm:styleLbl>
+  <dgm:styleLbl name="asst4">
+    <dgm:fillClrLst>
+      <a:schemeClr val="accent5"/>
+    </dgm:fillClrLst>
+    <dgm:linClrLst meth="repeat">
+      <a:schemeClr val="lt1"/>
+    </dgm:linClrLst>
+    <dgm:effectClrLst/>
+    <dgm:txLinClrLst/>
+    <dgm:txFillClrLst/>
+    <dgm:txEffectClrLst/>
+  </dgm:styleLbl>
+  <dgm:styleLbl name="parChTrans2D1">
+    <dgm:fillClrLst meth="repeat">
+      <a:schemeClr val="accent2"/>
+    </dgm:fillClrLst>
+    <dgm:linClrLst meth="repeat">
+      <a:schemeClr val="lt1"/>
+    </dgm:linClrLst>
+    <dgm:effectClrLst/>
+    <dgm:txLinClrLst/>
+    <dgm:txFillClrLst meth="repeat">
+      <a:schemeClr val="lt1"/>
+    </dgm:txFillClrLst>
+    <dgm:txEffectClrLst/>
+  </dgm:styleLbl>
+  <dgm:styleLbl name="parChTrans2D2">
+    <dgm:fillClrLst meth="repeat">
+      <a:schemeClr val="accent3"/>
+    </dgm:fillClrLst>
+    <dgm:linClrLst meth="repeat">
+      <a:schemeClr val="lt1"/>
+    </dgm:linClrLst>
+    <dgm:effectClrLst/>
+    <dgm:txLinClrLst/>
+    <dgm:txFillClrLst/>
+    <dgm:txEffectClrLst/>
+  </dgm:styleLbl>
+  <dgm:styleLbl name="parChTrans2D3">
+    <dgm:fillClrLst meth="repeat">
+      <a:schemeClr val="accent4"/>
+    </dgm:fillClrLst>
+    <dgm:linClrLst meth="repeat">
+      <a:schemeClr val="lt1"/>
+    </dgm:linClrLst>
+    <dgm:effectClrLst/>
+    <dgm:txLinClrLst/>
+    <dgm:txFillClrLst/>
+    <dgm:txEffectClrLst/>
+  </dgm:styleLbl>
+  <dgm:styleLbl name="parChTrans2D4">
+    <dgm:fillClrLst meth="repeat">
+      <a:schemeClr val="accent5"/>
+    </dgm:fillClrLst>
+    <dgm:linClrLst meth="repeat">
+      <a:schemeClr val="lt1"/>
+    </dgm:linClrLst>
+    <dgm:effectClrLst/>
+    <dgm:txLinClrLst/>
+    <dgm:txFillClrLst meth="repeat">
+      <a:schemeClr val="lt1"/>
+    </dgm:txFillClrLst>
+    <dgm:txEffectClrLst/>
+  </dgm:styleLbl>
+  <dgm:styleLbl name="parChTrans1D1">
+    <dgm:fillClrLst meth="repeat">
+      <a:schemeClr val="accent2"/>
+    </dgm:fillClrLst>
+    <dgm:linClrLst meth="repeat">
+      <a:schemeClr val="accent1"/>
+    </dgm:linClrLst>
+    <dgm:effectClrLst/>
+    <dgm:txLinClrLst/>
+    <dgm:txFillClrLst meth="repeat">
+      <a:schemeClr val="tx1"/>
+    </dgm:txFillClrLst>
+    <dgm:txEffectClrLst/>
+  </dgm:styleLbl>
+  <dgm:styleLbl name="parChTrans1D2">
+    <dgm:fillClrLst meth="repeat">
+      <a:schemeClr val="accent3">
+        <a:tint val="90000"/>
+      </a:schemeClr>
+    </dgm:fillClrLst>
+    <dgm:linClrLst meth="repeat">
+      <a:schemeClr val="accent2"/>
+    </dgm:linClrLst>
+    <dgm:effectClrLst/>
+    <dgm:txLinClrLst/>
+    <dgm:txFillClrLst meth="repeat">
+      <a:schemeClr val="tx1"/>
+    </dgm:txFillClrLst>
+    <dgm:txEffectClrLst/>
+  </dgm:styleLbl>
+  <dgm:styleLbl name="parChTrans1D3">
+    <dgm:fillClrLst meth="repeat">
+      <a:schemeClr val="accent4">
+        <a:tint val="70000"/>
+      </a:schemeClr>
+    </dgm:fillClrLst>
+    <dgm:linClrLst meth="repeat">
+      <a:schemeClr val="accent3"/>
+    </dgm:linClrLst>
+    <dgm:effectClrLst/>
+    <dgm:txLinClrLst/>
+    <dgm:txFillClrLst meth="repeat">
+      <a:schemeClr val="tx1"/>
+    </dgm:txFillClrLst>
+    <dgm:txEffectClrLst/>
+  </dgm:styleLbl>
+  <dgm:styleLbl name="parChTrans1D4">
+    <dgm:fillClrLst meth="repeat">
+      <a:schemeClr val="accent5">
+        <a:tint val="50000"/>
+      </a:schemeClr>
+    </dgm:fillClrLst>
+    <dgm:linClrLst meth="repeat">
+      <a:schemeClr val="accent4"/>
+    </dgm:linClrLst>
+    <dgm:effectClrLst/>
+    <dgm:txLinClrLst/>
+    <dgm:txFillClrLst meth="repeat">
+      <a:schemeClr val="tx1"/>
+    </dgm:txFillClrLst>
+    <dgm:txEffectClrLst/>
+  </dgm:styleLbl>
+  <dgm:styleLbl name="fgAcc1">
+    <dgm:fillClrLst meth="repeat">
+      <a:schemeClr val="lt1">
+        <a:alpha val="90000"/>
+      </a:schemeClr>
+    </dgm:fillClrLst>
+    <dgm:linClrLst meth="repeat">
+      <a:schemeClr val="accent2"/>
+      <a:schemeClr val="accent3"/>
+      <a:schemeClr val="accent4"/>
+      <a:schemeClr val="accent5"/>
+      <a:schemeClr val="accent6"/>
+    </dgm:linClrLst>
+    <dgm:effectClrLst/>
+    <dgm:txLinClrLst/>
+    <dgm:txFillClrLst meth="repeat">
+      <a:schemeClr val="dk1"/>
+    </dgm:txFillClrLst>
+    <dgm:txEffectClrLst/>
+  </dgm:styleLbl>
+  <dgm:styleLbl name="conFgAcc1">
+    <dgm:fillClrLst meth="repeat">
+      <a:schemeClr val="lt1">
+        <a:alpha val="90000"/>
+      </a:schemeClr>
+    </dgm:fillClrLst>
+    <dgm:linClrLst meth="repeat">
+      <a:schemeClr val="accent2"/>
+      <a:schemeClr val="accent3"/>
+      <a:schemeClr val="accent4"/>
+      <a:schemeClr val="accent5"/>
+      <a:schemeClr val="accent6"/>
+    </dgm:linClrLst>
+    <dgm:effectClrLst/>
+    <dgm:txLinClrLst/>
+    <dgm:txFillClrLst meth="repeat">
+      <a:schemeClr val="dk1"/>
+    </dgm:txFillClrLst>
+    <dgm:txEffectClrLst/>
+  </dgm:styleLbl>
+  <dgm:styleLbl name="alignAcc1">
+    <dgm:fillClrLst meth="repeat">
+      <a:schemeClr val="lt1">
+        <a:alpha val="90000"/>
+      </a:schemeClr>
+    </dgm:fillClrLst>
+    <dgm:linClrLst meth="repeat">
+      <a:schemeClr val="accent2"/>
+      <a:schemeClr val="accent3"/>
+      <a:schemeClr val="accent4"/>
+      <a:schemeClr val="accent5"/>
+      <a:schemeClr val="accent6"/>
+    </dgm:linClrLst>
+    <dgm:effectClrLst/>
+    <dgm:txLinClrLst/>
+    <dgm:txFillClrLst meth="repeat">
+      <a:schemeClr val="dk1"/>
+    </dgm:txFillClrLst>
+    <dgm:txEffectClrLst/>
+  </dgm:styleLbl>
+  <dgm:styleLbl name="trAlignAcc1">
+    <dgm:fillClrLst meth="repeat">
+      <a:schemeClr val="lt1">
+        <a:alpha val="0"/>
+      </a:schemeClr>
+    </dgm:fillClrLst>
+    <dgm:linClrLst meth="repeat">
+      <a:schemeClr val="accent2"/>
+      <a:schemeClr val="accent3"/>
+      <a:schemeClr val="accent4"/>
+      <a:schemeClr val="accent5"/>
+      <a:schemeClr val="accent6"/>
+    </dgm:linClrLst>
+    <dgm:effectClrLst/>
+    <dgm:txLinClrLst/>
+    <dgm:txFillClrLst meth="repeat">
+      <a:schemeClr val="dk1"/>
+    </dgm:txFillClrLst>
+    <dgm:txEffectClrLst/>
+  </dgm:styleLbl>
+  <dgm:styleLbl name="bgAcc1">
+    <dgm:fillClrLst meth="repeat">
+      <a:schemeClr val="lt1">
+        <a:alpha val="90000"/>
+      </a:schemeClr>
+    </dgm:fillClrLst>
+    <dgm:linClrLst meth="repeat">
+      <a:schemeClr val="accent2"/>
+      <a:schemeClr val="accent3"/>
+      <a:schemeClr val="accent4"/>
+      <a:schemeClr val="accent5"/>
+      <a:schemeClr val="accent6"/>
+    </dgm:linClrLst>
+    <dgm:effectClrLst/>
+    <dgm:txLinClrLst/>
+    <dgm:txFillClrLst meth="repeat">
+      <a:schemeClr val="dk1"/>
+    </dgm:txFillClrLst>
+    <dgm:txEffectClrLst/>
+  </dgm:styleLbl>
+  <dgm:styleLbl name="solidFgAcc1">
+    <dgm:fillClrLst meth="repeat">
+      <a:schemeClr val="lt1"/>
+    </dgm:fillClrLst>
+    <dgm:linClrLst meth="repeat">
+      <a:schemeClr val="accent2"/>
+      <a:schemeClr val="accent3"/>
+      <a:schemeClr val="accent4"/>
+      <a:schemeClr val="accent5"/>
+      <a:schemeClr val="accent6"/>
+    </dgm:linClrLst>
+    <dgm:effectClrLst/>
+    <dgm:txLinClrLst/>
+    <dgm:txFillClrLst meth="repeat">
+      <a:schemeClr val="dk1"/>
+    </dgm:txFillClrLst>
+    <dgm:txEffectClrLst/>
+  </dgm:styleLbl>
+  <dgm:styleLbl name="solidAlignAcc1">
+    <dgm:fillClrLst meth="repeat">
+      <a:schemeClr val="lt1"/>
+    </dgm:fillClrLst>
+    <dgm:linClrLst meth="repeat">
+      <a:schemeClr val="accent2"/>
+      <a:schemeClr val="accent3"/>
+      <a:schemeClr val="accent4"/>
+      <a:schemeClr val="accent5"/>
+      <a:schemeClr val="accent6"/>
+    </dgm:linClrLst>
+    <dgm:effectClrLst/>
+    <dgm:txLinClrLst/>
+    <dgm:txFillClrLst meth="repeat">
+      <a:schemeClr val="dk1"/>
+    </dgm:txFillClrLst>
+    <dgm:txEffectClrLst/>
+  </dgm:styleLbl>
+  <dgm:styleLbl name="solidBgAcc1">
+    <dgm:fillClrLst meth="repeat">
+      <a:schemeClr val="lt1"/>
+    </dgm:fillClrLst>
+    <dgm:linClrLst meth="repeat">
+      <a:schemeClr val="accent2"/>
+      <a:schemeClr val="accent3"/>
+      <a:schemeClr val="accent4"/>
+      <a:schemeClr val="accent5"/>
+      <a:schemeClr val="accent6"/>
+    </dgm:linClrLst>
+    <dgm:effectClrLst/>
+    <dgm:txLinClrLst/>
+    <dgm:txFillClrLst meth="repeat">
+      <a:schemeClr val="dk1"/>
+    </dgm:txFillClrLst>
+    <dgm:txEffectClrLst/>
+  </dgm:styleLbl>
+  <dgm:styleLbl name="fgAccFollowNode1">
+    <dgm:fillClrLst meth="repeat">
+      <a:schemeClr val="accent2">
+        <a:tint val="40000"/>
+        <a:alpha val="90000"/>
+      </a:schemeClr>
+      <a:schemeClr val="accent3">
+        <a:tint val="40000"/>
+        <a:alpha val="90000"/>
+      </a:schemeClr>
+      <a:schemeClr val="accent4">
+        <a:tint val="40000"/>
+        <a:alpha val="90000"/>
+      </a:schemeClr>
+      <a:schemeClr val="accent5">
+        <a:tint val="40000"/>
+        <a:alpha val="90000"/>
+      </a:schemeClr>
+      <a:schemeClr val="accent6">
+        <a:tint val="40000"/>
+        <a:alpha val="90000"/>
+      </a:schemeClr>
+    </dgm:fillClrLst>
+    <dgm:linClrLst meth="repeat">
+      <a:schemeClr val="accent2">
+        <a:tint val="40000"/>
+        <a:alpha val="90000"/>
+      </a:schemeClr>
+      <a:schemeClr val="accent3">
+        <a:tint val="40000"/>
+        <a:alpha val="90000"/>
+      </a:schemeClr>
+      <a:schemeClr val="accent4">
+        <a:tint val="40000"/>
+        <a:alpha val="90000"/>
+      </a:schemeClr>
+      <a:schemeClr val="accent5">
+        <a:tint val="40000"/>
+        <a:alpha val="90000"/>
+      </a:schemeClr>
+      <a:schemeClr val="accent6">
+        <a:tint val="40000"/>
+        <a:alpha val="90000"/>
+      </a:schemeClr>
+    </dgm:linClrLst>
+    <dgm:effectClrLst/>
+    <dgm:txLinClrLst/>
+    <dgm:txFillClrLst meth="repeat">
+      <a:schemeClr val="dk1"/>
+    </dgm:txFillClrLst>
+    <dgm:txEffectClrLst/>
+  </dgm:styleLbl>
+  <dgm:styleLbl name="alignAccFollowNode1">
+    <dgm:fillClrLst meth="repeat">
+      <a:schemeClr val="accent2">
+        <a:tint val="40000"/>
+        <a:alpha val="90000"/>
+      </a:schemeClr>
+      <a:schemeClr val="accent3">
+        <a:tint val="40000"/>
+        <a:alpha val="90000"/>
+      </a:schemeClr>
+      <a:schemeClr val="accent4">
+        <a:tint val="40000"/>
+        <a:alpha val="90000"/>
+      </a:schemeClr>
+      <a:schemeClr val="accent5">
+        <a:tint val="40000"/>
+        <a:alpha val="90000"/>
+      </a:schemeClr>
+      <a:schemeClr val="accent6">
+        <a:tint val="40000"/>
+        <a:alpha val="90000"/>
+      </a:schemeClr>
+    </dgm:fillClrLst>
+    <dgm:linClrLst meth="repeat">
+      <a:schemeClr val="accent2">
+        <a:tint val="40000"/>
+        <a:alpha val="90000"/>
+      </a:schemeClr>
+      <a:schemeClr val="accent3">
+        <a:tint val="40000"/>
+        <a:alpha val="90000"/>
+      </a:schemeClr>
+      <a:schemeClr val="accent4">
+        <a:tint val="40000"/>
+        <a:alpha val="90000"/>
+      </a:schemeClr>
+      <a:schemeClr val="accent5">
+        <a:tint val="40000"/>
+        <a:alpha val="90000"/>
+      </a:schemeClr>
+      <a:schemeClr val="accent6">
+        <a:tint val="40000"/>
+        <a:alpha val="90000"/>
+      </a:schemeClr>
+    </dgm:linClrLst>
+    <dgm:effectClrLst/>
+    <dgm:txLinClrLst/>
+    <dgm:txFillClrLst meth="repeat">
+      <a:schemeClr val="dk1"/>
+    </dgm:txFillClrLst>
+    <dgm:txEffectClrLst/>
+  </dgm:styleLbl>
+  <dgm:styleLbl name="bgAccFollowNode1">
+    <dgm:fillClrLst meth="repeat">
+      <a:schemeClr val="accent2">
+        <a:tint val="40000"/>
+        <a:alpha val="90000"/>
+      </a:schemeClr>
+      <a:schemeClr val="accent3">
+        <a:tint val="40000"/>
+        <a:alpha val="90000"/>
+      </a:schemeClr>
+      <a:schemeClr val="accent4">
+        <a:tint val="40000"/>
+        <a:alpha val="90000"/>
+      </a:schemeClr>
+      <a:schemeClr val="accent5">
+        <a:tint val="40000"/>
+        <a:alpha val="90000"/>
+      </a:schemeClr>
+      <a:schemeClr val="accent6">
+        <a:tint val="40000"/>
+        <a:alpha val="90000"/>
+      </a:schemeClr>
+    </dgm:fillClrLst>
+    <dgm:linClrLst meth="repeat">
+      <a:schemeClr val="accent2">
+        <a:tint val="40000"/>
+        <a:alpha val="90000"/>
+      </a:schemeClr>
+      <a:schemeClr val="accent3">
+        <a:tint val="40000"/>
+        <a:alpha val="90000"/>
+      </a:schemeClr>
+      <a:schemeClr val="accent4">
+        <a:tint val="40000"/>
+        <a:alpha val="90000"/>
+      </a:schemeClr>
+      <a:schemeClr val="accent5">
+        <a:tint val="40000"/>
+        <a:alpha val="90000"/>
+      </a:schemeClr>
+      <a:schemeClr val="accent6">
+        <a:tint val="40000"/>
+        <a:alpha val="90000"/>
+      </a:schemeClr>
+    </dgm:linClrLst>
+    <dgm:effectClrLst/>
+    <dgm:txLinClrLst/>
+    <dgm:txFillClrLst meth="repeat">
+      <a:schemeClr val="dk1"/>
+    </dgm:txFillClrLst>
+    <dgm:txEffectClrLst/>
+  </dgm:styleLbl>
+  <dgm:styleLbl name="fgAcc0">
+    <dgm:fillClrLst meth="repeat">
+      <a:schemeClr val="lt1">
+        <a:alpha val="90000"/>
+      </a:schemeClr>
+    </dgm:fillClrLst>
+    <dgm:linClrLst>
+      <a:schemeClr val="accent1"/>
+    </dgm:linClrLst>
+    <dgm:effectClrLst/>
+    <dgm:txLinClrLst/>
+    <dgm:txFillClrLst meth="repeat">
+      <a:schemeClr val="dk1"/>
+    </dgm:txFillClrLst>
+    <dgm:txEffectClrLst/>
+  </dgm:styleLbl>
+  <dgm:styleLbl name="fgAcc2">
+    <dgm:fillClrLst meth="repeat">
+      <a:schemeClr val="lt1">
+        <a:alpha val="90000"/>
+      </a:schemeClr>
+    </dgm:fillClrLst>
+    <dgm:linClrLst>
+      <a:schemeClr val="accent2"/>
+    </dgm:linClrLst>
+    <dgm:effectClrLst/>
+    <dgm:txLinClrLst/>
+    <dgm:txFillClrLst meth="repeat">
+      <a:schemeClr val="dk1"/>
+    </dgm:txFillClrLst>
+    <dgm:txEffectClrLst/>
+  </dgm:styleLbl>
+  <dgm:styleLbl name="fgAcc3">
+    <dgm:fillClrLst meth="repeat">
+      <a:schemeClr val="lt1">
+        <a:alpha val="90000"/>
+      </a:schemeClr>
+    </dgm:fillClrLst>
+    <dgm:linClrLst>
+      <a:schemeClr val="accent3"/>
+    </dgm:linClrLst>
+    <dgm:effectClrLst/>
+    <dgm:txLinClrLst/>
+    <dgm:txFillClrLst meth="repeat">
+      <a:schemeClr val="dk1"/>
+    </dgm:txFillClrLst>
+    <dgm:txEffectClrLst/>
+  </dgm:styleLbl>
+  <dgm:styleLbl name="fgAcc4">
+    <dgm:fillClrLst meth="repeat">
+      <a:schemeClr val="lt1">
+        <a:alpha val="90000"/>
+      </a:schemeClr>
+    </dgm:fillClrLst>
+    <dgm:linClrLst>
+      <a:schemeClr val="accent4"/>
+    </dgm:linClrLst>
+    <dgm:effectClrLst/>
+    <dgm:txLinClrLst/>
+    <dgm:txFillClrLst meth="repeat">
+      <a:schemeClr val="dk1"/>
+    </dgm:txFillClrLst>
+    <dgm:txEffectClrLst/>
+  </dgm:styleLbl>
+  <dgm:styleLbl name="bgShp">
+    <dgm:fillClrLst meth="repeat">
+      <a:schemeClr val="accent2"/>
+      <a:schemeClr val="accent3"/>
+      <a:schemeClr val="accent4"/>
+      <a:schemeClr val="accent5"/>
+      <a:schemeClr val="accent6"/>
+    </dgm:fillClrLst>
+    <dgm:linClrLst meth="repeat">
+      <a:schemeClr val="lt1">
+        <a:alpha val="0"/>
+      </a:schemeClr>
+    </dgm:linClrLst>
+    <dgm:effectClrLst/>
+    <dgm:txLinClrLst/>
+    <dgm:txFillClrLst/>
+    <dgm:txEffectClrLst/>
+  </dgm:styleLbl>
+  <dgm:styleLbl name="dkBgShp">
+    <dgm:fillClrLst meth="repeat">
+      <a:schemeClr val="accent2">
+        <a:shade val="90000"/>
+      </a:schemeClr>
+    </dgm:fillClrLst>
+    <dgm:linClrLst meth="repeat">
+      <a:schemeClr val="dk1"/>
+    </dgm:linClrLst>
+    <dgm:effectClrLst/>
+    <dgm:txLinClrLst/>
+    <dgm:txFillClrLst meth="repeat">
+      <a:schemeClr val="lt1"/>
+    </dgm:txFillClrLst>
+    <dgm:txEffectClrLst/>
+  </dgm:styleLbl>
+  <dgm:styleLbl name="trBgShp">
+    <dgm:fillClrLst meth="repeat">
+      <a:schemeClr val="accent1">
+        <a:tint val="50000"/>
+        <a:alpha val="40000"/>
+      </a:schemeClr>
+    </dgm:fillClrLst>
+    <dgm:linClrLst meth="repeat">
+      <a:schemeClr val="accent2"/>
+    </dgm:linClrLst>
+    <dgm:effectClrLst/>
+    <dgm:txLinClrLst/>
+    <dgm:txFillClrLst meth="repeat">
+      <a:schemeClr val="lt1"/>
+    </dgm:txFillClrLst>
+    <dgm:txEffectClrLst/>
+  </dgm:styleLbl>
+  <dgm:styleLbl name="fgShp">
+    <dgm:fillClrLst meth="repeat">
+      <a:schemeClr val="accent2">
+        <a:tint val="40000"/>
+      </a:schemeClr>
+    </dgm:fillClrLst>
+    <dgm:linClrLst meth="repeat">
+      <a:schemeClr val="lt1"/>
+    </dgm:linClrLst>
+    <dgm:effectClrLst/>
+    <dgm:txLinClrLst/>
+    <dgm:txFillClrLst meth="repeat">
+      <a:schemeClr val="dk1"/>
+    </dgm:txFillClrLst>
+    <dgm:txEffectClrLst/>
+  </dgm:styleLbl>
+  <dgm:styleLbl name="revTx">
+    <dgm:fillClrLst meth="repeat">
+      <a:schemeClr val="accent2">
+        <a:alpha val="0"/>
+      </a:schemeClr>
+    </dgm:fillClrLst>
+    <dgm:linClrLst meth="repeat">
+      <a:schemeClr val="accent2">
+        <a:alpha val="0"/>
+      </a:schemeClr>
+    </dgm:linClrLst>
+    <dgm:effectClrLst/>
+    <dgm:txLinClrLst/>
+    <dgm:txFillClrLst meth="repeat">
+      <a:schemeClr val="accent2"/>
+      <a:schemeClr val="accent3"/>
+      <a:schemeClr val="accent4"/>
+      <a:schemeClr val="accent5"/>
+      <a:schemeClr val="accent6"/>
+    </dgm:txFillClrLst>
+    <dgm:txEffectClrLst/>
+  </dgm:styleLbl>
+</dgm:colorsDef>
+</file>
+
+<file path=ppt/diagrams/colors4.xml><?xml version="1.0" encoding="utf-8"?>
 <dgm:colorsDef xmlns:dgm="http://schemas.openxmlformats.org/drawingml/2006/diagram" xmlns:a="http://schemas.openxmlformats.org/drawingml/2006/main" uniqueId="urn:microsoft.com/office/officeart/2005/8/colors/accent1_2">
   <dgm:title val=""/>
   <dgm:desc val=""/>
@@ -2873,7 +3805,7 @@
 </dgm:colorsDef>
 </file>
 
-<file path=ppt/diagrams/colors4.xml><?xml version="1.0" encoding="utf-8"?>
+<file path=ppt/diagrams/colors5.xml><?xml version="1.0" encoding="utf-8"?>
 <dgm:colorsDef xmlns:dgm="http://schemas.openxmlformats.org/drawingml/2006/diagram" xmlns:a="http://schemas.openxmlformats.org/drawingml/2006/main" uniqueId="urn:microsoft.com/office/officeart/2018/5/colors/Iconchunking_coloredtext_colorful1">
   <dgm:title val=""/>
   <dgm:desc val=""/>
@@ -4677,6 +5609,471 @@
 <file path=ppt/diagrams/data3.xml><?xml version="1.0" encoding="utf-8"?>
 <dgm:dataModel xmlns:dgm="http://schemas.openxmlformats.org/drawingml/2006/diagram" xmlns:a="http://schemas.openxmlformats.org/drawingml/2006/main">
   <dgm:ptLst>
+    <dgm:pt modelId="{55504BFB-F29B-45DE-A291-FC668635DC72}" type="doc">
+      <dgm:prSet loTypeId="urn:microsoft.com/office/officeart/2018/2/layout/IconCircleList" loCatId="icon" qsTypeId="urn:microsoft.com/office/officeart/2005/8/quickstyle/simple1" qsCatId="simple" csTypeId="urn:microsoft.com/office/officeart/2018/5/colors/Iconchunking_coloredtext_colorful1" csCatId="colorful" phldr="1"/>
+      <dgm:spPr/>
+      <dgm:t>
+        <a:bodyPr/>
+        <a:lstStyle/>
+        <a:p>
+          <a:endParaRPr lang="en-US"/>
+        </a:p>
+      </dgm:t>
+    </dgm:pt>
+    <dgm:pt modelId="{778EAC78-5C4E-404D-9D79-DB84DBDFD55E}">
+      <dgm:prSet/>
+      <dgm:spPr/>
+      <dgm:t>
+        <a:bodyPr/>
+        <a:lstStyle/>
+        <a:p>
+          <a:pPr>
+            <a:lnSpc>
+              <a:spcPct val="100000"/>
+            </a:lnSpc>
+          </a:pPr>
+          <a:r>
+            <a:rPr lang="en-US" i="0" dirty="0"/>
+            <a:t>The importance of incorporating tasks into a consistent schedule.</a:t>
+          </a:r>
+        </a:p>
+      </dgm:t>
+    </dgm:pt>
+    <dgm:pt modelId="{A7EFBAAD-3C5C-4E39-A4CC-3872B23D3E57}" type="parTrans" cxnId="{AD946A1A-44B3-4191-8E4F-E710C51EFD72}">
+      <dgm:prSet/>
+      <dgm:spPr/>
+      <dgm:t>
+        <a:bodyPr/>
+        <a:lstStyle/>
+        <a:p>
+          <a:endParaRPr lang="en-US"/>
+        </a:p>
+      </dgm:t>
+    </dgm:pt>
+    <dgm:pt modelId="{9F531577-E2A1-4F77-A078-A4AD85E565CA}" type="sibTrans" cxnId="{AD946A1A-44B3-4191-8E4F-E710C51EFD72}">
+      <dgm:prSet/>
+      <dgm:spPr/>
+      <dgm:t>
+        <a:bodyPr/>
+        <a:lstStyle/>
+        <a:p>
+          <a:pPr>
+            <a:lnSpc>
+              <a:spcPct val="100000"/>
+            </a:lnSpc>
+          </a:pPr>
+          <a:endParaRPr lang="en-US"/>
+        </a:p>
+      </dgm:t>
+    </dgm:pt>
+    <dgm:pt modelId="{6BD8ECE1-1BED-4B55-97A8-EE87372C8F48}">
+      <dgm:prSet/>
+      <dgm:spPr/>
+      <dgm:t>
+        <a:bodyPr/>
+        <a:lstStyle/>
+        <a:p>
+          <a:pPr>
+            <a:lnSpc>
+              <a:spcPct val="100000"/>
+            </a:lnSpc>
+          </a:pPr>
+          <a:r>
+            <a:rPr lang="en-US" dirty="0"/>
+            <a:t>Communication is a primary part of teamwork.</a:t>
+          </a:r>
+        </a:p>
+      </dgm:t>
+    </dgm:pt>
+    <dgm:pt modelId="{3CE8D753-7367-4DD7-8749-F3C35489853A}" type="parTrans" cxnId="{5F7296DE-6AAC-4B51-BC0E-9C1D8ED75614}">
+      <dgm:prSet/>
+      <dgm:spPr/>
+      <dgm:t>
+        <a:bodyPr/>
+        <a:lstStyle/>
+        <a:p>
+          <a:endParaRPr lang="en-US"/>
+        </a:p>
+      </dgm:t>
+    </dgm:pt>
+    <dgm:pt modelId="{91D6B966-B851-4F3D-B4C6-DC61AE6F2548}" type="sibTrans" cxnId="{5F7296DE-6AAC-4B51-BC0E-9C1D8ED75614}">
+      <dgm:prSet/>
+      <dgm:spPr/>
+      <dgm:t>
+        <a:bodyPr/>
+        <a:lstStyle/>
+        <a:p>
+          <a:pPr>
+            <a:lnSpc>
+              <a:spcPct val="100000"/>
+            </a:lnSpc>
+          </a:pPr>
+          <a:endParaRPr lang="en-US"/>
+        </a:p>
+      </dgm:t>
+    </dgm:pt>
+    <dgm:pt modelId="{7CE082B0-1A6D-47F3-98CF-2C501C5611CD}">
+      <dgm:prSet/>
+      <dgm:spPr/>
+      <dgm:t>
+        <a:bodyPr/>
+        <a:lstStyle/>
+        <a:p>
+          <a:pPr>
+            <a:lnSpc>
+              <a:spcPct val="100000"/>
+            </a:lnSpc>
+          </a:pPr>
+          <a:r>
+            <a:rPr lang="en-US" dirty="0"/>
+            <a:t>How to take setbacks in stride.</a:t>
+          </a:r>
+        </a:p>
+      </dgm:t>
+    </dgm:pt>
+    <dgm:pt modelId="{F8792DD3-2229-458C-8D5B-0FFCD7C492DF}" type="parTrans" cxnId="{6CB6260B-0425-470F-98DA-A203EDA00C93}">
+      <dgm:prSet/>
+      <dgm:spPr/>
+      <dgm:t>
+        <a:bodyPr/>
+        <a:lstStyle/>
+        <a:p>
+          <a:endParaRPr lang="en-US"/>
+        </a:p>
+      </dgm:t>
+    </dgm:pt>
+    <dgm:pt modelId="{461DE2AC-DDF5-4324-86AE-C1CBAEDFE7AB}" type="sibTrans" cxnId="{6CB6260B-0425-470F-98DA-A203EDA00C93}">
+      <dgm:prSet/>
+      <dgm:spPr/>
+      <dgm:t>
+        <a:bodyPr/>
+        <a:lstStyle/>
+        <a:p>
+          <a:pPr>
+            <a:lnSpc>
+              <a:spcPct val="100000"/>
+            </a:lnSpc>
+          </a:pPr>
+          <a:endParaRPr lang="en-US"/>
+        </a:p>
+      </dgm:t>
+    </dgm:pt>
+    <dgm:pt modelId="{FD068EA9-B950-4B4F-A875-A5A91B97E204}">
+      <dgm:prSet/>
+      <dgm:spPr/>
+      <dgm:t>
+        <a:bodyPr/>
+        <a:lstStyle/>
+        <a:p>
+          <a:pPr>
+            <a:lnSpc>
+              <a:spcPct val="100000"/>
+            </a:lnSpc>
+          </a:pPr>
+          <a:r>
+            <a:rPr lang="en-US" dirty="0"/>
+            <a:t>How to rely on other’s skillsets when they are better for the job.</a:t>
+          </a:r>
+        </a:p>
+      </dgm:t>
+    </dgm:pt>
+    <dgm:pt modelId="{CD800455-1F9C-4D71-A491-C32EFE9DFD34}" type="parTrans" cxnId="{5283DA39-BDF9-4522-833F-06AA22A94A77}">
+      <dgm:prSet/>
+      <dgm:spPr/>
+      <dgm:t>
+        <a:bodyPr/>
+        <a:lstStyle/>
+        <a:p>
+          <a:endParaRPr lang="en-US"/>
+        </a:p>
+      </dgm:t>
+    </dgm:pt>
+    <dgm:pt modelId="{E5F58589-32AE-40EE-AF90-3E36522347D6}" type="sibTrans" cxnId="{5283DA39-BDF9-4522-833F-06AA22A94A77}">
+      <dgm:prSet/>
+      <dgm:spPr/>
+      <dgm:t>
+        <a:bodyPr/>
+        <a:lstStyle/>
+        <a:p>
+          <a:pPr>
+            <a:lnSpc>
+              <a:spcPct val="100000"/>
+            </a:lnSpc>
+          </a:pPr>
+          <a:endParaRPr lang="en-US"/>
+        </a:p>
+      </dgm:t>
+    </dgm:pt>
+    <dgm:pt modelId="{A7919174-B3A7-4AD2-A910-621F61066E72}" type="pres">
+      <dgm:prSet presAssocID="{55504BFB-F29B-45DE-A291-FC668635DC72}" presName="root" presStyleCnt="0">
+        <dgm:presLayoutVars>
+          <dgm:dir/>
+          <dgm:resizeHandles val="exact"/>
+        </dgm:presLayoutVars>
+      </dgm:prSet>
+      <dgm:spPr/>
+    </dgm:pt>
+    <dgm:pt modelId="{1E89A735-378B-4362-8276-D7751D875052}" type="pres">
+      <dgm:prSet presAssocID="{55504BFB-F29B-45DE-A291-FC668635DC72}" presName="container" presStyleCnt="0">
+        <dgm:presLayoutVars>
+          <dgm:dir/>
+          <dgm:resizeHandles val="exact"/>
+        </dgm:presLayoutVars>
+      </dgm:prSet>
+      <dgm:spPr/>
+    </dgm:pt>
+    <dgm:pt modelId="{CE53D0A8-4B8C-4884-B62C-4F0B764661C0}" type="pres">
+      <dgm:prSet presAssocID="{778EAC78-5C4E-404D-9D79-DB84DBDFD55E}" presName="compNode" presStyleCnt="0"/>
+      <dgm:spPr/>
+    </dgm:pt>
+    <dgm:pt modelId="{345A990F-BED3-4157-A449-7D4FECE6C339}" type="pres">
+      <dgm:prSet presAssocID="{778EAC78-5C4E-404D-9D79-DB84DBDFD55E}" presName="iconBgRect" presStyleLbl="bgShp" presStyleIdx="0" presStyleCnt="4"/>
+      <dgm:spPr/>
+    </dgm:pt>
+    <dgm:pt modelId="{03AF5E35-6C6B-4C8C-9DB2-D9EBBC3D90B0}" type="pres">
+      <dgm:prSet presAssocID="{778EAC78-5C4E-404D-9D79-DB84DBDFD55E}" presName="iconRect" presStyleLbl="node1" presStyleIdx="0" presStyleCnt="4" custLinFactNeighborX="0" custLinFactNeighborY="-4978"/>
+      <dgm:spPr>
+        <a:blipFill>
+          <a:blip xmlns:r="http://schemas.openxmlformats.org/officeDocument/2006/relationships" r:embed="rId1">
+            <a:extLst>
+              <a:ext uri="{96DAC541-7B7A-43D3-8B79-37D633B846F1}">
+                <asvg:svgBlip xmlns:asvg="http://schemas.microsoft.com/office/drawing/2016/SVG/main" r:embed="rId2"/>
+              </a:ext>
+            </a:extLst>
+          </a:blip>
+          <a:srcRect/>
+          <a:stretch>
+            <a:fillRect/>
+          </a:stretch>
+        </a:blipFill>
+        <a:ln>
+          <a:noFill/>
+        </a:ln>
+      </dgm:spPr>
+      <dgm:extLst>
+        <a:ext uri="{E40237B7-FDA0-4F09-8148-C483321AD2D9}">
+          <dgm14:cNvPr xmlns:dgm14="http://schemas.microsoft.com/office/drawing/2010/diagram" id="0" name="" descr="Clipboard Checked outline"/>
+        </a:ext>
+      </dgm:extLst>
+    </dgm:pt>
+    <dgm:pt modelId="{0EFD678F-A551-4482-8AC1-1D7CB96C3794}" type="pres">
+      <dgm:prSet presAssocID="{778EAC78-5C4E-404D-9D79-DB84DBDFD55E}" presName="spaceRect" presStyleCnt="0"/>
+      <dgm:spPr/>
+    </dgm:pt>
+    <dgm:pt modelId="{AB5F4A47-AB38-482D-B9CF-306BF44EFDE7}" type="pres">
+      <dgm:prSet presAssocID="{778EAC78-5C4E-404D-9D79-DB84DBDFD55E}" presName="textRect" presStyleLbl="revTx" presStyleIdx="0" presStyleCnt="4">
+        <dgm:presLayoutVars>
+          <dgm:chMax val="1"/>
+          <dgm:chPref val="1"/>
+        </dgm:presLayoutVars>
+      </dgm:prSet>
+      <dgm:spPr/>
+    </dgm:pt>
+    <dgm:pt modelId="{621CF756-1C03-42A2-97B8-49295279BF8F}" type="pres">
+      <dgm:prSet presAssocID="{9F531577-E2A1-4F77-A078-A4AD85E565CA}" presName="sibTrans" presStyleLbl="sibTrans2D1" presStyleIdx="0" presStyleCnt="0"/>
+      <dgm:spPr/>
+    </dgm:pt>
+    <dgm:pt modelId="{4D1B44E2-071D-436D-91BC-9085C86365E7}" type="pres">
+      <dgm:prSet presAssocID="{6BD8ECE1-1BED-4B55-97A8-EE87372C8F48}" presName="compNode" presStyleCnt="0"/>
+      <dgm:spPr/>
+    </dgm:pt>
+    <dgm:pt modelId="{7EFACD28-FD14-4BB1-BCEB-FE3301AB8A9B}" type="pres">
+      <dgm:prSet presAssocID="{6BD8ECE1-1BED-4B55-97A8-EE87372C8F48}" presName="iconBgRect" presStyleLbl="bgShp" presStyleIdx="1" presStyleCnt="4"/>
+      <dgm:spPr/>
+    </dgm:pt>
+    <dgm:pt modelId="{94490D6E-8191-41DB-A2CC-3BC1A7172D4A}" type="pres">
+      <dgm:prSet presAssocID="{6BD8ECE1-1BED-4B55-97A8-EE87372C8F48}" presName="iconRect" presStyleLbl="node1" presStyleIdx="1" presStyleCnt="4"/>
+      <dgm:spPr>
+        <a:blipFill>
+          <a:blip xmlns:r="http://schemas.openxmlformats.org/officeDocument/2006/relationships" r:embed="rId3">
+            <a:extLst>
+              <a:ext uri="{96DAC541-7B7A-43D3-8B79-37D633B846F1}">
+                <asvg:svgBlip xmlns:asvg="http://schemas.microsoft.com/office/drawing/2016/SVG/main" r:embed="rId4"/>
+              </a:ext>
+            </a:extLst>
+          </a:blip>
+          <a:srcRect/>
+          <a:stretch>
+            <a:fillRect/>
+          </a:stretch>
+        </a:blipFill>
+        <a:ln>
+          <a:noFill/>
+        </a:ln>
+      </dgm:spPr>
+      <dgm:extLst>
+        <a:ext uri="{E40237B7-FDA0-4F09-8148-C483321AD2D9}">
+          <dgm14:cNvPr xmlns:dgm14="http://schemas.microsoft.com/office/drawing/2010/diagram" id="0" name="" descr="Chat bubble outline"/>
+        </a:ext>
+      </dgm:extLst>
+    </dgm:pt>
+    <dgm:pt modelId="{9C2A1D16-AF21-4A8B-9315-A46500145626}" type="pres">
+      <dgm:prSet presAssocID="{6BD8ECE1-1BED-4B55-97A8-EE87372C8F48}" presName="spaceRect" presStyleCnt="0"/>
+      <dgm:spPr/>
+    </dgm:pt>
+    <dgm:pt modelId="{74C08365-20D4-49AA-B754-FD23414E00E4}" type="pres">
+      <dgm:prSet presAssocID="{6BD8ECE1-1BED-4B55-97A8-EE87372C8F48}" presName="textRect" presStyleLbl="revTx" presStyleIdx="1" presStyleCnt="4">
+        <dgm:presLayoutVars>
+          <dgm:chMax val="1"/>
+          <dgm:chPref val="1"/>
+        </dgm:presLayoutVars>
+      </dgm:prSet>
+      <dgm:spPr/>
+    </dgm:pt>
+    <dgm:pt modelId="{E1F13C98-0F07-4EFE-8256-03EC82690FDE}" type="pres">
+      <dgm:prSet presAssocID="{91D6B966-B851-4F3D-B4C6-DC61AE6F2548}" presName="sibTrans" presStyleLbl="sibTrans2D1" presStyleIdx="0" presStyleCnt="0"/>
+      <dgm:spPr/>
+    </dgm:pt>
+    <dgm:pt modelId="{5E3D308C-7E49-4388-9FB4-98E36256F61A}" type="pres">
+      <dgm:prSet presAssocID="{7CE082B0-1A6D-47F3-98CF-2C501C5611CD}" presName="compNode" presStyleCnt="0"/>
+      <dgm:spPr/>
+    </dgm:pt>
+    <dgm:pt modelId="{FC7AC7F0-84BF-4017-84A1-3ACBA8BC2C7D}" type="pres">
+      <dgm:prSet presAssocID="{7CE082B0-1A6D-47F3-98CF-2C501C5611CD}" presName="iconBgRect" presStyleLbl="bgShp" presStyleIdx="2" presStyleCnt="4"/>
+      <dgm:spPr/>
+    </dgm:pt>
+    <dgm:pt modelId="{374D5350-0D18-4009-8143-A30EB051F645}" type="pres">
+      <dgm:prSet presAssocID="{7CE082B0-1A6D-47F3-98CF-2C501C5611CD}" presName="iconRect" presStyleLbl="node1" presStyleIdx="2" presStyleCnt="4"/>
+      <dgm:spPr>
+        <a:blipFill>
+          <a:blip xmlns:r="http://schemas.openxmlformats.org/officeDocument/2006/relationships" r:embed="rId5">
+            <a:extLst>
+              <a:ext uri="{96DAC541-7B7A-43D3-8B79-37D633B846F1}">
+                <asvg:svgBlip xmlns:asvg="http://schemas.microsoft.com/office/drawing/2016/SVG/main" r:embed="rId6"/>
+              </a:ext>
+            </a:extLst>
+          </a:blip>
+          <a:srcRect/>
+          <a:stretch>
+            <a:fillRect/>
+          </a:stretch>
+        </a:blipFill>
+        <a:ln>
+          <a:noFill/>
+        </a:ln>
+      </dgm:spPr>
+      <dgm:extLst>
+        <a:ext uri="{E40237B7-FDA0-4F09-8148-C483321AD2D9}">
+          <dgm14:cNvPr xmlns:dgm14="http://schemas.microsoft.com/office/drawing/2010/diagram" id="0" name="" descr="Walk outline"/>
+        </a:ext>
+      </dgm:extLst>
+    </dgm:pt>
+    <dgm:pt modelId="{8764E400-3CFF-4CA0-99A5-C46681F76C7E}" type="pres">
+      <dgm:prSet presAssocID="{7CE082B0-1A6D-47F3-98CF-2C501C5611CD}" presName="spaceRect" presStyleCnt="0"/>
+      <dgm:spPr/>
+    </dgm:pt>
+    <dgm:pt modelId="{95F63F83-09FB-4B8B-9B8A-8758F6659DA2}" type="pres">
+      <dgm:prSet presAssocID="{7CE082B0-1A6D-47F3-98CF-2C501C5611CD}" presName="textRect" presStyleLbl="revTx" presStyleIdx="2" presStyleCnt="4">
+        <dgm:presLayoutVars>
+          <dgm:chMax val="1"/>
+          <dgm:chPref val="1"/>
+        </dgm:presLayoutVars>
+      </dgm:prSet>
+      <dgm:spPr/>
+    </dgm:pt>
+    <dgm:pt modelId="{CB259BAE-5FAD-4CFF-9AB5-B49FE82A2BE0}" type="pres">
+      <dgm:prSet presAssocID="{461DE2AC-DDF5-4324-86AE-C1CBAEDFE7AB}" presName="sibTrans" presStyleLbl="sibTrans2D1" presStyleIdx="0" presStyleCnt="0"/>
+      <dgm:spPr/>
+    </dgm:pt>
+    <dgm:pt modelId="{36EADDA3-2951-4D4C-B595-61321FD3E144}" type="pres">
+      <dgm:prSet presAssocID="{FD068EA9-B950-4B4F-A875-A5A91B97E204}" presName="compNode" presStyleCnt="0"/>
+      <dgm:spPr/>
+    </dgm:pt>
+    <dgm:pt modelId="{AF5C540F-ED4F-4C8D-BE36-29BE43ACE0A8}" type="pres">
+      <dgm:prSet presAssocID="{FD068EA9-B950-4B4F-A875-A5A91B97E204}" presName="iconBgRect" presStyleLbl="bgShp" presStyleIdx="3" presStyleCnt="4"/>
+      <dgm:spPr/>
+    </dgm:pt>
+    <dgm:pt modelId="{C5EA69CA-9215-4384-88F1-AAD8438B3B62}" type="pres">
+      <dgm:prSet presAssocID="{FD068EA9-B950-4B4F-A875-A5A91B97E204}" presName="iconRect" presStyleLbl="node1" presStyleIdx="3" presStyleCnt="4"/>
+      <dgm:spPr>
+        <a:blipFill>
+          <a:blip xmlns:r="http://schemas.openxmlformats.org/officeDocument/2006/relationships" r:embed="rId7">
+            <a:extLst>
+              <a:ext uri="{96DAC541-7B7A-43D3-8B79-37D633B846F1}">
+                <asvg:svgBlip xmlns:asvg="http://schemas.microsoft.com/office/drawing/2016/SVG/main" r:embed="rId8"/>
+              </a:ext>
+            </a:extLst>
+          </a:blip>
+          <a:srcRect/>
+          <a:stretch>
+            <a:fillRect/>
+          </a:stretch>
+        </a:blipFill>
+        <a:ln>
+          <a:noFill/>
+        </a:ln>
+      </dgm:spPr>
+      <dgm:extLst>
+        <a:ext uri="{E40237B7-FDA0-4F09-8148-C483321AD2D9}">
+          <dgm14:cNvPr xmlns:dgm14="http://schemas.microsoft.com/office/drawing/2010/diagram" id="0" name="" descr="Handshake outline"/>
+        </a:ext>
+      </dgm:extLst>
+    </dgm:pt>
+    <dgm:pt modelId="{5F4F36C2-DD20-405A-8709-F5873631F88C}" type="pres">
+      <dgm:prSet presAssocID="{FD068EA9-B950-4B4F-A875-A5A91B97E204}" presName="spaceRect" presStyleCnt="0"/>
+      <dgm:spPr/>
+    </dgm:pt>
+    <dgm:pt modelId="{696D6B2D-CE15-47C4-BB14-934DD62A561D}" type="pres">
+      <dgm:prSet presAssocID="{FD068EA9-B950-4B4F-A875-A5A91B97E204}" presName="textRect" presStyleLbl="revTx" presStyleIdx="3" presStyleCnt="4">
+        <dgm:presLayoutVars>
+          <dgm:chMax val="1"/>
+          <dgm:chPref val="1"/>
+        </dgm:presLayoutVars>
+      </dgm:prSet>
+      <dgm:spPr/>
+    </dgm:pt>
+  </dgm:ptLst>
+  <dgm:cxnLst>
+    <dgm:cxn modelId="{6CB6260B-0425-470F-98DA-A203EDA00C93}" srcId="{55504BFB-F29B-45DE-A291-FC668635DC72}" destId="{7CE082B0-1A6D-47F3-98CF-2C501C5611CD}" srcOrd="2" destOrd="0" parTransId="{F8792DD3-2229-458C-8D5B-0FFCD7C492DF}" sibTransId="{461DE2AC-DDF5-4324-86AE-C1CBAEDFE7AB}"/>
+    <dgm:cxn modelId="{AD946A1A-44B3-4191-8E4F-E710C51EFD72}" srcId="{55504BFB-F29B-45DE-A291-FC668635DC72}" destId="{778EAC78-5C4E-404D-9D79-DB84DBDFD55E}" srcOrd="0" destOrd="0" parTransId="{A7EFBAAD-3C5C-4E39-A4CC-3872B23D3E57}" sibTransId="{9F531577-E2A1-4F77-A078-A4AD85E565CA}"/>
+    <dgm:cxn modelId="{5283DA39-BDF9-4522-833F-06AA22A94A77}" srcId="{55504BFB-F29B-45DE-A291-FC668635DC72}" destId="{FD068EA9-B950-4B4F-A875-A5A91B97E204}" srcOrd="3" destOrd="0" parTransId="{CD800455-1F9C-4D71-A491-C32EFE9DFD34}" sibTransId="{E5F58589-32AE-40EE-AF90-3E36522347D6}"/>
+    <dgm:cxn modelId="{6CBAAE66-6F40-4392-9D15-CC4EFC442EC1}" type="presOf" srcId="{9F531577-E2A1-4F77-A078-A4AD85E565CA}" destId="{621CF756-1C03-42A2-97B8-49295279BF8F}" srcOrd="0" destOrd="0" presId="urn:microsoft.com/office/officeart/2018/2/layout/IconCircleList"/>
+    <dgm:cxn modelId="{5A1FA871-57BE-4ACE-AFDF-4A6CC11698BF}" type="presOf" srcId="{55504BFB-F29B-45DE-A291-FC668635DC72}" destId="{A7919174-B3A7-4AD2-A910-621F61066E72}" srcOrd="0" destOrd="0" presId="urn:microsoft.com/office/officeart/2018/2/layout/IconCircleList"/>
+    <dgm:cxn modelId="{C404A058-457C-49E6-B9B8-A2A739934DD6}" type="presOf" srcId="{FD068EA9-B950-4B4F-A875-A5A91B97E204}" destId="{696D6B2D-CE15-47C4-BB14-934DD62A561D}" srcOrd="0" destOrd="0" presId="urn:microsoft.com/office/officeart/2018/2/layout/IconCircleList"/>
+    <dgm:cxn modelId="{22767797-4CE9-42E5-9106-75D4211E3198}" type="presOf" srcId="{6BD8ECE1-1BED-4B55-97A8-EE87372C8F48}" destId="{74C08365-20D4-49AA-B754-FD23414E00E4}" srcOrd="0" destOrd="0" presId="urn:microsoft.com/office/officeart/2018/2/layout/IconCircleList"/>
+    <dgm:cxn modelId="{FCBC55C0-1DE1-4502-80C7-C7F235EB9F46}" type="presOf" srcId="{91D6B966-B851-4F3D-B4C6-DC61AE6F2548}" destId="{E1F13C98-0F07-4EFE-8256-03EC82690FDE}" srcOrd="0" destOrd="0" presId="urn:microsoft.com/office/officeart/2018/2/layout/IconCircleList"/>
+    <dgm:cxn modelId="{0EAAD1D4-F4E6-44C8-B223-85E5C93B5C87}" type="presOf" srcId="{778EAC78-5C4E-404D-9D79-DB84DBDFD55E}" destId="{AB5F4A47-AB38-482D-B9CF-306BF44EFDE7}" srcOrd="0" destOrd="0" presId="urn:microsoft.com/office/officeart/2018/2/layout/IconCircleList"/>
+    <dgm:cxn modelId="{5F7296DE-6AAC-4B51-BC0E-9C1D8ED75614}" srcId="{55504BFB-F29B-45DE-A291-FC668635DC72}" destId="{6BD8ECE1-1BED-4B55-97A8-EE87372C8F48}" srcOrd="1" destOrd="0" parTransId="{3CE8D753-7367-4DD7-8749-F3C35489853A}" sibTransId="{91D6B966-B851-4F3D-B4C6-DC61AE6F2548}"/>
+    <dgm:cxn modelId="{9D3888E7-1F31-495B-B5EF-796EB41F6B4A}" type="presOf" srcId="{7CE082B0-1A6D-47F3-98CF-2C501C5611CD}" destId="{95F63F83-09FB-4B8B-9B8A-8758F6659DA2}" srcOrd="0" destOrd="0" presId="urn:microsoft.com/office/officeart/2018/2/layout/IconCircleList"/>
+    <dgm:cxn modelId="{0C8051F5-8B31-4B68-AA4B-30C9DF895270}" type="presOf" srcId="{461DE2AC-DDF5-4324-86AE-C1CBAEDFE7AB}" destId="{CB259BAE-5FAD-4CFF-9AB5-B49FE82A2BE0}" srcOrd="0" destOrd="0" presId="urn:microsoft.com/office/officeart/2018/2/layout/IconCircleList"/>
+    <dgm:cxn modelId="{0BA89CFD-46C4-418F-A8DB-53BF8BCC5336}" type="presParOf" srcId="{A7919174-B3A7-4AD2-A910-621F61066E72}" destId="{1E89A735-378B-4362-8276-D7751D875052}" srcOrd="0" destOrd="0" presId="urn:microsoft.com/office/officeart/2018/2/layout/IconCircleList"/>
+    <dgm:cxn modelId="{3FCFEA6A-9E37-4A7A-81C4-C37F58A4BA74}" type="presParOf" srcId="{1E89A735-378B-4362-8276-D7751D875052}" destId="{CE53D0A8-4B8C-4884-B62C-4F0B764661C0}" srcOrd="0" destOrd="0" presId="urn:microsoft.com/office/officeart/2018/2/layout/IconCircleList"/>
+    <dgm:cxn modelId="{7E741A96-D74A-4394-8080-1CEF627D5429}" type="presParOf" srcId="{CE53D0A8-4B8C-4884-B62C-4F0B764661C0}" destId="{345A990F-BED3-4157-A449-7D4FECE6C339}" srcOrd="0" destOrd="0" presId="urn:microsoft.com/office/officeart/2018/2/layout/IconCircleList"/>
+    <dgm:cxn modelId="{4D591051-2F23-4E2C-AE65-AC05ACA6E634}" type="presParOf" srcId="{CE53D0A8-4B8C-4884-B62C-4F0B764661C0}" destId="{03AF5E35-6C6B-4C8C-9DB2-D9EBBC3D90B0}" srcOrd="1" destOrd="0" presId="urn:microsoft.com/office/officeart/2018/2/layout/IconCircleList"/>
+    <dgm:cxn modelId="{A0A6C54B-D120-4859-93E1-137C0EC8F73A}" type="presParOf" srcId="{CE53D0A8-4B8C-4884-B62C-4F0B764661C0}" destId="{0EFD678F-A551-4482-8AC1-1D7CB96C3794}" srcOrd="2" destOrd="0" presId="urn:microsoft.com/office/officeart/2018/2/layout/IconCircleList"/>
+    <dgm:cxn modelId="{AE24332C-D2CB-46CD-AD87-1A5B7F820ADB}" type="presParOf" srcId="{CE53D0A8-4B8C-4884-B62C-4F0B764661C0}" destId="{AB5F4A47-AB38-482D-B9CF-306BF44EFDE7}" srcOrd="3" destOrd="0" presId="urn:microsoft.com/office/officeart/2018/2/layout/IconCircleList"/>
+    <dgm:cxn modelId="{2E0B7E82-D542-4D9D-981C-18001A86D219}" type="presParOf" srcId="{1E89A735-378B-4362-8276-D7751D875052}" destId="{621CF756-1C03-42A2-97B8-49295279BF8F}" srcOrd="1" destOrd="0" presId="urn:microsoft.com/office/officeart/2018/2/layout/IconCircleList"/>
+    <dgm:cxn modelId="{2E1E5C93-7A7C-40B5-8186-60ED460220B3}" type="presParOf" srcId="{1E89A735-378B-4362-8276-D7751D875052}" destId="{4D1B44E2-071D-436D-91BC-9085C86365E7}" srcOrd="2" destOrd="0" presId="urn:microsoft.com/office/officeart/2018/2/layout/IconCircleList"/>
+    <dgm:cxn modelId="{7B8ED747-1423-4ADD-8256-393FA029B6DE}" type="presParOf" srcId="{4D1B44E2-071D-436D-91BC-9085C86365E7}" destId="{7EFACD28-FD14-4BB1-BCEB-FE3301AB8A9B}" srcOrd="0" destOrd="0" presId="urn:microsoft.com/office/officeart/2018/2/layout/IconCircleList"/>
+    <dgm:cxn modelId="{269B4AED-0862-4E7A-8E02-A53B010FA148}" type="presParOf" srcId="{4D1B44E2-071D-436D-91BC-9085C86365E7}" destId="{94490D6E-8191-41DB-A2CC-3BC1A7172D4A}" srcOrd="1" destOrd="0" presId="urn:microsoft.com/office/officeart/2018/2/layout/IconCircleList"/>
+    <dgm:cxn modelId="{5242644B-4FFF-48B9-8174-1E7333A4B9F8}" type="presParOf" srcId="{4D1B44E2-071D-436D-91BC-9085C86365E7}" destId="{9C2A1D16-AF21-4A8B-9315-A46500145626}" srcOrd="2" destOrd="0" presId="urn:microsoft.com/office/officeart/2018/2/layout/IconCircleList"/>
+    <dgm:cxn modelId="{AAE7BEDB-8A16-4405-BEF0-FDD81B301CF0}" type="presParOf" srcId="{4D1B44E2-071D-436D-91BC-9085C86365E7}" destId="{74C08365-20D4-49AA-B754-FD23414E00E4}" srcOrd="3" destOrd="0" presId="urn:microsoft.com/office/officeart/2018/2/layout/IconCircleList"/>
+    <dgm:cxn modelId="{3FB99060-5939-40A0-A94D-797E4BE0A9D4}" type="presParOf" srcId="{1E89A735-378B-4362-8276-D7751D875052}" destId="{E1F13C98-0F07-4EFE-8256-03EC82690FDE}" srcOrd="3" destOrd="0" presId="urn:microsoft.com/office/officeart/2018/2/layout/IconCircleList"/>
+    <dgm:cxn modelId="{E749B76D-93FE-4EC3-BFE4-F65FEF219868}" type="presParOf" srcId="{1E89A735-378B-4362-8276-D7751D875052}" destId="{5E3D308C-7E49-4388-9FB4-98E36256F61A}" srcOrd="4" destOrd="0" presId="urn:microsoft.com/office/officeart/2018/2/layout/IconCircleList"/>
+    <dgm:cxn modelId="{E0CA1D2F-F73C-4E26-91F1-008B3CCCA3AF}" type="presParOf" srcId="{5E3D308C-7E49-4388-9FB4-98E36256F61A}" destId="{FC7AC7F0-84BF-4017-84A1-3ACBA8BC2C7D}" srcOrd="0" destOrd="0" presId="urn:microsoft.com/office/officeart/2018/2/layout/IconCircleList"/>
+    <dgm:cxn modelId="{C3AE42F9-977E-4765-9AF9-4E2BD631C4E9}" type="presParOf" srcId="{5E3D308C-7E49-4388-9FB4-98E36256F61A}" destId="{374D5350-0D18-4009-8143-A30EB051F645}" srcOrd="1" destOrd="0" presId="urn:microsoft.com/office/officeart/2018/2/layout/IconCircleList"/>
+    <dgm:cxn modelId="{24B493A1-13FD-49B4-A223-959F1F6261C4}" type="presParOf" srcId="{5E3D308C-7E49-4388-9FB4-98E36256F61A}" destId="{8764E400-3CFF-4CA0-99A5-C46681F76C7E}" srcOrd="2" destOrd="0" presId="urn:microsoft.com/office/officeart/2018/2/layout/IconCircleList"/>
+    <dgm:cxn modelId="{81B153AE-1666-410F-BBC1-2DC510437098}" type="presParOf" srcId="{5E3D308C-7E49-4388-9FB4-98E36256F61A}" destId="{95F63F83-09FB-4B8B-9B8A-8758F6659DA2}" srcOrd="3" destOrd="0" presId="urn:microsoft.com/office/officeart/2018/2/layout/IconCircleList"/>
+    <dgm:cxn modelId="{BB211FC8-AD91-41F2-AA1F-C7D9E020EE56}" type="presParOf" srcId="{1E89A735-378B-4362-8276-D7751D875052}" destId="{CB259BAE-5FAD-4CFF-9AB5-B49FE82A2BE0}" srcOrd="5" destOrd="0" presId="urn:microsoft.com/office/officeart/2018/2/layout/IconCircleList"/>
+    <dgm:cxn modelId="{010942FD-A443-4AEA-BF4C-1EDA155EC554}" type="presParOf" srcId="{1E89A735-378B-4362-8276-D7751D875052}" destId="{36EADDA3-2951-4D4C-B595-61321FD3E144}" srcOrd="6" destOrd="0" presId="urn:microsoft.com/office/officeart/2018/2/layout/IconCircleList"/>
+    <dgm:cxn modelId="{0AFC64A3-0EA6-4E04-BDB0-BDA8337D5B97}" type="presParOf" srcId="{36EADDA3-2951-4D4C-B595-61321FD3E144}" destId="{AF5C540F-ED4F-4C8D-BE36-29BE43ACE0A8}" srcOrd="0" destOrd="0" presId="urn:microsoft.com/office/officeart/2018/2/layout/IconCircleList"/>
+    <dgm:cxn modelId="{9913E654-749D-4551-9A29-04600A6CFE74}" type="presParOf" srcId="{36EADDA3-2951-4D4C-B595-61321FD3E144}" destId="{C5EA69CA-9215-4384-88F1-AAD8438B3B62}" srcOrd="1" destOrd="0" presId="urn:microsoft.com/office/officeart/2018/2/layout/IconCircleList"/>
+    <dgm:cxn modelId="{F866766D-1456-4E44-A077-681F4939FE26}" type="presParOf" srcId="{36EADDA3-2951-4D4C-B595-61321FD3E144}" destId="{5F4F36C2-DD20-405A-8709-F5873631F88C}" srcOrd="2" destOrd="0" presId="urn:microsoft.com/office/officeart/2018/2/layout/IconCircleList"/>
+    <dgm:cxn modelId="{E9DA731C-72C2-4429-BD76-3737FB2A18F5}" type="presParOf" srcId="{36EADDA3-2951-4D4C-B595-61321FD3E144}" destId="{696D6B2D-CE15-47C4-BB14-934DD62A561D}" srcOrd="3" destOrd="0" presId="urn:microsoft.com/office/officeart/2018/2/layout/IconCircleList"/>
+  </dgm:cxnLst>
+  <dgm:bg/>
+  <dgm:whole/>
+  <dgm:extLst>
+    <a:ext uri="http://schemas.microsoft.com/office/drawing/2008/diagram">
+      <dsp:dataModelExt xmlns:dsp="http://schemas.microsoft.com/office/drawing/2008/diagram" relId="rId8" minVer="http://schemas.openxmlformats.org/drawingml/2006/diagram"/>
+    </a:ext>
+  </dgm:extLst>
+</dgm:dataModel>
+</file>
+
+<file path=ppt/diagrams/data4.xml><?xml version="1.0" encoding="utf-8"?>
+<dgm:dataModel xmlns:dgm="http://schemas.openxmlformats.org/drawingml/2006/diagram" xmlns:a="http://schemas.openxmlformats.org/drawingml/2006/main">
+  <dgm:ptLst>
     <dgm:pt modelId="{F5F214FF-5973-49EF-830E-D4879E417398}" type="doc">
       <dgm:prSet loTypeId="urn:microsoft.com/office/officeart/2018/2/layout/IconCircleList" loCatId="icon" qsTypeId="urn:microsoft.com/office/officeart/2005/8/quickstyle/simple1" qsCatId="simple" csTypeId="urn:microsoft.com/office/officeart/2005/8/colors/accent1_2" csCatId="accent1" phldr="1"/>
       <dgm:spPr/>
@@ -5130,7 +6527,7 @@
 </dgm:dataModel>
 </file>
 
-<file path=ppt/diagrams/data4.xml><?xml version="1.0" encoding="utf-8"?>
+<file path=ppt/diagrams/data5.xml><?xml version="1.0" encoding="utf-8"?>
 <dgm:dataModel xmlns:dgm="http://schemas.openxmlformats.org/drawingml/2006/diagram" xmlns:a="http://schemas.openxmlformats.org/drawingml/2006/main">
   <dgm:ptLst>
     <dgm:pt modelId="{55504BFB-F29B-45DE-A291-FC668635DC72}" type="doc">
@@ -6592,6 +7989,606 @@
       <dsp:cNvGrpSpPr/>
     </dsp:nvGrpSpPr>
     <dsp:grpSpPr/>
+    <dsp:sp modelId="{345A990F-BED3-4157-A449-7D4FECE6C339}">
+      <dsp:nvSpPr>
+        <dsp:cNvPr id="0" name=""/>
+        <dsp:cNvSpPr/>
+      </dsp:nvSpPr>
+      <dsp:spPr>
+        <a:xfrm>
+          <a:off x="282221" y="368029"/>
+          <a:ext cx="1371985" cy="1371985"/>
+        </a:xfrm>
+        <a:prstGeom prst="ellipse">
+          <a:avLst/>
+        </a:prstGeom>
+        <a:solidFill>
+          <a:schemeClr val="accent2">
+            <a:hueOff val="0"/>
+            <a:satOff val="0"/>
+            <a:lumOff val="0"/>
+            <a:alphaOff val="0"/>
+          </a:schemeClr>
+        </a:solidFill>
+        <a:ln>
+          <a:noFill/>
+        </a:ln>
+        <a:effectLst/>
+      </dsp:spPr>
+      <dsp:style>
+        <a:lnRef idx="0">
+          <a:scrgbClr r="0" g="0" b="0"/>
+        </a:lnRef>
+        <a:fillRef idx="1">
+          <a:scrgbClr r="0" g="0" b="0"/>
+        </a:fillRef>
+        <a:effectRef idx="0">
+          <a:scrgbClr r="0" g="0" b="0"/>
+        </a:effectRef>
+        <a:fontRef idx="minor"/>
+      </dsp:style>
+    </dsp:sp>
+    <dsp:sp modelId="{03AF5E35-6C6B-4C8C-9DB2-D9EBBC3D90B0}">
+      <dsp:nvSpPr>
+        <dsp:cNvPr id="0" name=""/>
+        <dsp:cNvSpPr/>
+      </dsp:nvSpPr>
+      <dsp:spPr>
+        <a:xfrm>
+          <a:off x="570337" y="616533"/>
+          <a:ext cx="795751" cy="795751"/>
+        </a:xfrm>
+        <a:prstGeom prst="rect">
+          <a:avLst/>
+        </a:prstGeom>
+        <a:blipFill>
+          <a:blip xmlns:r="http://schemas.openxmlformats.org/officeDocument/2006/relationships" r:embed="rId1">
+            <a:extLst>
+              <a:ext uri="{96DAC541-7B7A-43D3-8B79-37D633B846F1}">
+                <asvg:svgBlip xmlns:asvg="http://schemas.microsoft.com/office/drawing/2016/SVG/main" r:embed="rId2"/>
+              </a:ext>
+            </a:extLst>
+          </a:blip>
+          <a:srcRect/>
+          <a:stretch>
+            <a:fillRect/>
+          </a:stretch>
+        </a:blipFill>
+        <a:ln w="19050" cap="flat" cmpd="sng" algn="ctr">
+          <a:noFill/>
+          <a:prstDash val="solid"/>
+          <a:miter lim="800000"/>
+        </a:ln>
+        <a:effectLst/>
+      </dsp:spPr>
+      <dsp:style>
+        <a:lnRef idx="2">
+          <a:scrgbClr r="0" g="0" b="0"/>
+        </a:lnRef>
+        <a:fillRef idx="1">
+          <a:scrgbClr r="0" g="0" b="0"/>
+        </a:fillRef>
+        <a:effectRef idx="0">
+          <a:scrgbClr r="0" g="0" b="0"/>
+        </a:effectRef>
+        <a:fontRef idx="minor">
+          <a:schemeClr val="lt1"/>
+        </a:fontRef>
+      </dsp:style>
+    </dsp:sp>
+    <dsp:sp modelId="{AB5F4A47-AB38-482D-B9CF-306BF44EFDE7}">
+      <dsp:nvSpPr>
+        <dsp:cNvPr id="0" name=""/>
+        <dsp:cNvSpPr/>
+      </dsp:nvSpPr>
+      <dsp:spPr>
+        <a:xfrm>
+          <a:off x="1948202" y="368029"/>
+          <a:ext cx="3233964" cy="1371985"/>
+        </a:xfrm>
+        <a:prstGeom prst="rect">
+          <a:avLst/>
+        </a:prstGeom>
+        <a:noFill/>
+        <a:ln>
+          <a:noFill/>
+        </a:ln>
+        <a:effectLst/>
+      </dsp:spPr>
+      <dsp:style>
+        <a:lnRef idx="0">
+          <a:scrgbClr r="0" g="0" b="0"/>
+        </a:lnRef>
+        <a:fillRef idx="0">
+          <a:scrgbClr r="0" g="0" b="0"/>
+        </a:fillRef>
+        <a:effectRef idx="0">
+          <a:scrgbClr r="0" g="0" b="0"/>
+        </a:effectRef>
+        <a:fontRef idx="minor"/>
+      </dsp:style>
+      <dsp:txBody>
+        <a:bodyPr spcFirstLastPara="0" vert="horz" wrap="square" lIns="0" tIns="0" rIns="0" bIns="0" numCol="1" spcCol="1270" anchor="ctr" anchorCtr="0">
+          <a:noAutofit/>
+        </a:bodyPr>
+        <a:lstStyle/>
+        <a:p>
+          <a:pPr marL="0" lvl="0" indent="0" algn="l" defTabSz="1066800">
+            <a:lnSpc>
+              <a:spcPct val="100000"/>
+            </a:lnSpc>
+            <a:spcBef>
+              <a:spcPct val="0"/>
+            </a:spcBef>
+            <a:spcAft>
+              <a:spcPct val="35000"/>
+            </a:spcAft>
+            <a:buNone/>
+          </a:pPr>
+          <a:r>
+            <a:rPr lang="en-US" sz="2400" i="0" kern="1200" dirty="0"/>
+            <a:t>The importance of incorporating tasks into a consistent schedule.</a:t>
+          </a:r>
+        </a:p>
+      </dsp:txBody>
+      <dsp:txXfrm>
+        <a:off x="1948202" y="368029"/>
+        <a:ext cx="3233964" cy="1371985"/>
+      </dsp:txXfrm>
+    </dsp:sp>
+    <dsp:sp modelId="{7EFACD28-FD14-4BB1-BCEB-FE3301AB8A9B}">
+      <dsp:nvSpPr>
+        <dsp:cNvPr id="0" name=""/>
+        <dsp:cNvSpPr/>
+      </dsp:nvSpPr>
+      <dsp:spPr>
+        <a:xfrm>
+          <a:off x="5745661" y="368029"/>
+          <a:ext cx="1371985" cy="1371985"/>
+        </a:xfrm>
+        <a:prstGeom prst="ellipse">
+          <a:avLst/>
+        </a:prstGeom>
+        <a:solidFill>
+          <a:schemeClr val="accent3">
+            <a:hueOff val="0"/>
+            <a:satOff val="0"/>
+            <a:lumOff val="0"/>
+            <a:alphaOff val="0"/>
+          </a:schemeClr>
+        </a:solidFill>
+        <a:ln>
+          <a:noFill/>
+        </a:ln>
+        <a:effectLst/>
+      </dsp:spPr>
+      <dsp:style>
+        <a:lnRef idx="0">
+          <a:scrgbClr r="0" g="0" b="0"/>
+        </a:lnRef>
+        <a:fillRef idx="1">
+          <a:scrgbClr r="0" g="0" b="0"/>
+        </a:fillRef>
+        <a:effectRef idx="0">
+          <a:scrgbClr r="0" g="0" b="0"/>
+        </a:effectRef>
+        <a:fontRef idx="minor"/>
+      </dsp:style>
+    </dsp:sp>
+    <dsp:sp modelId="{94490D6E-8191-41DB-A2CC-3BC1A7172D4A}">
+      <dsp:nvSpPr>
+        <dsp:cNvPr id="0" name=""/>
+        <dsp:cNvSpPr/>
+      </dsp:nvSpPr>
+      <dsp:spPr>
+        <a:xfrm>
+          <a:off x="6033778" y="656145"/>
+          <a:ext cx="795751" cy="795751"/>
+        </a:xfrm>
+        <a:prstGeom prst="rect">
+          <a:avLst/>
+        </a:prstGeom>
+        <a:blipFill>
+          <a:blip xmlns:r="http://schemas.openxmlformats.org/officeDocument/2006/relationships" r:embed="rId3">
+            <a:extLst>
+              <a:ext uri="{96DAC541-7B7A-43D3-8B79-37D633B846F1}">
+                <asvg:svgBlip xmlns:asvg="http://schemas.microsoft.com/office/drawing/2016/SVG/main" r:embed="rId4"/>
+              </a:ext>
+            </a:extLst>
+          </a:blip>
+          <a:srcRect/>
+          <a:stretch>
+            <a:fillRect/>
+          </a:stretch>
+        </a:blipFill>
+        <a:ln w="19050" cap="flat" cmpd="sng" algn="ctr">
+          <a:noFill/>
+          <a:prstDash val="solid"/>
+          <a:miter lim="800000"/>
+        </a:ln>
+        <a:effectLst/>
+      </dsp:spPr>
+      <dsp:style>
+        <a:lnRef idx="2">
+          <a:scrgbClr r="0" g="0" b="0"/>
+        </a:lnRef>
+        <a:fillRef idx="1">
+          <a:scrgbClr r="0" g="0" b="0"/>
+        </a:fillRef>
+        <a:effectRef idx="0">
+          <a:scrgbClr r="0" g="0" b="0"/>
+        </a:effectRef>
+        <a:fontRef idx="minor">
+          <a:schemeClr val="lt1"/>
+        </a:fontRef>
+      </dsp:style>
+    </dsp:sp>
+    <dsp:sp modelId="{74C08365-20D4-49AA-B754-FD23414E00E4}">
+      <dsp:nvSpPr>
+        <dsp:cNvPr id="0" name=""/>
+        <dsp:cNvSpPr/>
+      </dsp:nvSpPr>
+      <dsp:spPr>
+        <a:xfrm>
+          <a:off x="7411643" y="368029"/>
+          <a:ext cx="3233964" cy="1371985"/>
+        </a:xfrm>
+        <a:prstGeom prst="rect">
+          <a:avLst/>
+        </a:prstGeom>
+        <a:noFill/>
+        <a:ln>
+          <a:noFill/>
+        </a:ln>
+        <a:effectLst/>
+      </dsp:spPr>
+      <dsp:style>
+        <a:lnRef idx="0">
+          <a:scrgbClr r="0" g="0" b="0"/>
+        </a:lnRef>
+        <a:fillRef idx="0">
+          <a:scrgbClr r="0" g="0" b="0"/>
+        </a:fillRef>
+        <a:effectRef idx="0">
+          <a:scrgbClr r="0" g="0" b="0"/>
+        </a:effectRef>
+        <a:fontRef idx="minor"/>
+      </dsp:style>
+      <dsp:txBody>
+        <a:bodyPr spcFirstLastPara="0" vert="horz" wrap="square" lIns="0" tIns="0" rIns="0" bIns="0" numCol="1" spcCol="1270" anchor="ctr" anchorCtr="0">
+          <a:noAutofit/>
+        </a:bodyPr>
+        <a:lstStyle/>
+        <a:p>
+          <a:pPr marL="0" lvl="0" indent="0" algn="l" defTabSz="1066800">
+            <a:lnSpc>
+              <a:spcPct val="100000"/>
+            </a:lnSpc>
+            <a:spcBef>
+              <a:spcPct val="0"/>
+            </a:spcBef>
+            <a:spcAft>
+              <a:spcPct val="35000"/>
+            </a:spcAft>
+            <a:buNone/>
+          </a:pPr>
+          <a:r>
+            <a:rPr lang="en-US" sz="2400" kern="1200" dirty="0"/>
+            <a:t>Communication is a primary part of teamwork.</a:t>
+          </a:r>
+        </a:p>
+      </dsp:txBody>
+      <dsp:txXfrm>
+        <a:off x="7411643" y="368029"/>
+        <a:ext cx="3233964" cy="1371985"/>
+      </dsp:txXfrm>
+    </dsp:sp>
+    <dsp:sp modelId="{FC7AC7F0-84BF-4017-84A1-3ACBA8BC2C7D}">
+      <dsp:nvSpPr>
+        <dsp:cNvPr id="0" name=""/>
+        <dsp:cNvSpPr/>
+      </dsp:nvSpPr>
+      <dsp:spPr>
+        <a:xfrm>
+          <a:off x="282221" y="2452790"/>
+          <a:ext cx="1371985" cy="1371985"/>
+        </a:xfrm>
+        <a:prstGeom prst="ellipse">
+          <a:avLst/>
+        </a:prstGeom>
+        <a:solidFill>
+          <a:schemeClr val="accent4">
+            <a:hueOff val="0"/>
+            <a:satOff val="0"/>
+            <a:lumOff val="0"/>
+            <a:alphaOff val="0"/>
+          </a:schemeClr>
+        </a:solidFill>
+        <a:ln>
+          <a:noFill/>
+        </a:ln>
+        <a:effectLst/>
+      </dsp:spPr>
+      <dsp:style>
+        <a:lnRef idx="0">
+          <a:scrgbClr r="0" g="0" b="0"/>
+        </a:lnRef>
+        <a:fillRef idx="1">
+          <a:scrgbClr r="0" g="0" b="0"/>
+        </a:fillRef>
+        <a:effectRef idx="0">
+          <a:scrgbClr r="0" g="0" b="0"/>
+        </a:effectRef>
+        <a:fontRef idx="minor"/>
+      </dsp:style>
+    </dsp:sp>
+    <dsp:sp modelId="{374D5350-0D18-4009-8143-A30EB051F645}">
+      <dsp:nvSpPr>
+        <dsp:cNvPr id="0" name=""/>
+        <dsp:cNvSpPr/>
+      </dsp:nvSpPr>
+      <dsp:spPr>
+        <a:xfrm>
+          <a:off x="570337" y="2740907"/>
+          <a:ext cx="795751" cy="795751"/>
+        </a:xfrm>
+        <a:prstGeom prst="rect">
+          <a:avLst/>
+        </a:prstGeom>
+        <a:blipFill>
+          <a:blip xmlns:r="http://schemas.openxmlformats.org/officeDocument/2006/relationships" r:embed="rId5">
+            <a:extLst>
+              <a:ext uri="{96DAC541-7B7A-43D3-8B79-37D633B846F1}">
+                <asvg:svgBlip xmlns:asvg="http://schemas.microsoft.com/office/drawing/2016/SVG/main" r:embed="rId6"/>
+              </a:ext>
+            </a:extLst>
+          </a:blip>
+          <a:srcRect/>
+          <a:stretch>
+            <a:fillRect/>
+          </a:stretch>
+        </a:blipFill>
+        <a:ln w="19050" cap="flat" cmpd="sng" algn="ctr">
+          <a:noFill/>
+          <a:prstDash val="solid"/>
+          <a:miter lim="800000"/>
+        </a:ln>
+        <a:effectLst/>
+      </dsp:spPr>
+      <dsp:style>
+        <a:lnRef idx="2">
+          <a:scrgbClr r="0" g="0" b="0"/>
+        </a:lnRef>
+        <a:fillRef idx="1">
+          <a:scrgbClr r="0" g="0" b="0"/>
+        </a:fillRef>
+        <a:effectRef idx="0">
+          <a:scrgbClr r="0" g="0" b="0"/>
+        </a:effectRef>
+        <a:fontRef idx="minor">
+          <a:schemeClr val="lt1"/>
+        </a:fontRef>
+      </dsp:style>
+    </dsp:sp>
+    <dsp:sp modelId="{95F63F83-09FB-4B8B-9B8A-8758F6659DA2}">
+      <dsp:nvSpPr>
+        <dsp:cNvPr id="0" name=""/>
+        <dsp:cNvSpPr/>
+      </dsp:nvSpPr>
+      <dsp:spPr>
+        <a:xfrm>
+          <a:off x="1948202" y="2452790"/>
+          <a:ext cx="3233964" cy="1371985"/>
+        </a:xfrm>
+        <a:prstGeom prst="rect">
+          <a:avLst/>
+        </a:prstGeom>
+        <a:noFill/>
+        <a:ln>
+          <a:noFill/>
+        </a:ln>
+        <a:effectLst/>
+      </dsp:spPr>
+      <dsp:style>
+        <a:lnRef idx="0">
+          <a:scrgbClr r="0" g="0" b="0"/>
+        </a:lnRef>
+        <a:fillRef idx="0">
+          <a:scrgbClr r="0" g="0" b="0"/>
+        </a:fillRef>
+        <a:effectRef idx="0">
+          <a:scrgbClr r="0" g="0" b="0"/>
+        </a:effectRef>
+        <a:fontRef idx="minor"/>
+      </dsp:style>
+      <dsp:txBody>
+        <a:bodyPr spcFirstLastPara="0" vert="horz" wrap="square" lIns="0" tIns="0" rIns="0" bIns="0" numCol="1" spcCol="1270" anchor="ctr" anchorCtr="0">
+          <a:noAutofit/>
+        </a:bodyPr>
+        <a:lstStyle/>
+        <a:p>
+          <a:pPr marL="0" lvl="0" indent="0" algn="l" defTabSz="1066800">
+            <a:lnSpc>
+              <a:spcPct val="100000"/>
+            </a:lnSpc>
+            <a:spcBef>
+              <a:spcPct val="0"/>
+            </a:spcBef>
+            <a:spcAft>
+              <a:spcPct val="35000"/>
+            </a:spcAft>
+            <a:buNone/>
+          </a:pPr>
+          <a:r>
+            <a:rPr lang="en-US" sz="2400" kern="1200" dirty="0"/>
+            <a:t>How to take setbacks in stride.</a:t>
+          </a:r>
+        </a:p>
+      </dsp:txBody>
+      <dsp:txXfrm>
+        <a:off x="1948202" y="2452790"/>
+        <a:ext cx="3233964" cy="1371985"/>
+      </dsp:txXfrm>
+    </dsp:sp>
+    <dsp:sp modelId="{AF5C540F-ED4F-4C8D-BE36-29BE43ACE0A8}">
+      <dsp:nvSpPr>
+        <dsp:cNvPr id="0" name=""/>
+        <dsp:cNvSpPr/>
+      </dsp:nvSpPr>
+      <dsp:spPr>
+        <a:xfrm>
+          <a:off x="5745661" y="2452790"/>
+          <a:ext cx="1371985" cy="1371985"/>
+        </a:xfrm>
+        <a:prstGeom prst="ellipse">
+          <a:avLst/>
+        </a:prstGeom>
+        <a:solidFill>
+          <a:schemeClr val="accent5">
+            <a:hueOff val="0"/>
+            <a:satOff val="0"/>
+            <a:lumOff val="0"/>
+            <a:alphaOff val="0"/>
+          </a:schemeClr>
+        </a:solidFill>
+        <a:ln>
+          <a:noFill/>
+        </a:ln>
+        <a:effectLst/>
+      </dsp:spPr>
+      <dsp:style>
+        <a:lnRef idx="0">
+          <a:scrgbClr r="0" g="0" b="0"/>
+        </a:lnRef>
+        <a:fillRef idx="1">
+          <a:scrgbClr r="0" g="0" b="0"/>
+        </a:fillRef>
+        <a:effectRef idx="0">
+          <a:scrgbClr r="0" g="0" b="0"/>
+        </a:effectRef>
+        <a:fontRef idx="minor"/>
+      </dsp:style>
+    </dsp:sp>
+    <dsp:sp modelId="{C5EA69CA-9215-4384-88F1-AAD8438B3B62}">
+      <dsp:nvSpPr>
+        <dsp:cNvPr id="0" name=""/>
+        <dsp:cNvSpPr/>
+      </dsp:nvSpPr>
+      <dsp:spPr>
+        <a:xfrm>
+          <a:off x="6033778" y="2740907"/>
+          <a:ext cx="795751" cy="795751"/>
+        </a:xfrm>
+        <a:prstGeom prst="rect">
+          <a:avLst/>
+        </a:prstGeom>
+        <a:blipFill>
+          <a:blip xmlns:r="http://schemas.openxmlformats.org/officeDocument/2006/relationships" r:embed="rId7">
+            <a:extLst>
+              <a:ext uri="{96DAC541-7B7A-43D3-8B79-37D633B846F1}">
+                <asvg:svgBlip xmlns:asvg="http://schemas.microsoft.com/office/drawing/2016/SVG/main" r:embed="rId8"/>
+              </a:ext>
+            </a:extLst>
+          </a:blip>
+          <a:srcRect/>
+          <a:stretch>
+            <a:fillRect/>
+          </a:stretch>
+        </a:blipFill>
+        <a:ln w="19050" cap="flat" cmpd="sng" algn="ctr">
+          <a:noFill/>
+          <a:prstDash val="solid"/>
+          <a:miter lim="800000"/>
+        </a:ln>
+        <a:effectLst/>
+      </dsp:spPr>
+      <dsp:style>
+        <a:lnRef idx="2">
+          <a:scrgbClr r="0" g="0" b="0"/>
+        </a:lnRef>
+        <a:fillRef idx="1">
+          <a:scrgbClr r="0" g="0" b="0"/>
+        </a:fillRef>
+        <a:effectRef idx="0">
+          <a:scrgbClr r="0" g="0" b="0"/>
+        </a:effectRef>
+        <a:fontRef idx="minor">
+          <a:schemeClr val="lt1"/>
+        </a:fontRef>
+      </dsp:style>
+    </dsp:sp>
+    <dsp:sp modelId="{696D6B2D-CE15-47C4-BB14-934DD62A561D}">
+      <dsp:nvSpPr>
+        <dsp:cNvPr id="0" name=""/>
+        <dsp:cNvSpPr/>
+      </dsp:nvSpPr>
+      <dsp:spPr>
+        <a:xfrm>
+          <a:off x="7411643" y="2452790"/>
+          <a:ext cx="3233964" cy="1371985"/>
+        </a:xfrm>
+        <a:prstGeom prst="rect">
+          <a:avLst/>
+        </a:prstGeom>
+        <a:noFill/>
+        <a:ln>
+          <a:noFill/>
+        </a:ln>
+        <a:effectLst/>
+      </dsp:spPr>
+      <dsp:style>
+        <a:lnRef idx="0">
+          <a:scrgbClr r="0" g="0" b="0"/>
+        </a:lnRef>
+        <a:fillRef idx="0">
+          <a:scrgbClr r="0" g="0" b="0"/>
+        </a:fillRef>
+        <a:effectRef idx="0">
+          <a:scrgbClr r="0" g="0" b="0"/>
+        </a:effectRef>
+        <a:fontRef idx="minor"/>
+      </dsp:style>
+      <dsp:txBody>
+        <a:bodyPr spcFirstLastPara="0" vert="horz" wrap="square" lIns="0" tIns="0" rIns="0" bIns="0" numCol="1" spcCol="1270" anchor="ctr" anchorCtr="0">
+          <a:noAutofit/>
+        </a:bodyPr>
+        <a:lstStyle/>
+        <a:p>
+          <a:pPr marL="0" lvl="0" indent="0" algn="l" defTabSz="1066800">
+            <a:lnSpc>
+              <a:spcPct val="100000"/>
+            </a:lnSpc>
+            <a:spcBef>
+              <a:spcPct val="0"/>
+            </a:spcBef>
+            <a:spcAft>
+              <a:spcPct val="35000"/>
+            </a:spcAft>
+            <a:buNone/>
+          </a:pPr>
+          <a:r>
+            <a:rPr lang="en-US" sz="2400" kern="1200" dirty="0"/>
+            <a:t>How to rely on other’s skillsets when they are better for the job.</a:t>
+          </a:r>
+        </a:p>
+      </dsp:txBody>
+      <dsp:txXfrm>
+        <a:off x="7411643" y="2452790"/>
+        <a:ext cx="3233964" cy="1371985"/>
+      </dsp:txXfrm>
+    </dsp:sp>
+  </dsp:spTree>
+</dsp:drawing>
+</file>
+
+<file path=ppt/diagrams/drawing4.xml><?xml version="1.0" encoding="utf-8"?>
+<dsp:drawing xmlns:dgm="http://schemas.openxmlformats.org/drawingml/2006/diagram" xmlns:dsp="http://schemas.microsoft.com/office/drawing/2008/diagram" xmlns:a="http://schemas.openxmlformats.org/drawingml/2006/main">
+  <dsp:spTree>
+    <dsp:nvGrpSpPr>
+      <dsp:cNvPr id="0" name=""/>
+      <dsp:cNvGrpSpPr/>
+    </dsp:nvGrpSpPr>
+    <dsp:grpSpPr/>
     <dsp:sp modelId="{DC503988-0792-4ADD-9A87-693B8D2EDA13}">
       <dsp:nvSpPr>
         <dsp:cNvPr id="0" name=""/>
@@ -7224,7 +9221,7 @@
 </dsp:drawing>
 </file>
 
-<file path=ppt/diagrams/drawing4.xml><?xml version="1.0" encoding="utf-8"?>
+<file path=ppt/diagrams/drawing5.xml><?xml version="1.0" encoding="utf-8"?>
 <dsp:drawing xmlns:dgm="http://schemas.openxmlformats.org/drawingml/2006/diagram" xmlns:dsp="http://schemas.microsoft.com/office/drawing/2008/diagram" xmlns:a="http://schemas.openxmlformats.org/drawingml/2006/main">
   <dsp:spTree>
     <dsp:nvGrpSpPr>
@@ -8713,6 +10710,218 @@
 </dgm:layoutDef>
 </file>
 
+<file path=ppt/diagrams/layout5.xml><?xml version="1.0" encoding="utf-8"?>
+<dgm:layoutDef xmlns:dgm="http://schemas.openxmlformats.org/drawingml/2006/diagram" xmlns:a="http://schemas.openxmlformats.org/drawingml/2006/main" uniqueId="urn:microsoft.com/office/officeart/2018/2/layout/IconCircleList">
+  <dgm:title val="Icon Circle List"/>
+  <dgm:desc val="Use to show non-sequential or grouped chunks of information accompanied by related visuals. Circular shapes can hold an icon or small picture and corresponding text box shows Level 1 text. Works best for icons or small pictures with medium-length descriptions."/>
+  <dgm:catLst>
+    <dgm:cat type="icon" pri="500"/>
+  </dgm:catLst>
+  <dgm:sampData useDef="1">
+    <dgm:dataModel>
+      <dgm:ptLst/>
+      <dgm:bg/>
+      <dgm:whole/>
+    </dgm:dataModel>
+  </dgm:sampData>
+  <dgm:styleData useDef="1">
+    <dgm:dataModel>
+      <dgm:ptLst/>
+      <dgm:bg/>
+      <dgm:whole/>
+    </dgm:dataModel>
+  </dgm:styleData>
+  <dgm:clrData useDef="1">
+    <dgm:dataModel>
+      <dgm:ptLst/>
+      <dgm:bg/>
+      <dgm:whole/>
+    </dgm:dataModel>
+  </dgm:clrData>
+  <dgm:layoutNode name="root">
+    <dgm:varLst>
+      <dgm:dir/>
+      <dgm:resizeHandles val="exact"/>
+    </dgm:varLst>
+    <dgm:alg type="sp"/>
+    <dgm:shape xmlns:r="http://schemas.openxmlformats.org/officeDocument/2006/relationships" r:blip="">
+      <dgm:adjLst/>
+    </dgm:shape>
+    <dgm:presOf/>
+    <dgm:choose name="Name0">
+      <dgm:if name="Name1" axis="ch" ptType="node" func="cnt" op="lte" val="3">
+        <dgm:constrLst>
+          <dgm:constr type="w" for="ch" forName="container" refType="w"/>
+          <dgm:constr type="h" for="ch" forName="container" refType="h" fact="0.4"/>
+        </dgm:constrLst>
+      </dgm:if>
+      <dgm:else name="Name2">
+        <dgm:constrLst>
+          <dgm:constr type="w" for="ch" forName="container" refType="w"/>
+          <dgm:constr type="h" for="ch" forName="container" refType="h"/>
+        </dgm:constrLst>
+      </dgm:else>
+    </dgm:choose>
+    <dgm:ruleLst>
+      <dgm:rule type="h" for="ch" forName="container" val="INF" fact="NaN" max="NaN"/>
+    </dgm:ruleLst>
+    <dgm:layoutNode name="container">
+      <dgm:varLst>
+        <dgm:dir/>
+        <dgm:resizeHandles val="exact"/>
+      </dgm:varLst>
+      <dgm:choose name="Name3">
+        <dgm:if name="Name4" axis="self" func="var" arg="dir" op="equ" val="norm">
+          <dgm:alg type="snake">
+            <dgm:param type="grDir" val="tL"/>
+            <dgm:param type="flowDir" val="row"/>
+            <dgm:param type="contDir" val="sameDir"/>
+          </dgm:alg>
+        </dgm:if>
+        <dgm:else name="Name5">
+          <dgm:alg type="snake">
+            <dgm:param type="grDir" val="tR"/>
+            <dgm:param type="flowDir" val="row"/>
+            <dgm:param type="contDir" val="sameDir"/>
+          </dgm:alg>
+        </dgm:else>
+      </dgm:choose>
+      <dgm:shape xmlns:r="http://schemas.openxmlformats.org/officeDocument/2006/relationships" r:blip="">
+        <dgm:adjLst/>
+      </dgm:shape>
+      <dgm:presOf/>
+      <dgm:constrLst>
+        <dgm:constr type="w" for="ch" forName="compNode" refType="w"/>
+        <dgm:constr type="h" for="ch" forName="compNode" refType="w" fact="0.28"/>
+        <dgm:constr type="w" for="ch" forName="sibTrans" refType="w" refFor="ch" refForName="compNode" fact="0.115"/>
+        <dgm:constr type="sp" refType="h" op="equ" fact="0.17"/>
+        <dgm:constr type="primFontSz" for="des" ptType="node" op="equ" val="24"/>
+        <dgm:constr type="h" for="des" forName="compNode" op="equ"/>
+        <dgm:constr type="h" for="des" forName="iconBgRect" op="equ"/>
+      </dgm:constrLst>
+      <dgm:ruleLst>
+        <dgm:rule type="w" for="ch" forName="compNode" val="60" fact="NaN" max="NaN"/>
+      </dgm:ruleLst>
+      <dgm:forEach name="Name6" axis="ch" ptType="node">
+        <dgm:layoutNode name="compNode">
+          <dgm:alg type="composite"/>
+          <dgm:shape xmlns:r="http://schemas.openxmlformats.org/officeDocument/2006/relationships" r:blip="">
+            <dgm:adjLst/>
+          </dgm:shape>
+          <dgm:presOf axis="self"/>
+          <dgm:constrLst>
+            <dgm:constr type="w" for="ch" forName="iconBgRect" refType="w" fact="0.28"/>
+            <dgm:constr type="h" for="ch" forName="iconBgRect" refType="w" refFor="ch" refForName="iconBgRect"/>
+            <dgm:constr type="t" for="ch" forName="iconBgRect"/>
+            <dgm:constr type="l" for="ch" forName="iconBgRect"/>
+            <dgm:constr type="w" for="ch" forName="iconRect" refType="w" refFor="ch" refForName="iconBgRect" fact="0.58"/>
+            <dgm:constr type="h" for="ch" forName="iconRect" refType="w" refFor="ch" refForName="iconRect"/>
+            <dgm:constr type="ctrX" for="ch" forName="iconRect" refType="ctrX" refFor="ch" refForName="iconBgRect"/>
+            <dgm:constr type="ctrY" for="ch" forName="iconRect" refType="ctrY" refFor="ch" refForName="iconBgRect"/>
+            <dgm:constr type="w" for="ch" forName="spaceRect" refType="w" fact="0.06"/>
+            <dgm:constr type="h" for="ch" forName="spaceRect" refType="h" refFor="ch" refForName="iconBgRect"/>
+            <dgm:constr type="t" for="ch" forName="spaceRect" refType="t" refFor="ch" refForName="iconBgRect"/>
+            <dgm:constr type="l" for="ch" forName="spaceRect" refType="r" refFor="ch" refForName="iconBgRect"/>
+            <dgm:constr type="h" for="ch" forName="textRect" refType="h" refFor="ch" refForName="iconBgRect"/>
+            <dgm:constr type="t" for="ch" forName="textRect" refType="t" refFor="ch" refForName="iconBgRect"/>
+            <dgm:constr type="l" for="ch" forName="textRect" refType="r" refFor="ch" refForName="spaceRect"/>
+          </dgm:constrLst>
+          <dgm:ruleLst/>
+          <dgm:layoutNode name="iconBgRect" styleLbl="bgShp">
+            <dgm:alg type="sp"/>
+            <dgm:shape xmlns:r="http://schemas.openxmlformats.org/officeDocument/2006/relationships" type="ellipse" r:blip="">
+              <dgm:adjLst/>
+            </dgm:shape>
+            <dgm:presOf/>
+            <dgm:constrLst/>
+            <dgm:ruleLst/>
+          </dgm:layoutNode>
+          <dgm:layoutNode name="iconRect" styleLbl="node1">
+            <dgm:alg type="sp"/>
+            <dgm:shape xmlns:r="http://schemas.openxmlformats.org/officeDocument/2006/relationships" type="rect" r:blip="" blipPhldr="1">
+              <dgm:adjLst/>
+            </dgm:shape>
+            <dgm:presOf/>
+            <dgm:constrLst/>
+            <dgm:ruleLst/>
+          </dgm:layoutNode>
+          <dgm:layoutNode name="spaceRect">
+            <dgm:alg type="sp"/>
+            <dgm:shape xmlns:r="http://schemas.openxmlformats.org/officeDocument/2006/relationships" r:blip="">
+              <dgm:adjLst/>
+            </dgm:shape>
+            <dgm:presOf/>
+            <dgm:constrLst/>
+            <dgm:ruleLst/>
+          </dgm:layoutNode>
+          <dgm:layoutNode name="textRect" styleLbl="revTx">
+            <dgm:varLst>
+              <dgm:chMax val="1"/>
+              <dgm:chPref val="1"/>
+            </dgm:varLst>
+            <dgm:choose name="Name7">
+              <dgm:if name="Name8" func="var" arg="dir" op="equ" val="norm">
+                <dgm:alg type="tx">
+                  <dgm:param type="txAnchorVert" val="mid"/>
+                  <dgm:param type="parTxLTRAlign" val="l"/>
+                  <dgm:param type="shpTxLTRAlignCh" val="l"/>
+                  <dgm:param type="parTxRTLAlign" val="l"/>
+                  <dgm:param type="shpTxRTLAlignCh" val="l"/>
+                </dgm:alg>
+              </dgm:if>
+              <dgm:else name="Name9">
+                <dgm:alg type="tx">
+                  <dgm:param type="txAnchorVert" val="mid"/>
+                  <dgm:param type="parTxLTRAlign" val="r"/>
+                  <dgm:param type="shpTxLTRAlignCh" val="r"/>
+                  <dgm:param type="parTxRTLAlign" val="r"/>
+                  <dgm:param type="shpTxRTLAlignCh" val="r"/>
+                </dgm:alg>
+              </dgm:else>
+            </dgm:choose>
+            <dgm:shape xmlns:r="http://schemas.openxmlformats.org/officeDocument/2006/relationships" type="rect" r:blip="">
+              <dgm:adjLst/>
+            </dgm:shape>
+            <dgm:presOf axis="self" ptType="node"/>
+            <dgm:constrLst>
+              <dgm:constr type="lMarg"/>
+              <dgm:constr type="rMarg"/>
+              <dgm:constr type="tMarg"/>
+              <dgm:constr type="bMarg"/>
+            </dgm:constrLst>
+            <dgm:ruleLst>
+              <dgm:rule type="primFontSz" val="11" fact="NaN" max="NaN"/>
+            </dgm:ruleLst>
+          </dgm:layoutNode>
+        </dgm:layoutNode>
+        <dgm:forEach name="Name10" axis="followSib" ptType="sibTrans" cnt="1">
+          <dgm:layoutNode name="sibTrans">
+            <dgm:alg type="sp"/>
+            <dgm:shape xmlns:r="http://schemas.openxmlformats.org/officeDocument/2006/relationships" type="rect" r:blip="" hideGeom="1">
+              <dgm:adjLst/>
+            </dgm:shape>
+            <dgm:presOf axis="self"/>
+            <dgm:constrLst/>
+            <dgm:ruleLst/>
+          </dgm:layoutNode>
+        </dgm:forEach>
+      </dgm:forEach>
+    </dgm:layoutNode>
+  </dgm:layoutNode>
+  <dgm:extLst>
+    <a:ext uri="{68A01E43-0DF5-4B5B-8FA6-DAF915123BFB}">
+      <dgm1612:lstStyle xmlns:dgm1612="http://schemas.microsoft.com/office/drawing/2016/12/diagram">
+        <a:lvl1pPr>
+          <a:lnSpc>
+            <a:spcPct val="100000"/>
+          </a:lnSpc>
+        </a:lvl1pPr>
+      </dgm1612:lstStyle>
+    </a:ext>
+  </dgm:extLst>
+</dgm:layoutDef>
+</file>
+
 <file path=ppt/diagrams/quickStyle1.xml><?xml version="1.0" encoding="utf-8"?>
 <dgm:styleDef xmlns:dgm="http://schemas.openxmlformats.org/drawingml/2006/diagram" xmlns:a="http://schemas.openxmlformats.org/drawingml/2006/main" uniqueId="urn:microsoft.com/office/officeart/2005/8/quickstyle/simple1">
   <dgm:title val=""/>
@@ -12847,6 +15056,1473 @@
     </dgm:style>
   </dgm:styleLbl>
 </dgm:styleDef>
+</file>
+
+<file path=ppt/diagrams/quickStyle5.xml><?xml version="1.0" encoding="utf-8"?>
+<dgm:styleDef xmlns:dgm="http://schemas.openxmlformats.org/drawingml/2006/diagram" xmlns:a="http://schemas.openxmlformats.org/drawingml/2006/main" uniqueId="urn:microsoft.com/office/officeart/2005/8/quickstyle/simple1">
+  <dgm:title val=""/>
+  <dgm:desc val=""/>
+  <dgm:catLst>
+    <dgm:cat type="simple" pri="10100"/>
+  </dgm:catLst>
+  <dgm:scene3d>
+    <a:camera prst="orthographicFront"/>
+    <a:lightRig rig="threePt" dir="t"/>
+  </dgm:scene3d>
+  <dgm:styleLbl name="node0">
+    <dgm:scene3d>
+      <a:camera prst="orthographicFront"/>
+      <a:lightRig rig="threePt" dir="t"/>
+    </dgm:scene3d>
+    <dgm:sp3d/>
+    <dgm:txPr/>
+    <dgm:style>
+      <a:lnRef idx="2">
+        <a:scrgbClr r="0" g="0" b="0"/>
+      </a:lnRef>
+      <a:fillRef idx="1">
+        <a:scrgbClr r="0" g="0" b="0"/>
+      </a:fillRef>
+      <a:effectRef idx="0">
+        <a:scrgbClr r="0" g="0" b="0"/>
+      </a:effectRef>
+      <a:fontRef idx="minor">
+        <a:schemeClr val="lt1"/>
+      </a:fontRef>
+    </dgm:style>
+  </dgm:styleLbl>
+  <dgm:styleLbl name="lnNode1">
+    <dgm:scene3d>
+      <a:camera prst="orthographicFront"/>
+      <a:lightRig rig="threePt" dir="t"/>
+    </dgm:scene3d>
+    <dgm:sp3d/>
+    <dgm:txPr/>
+    <dgm:style>
+      <a:lnRef idx="2">
+        <a:scrgbClr r="0" g="0" b="0"/>
+      </a:lnRef>
+      <a:fillRef idx="1">
+        <a:scrgbClr r="0" g="0" b="0"/>
+      </a:fillRef>
+      <a:effectRef idx="0">
+        <a:scrgbClr r="0" g="0" b="0"/>
+      </a:effectRef>
+      <a:fontRef idx="minor">
+        <a:schemeClr val="lt1"/>
+      </a:fontRef>
+    </dgm:style>
+  </dgm:styleLbl>
+  <dgm:styleLbl name="vennNode1">
+    <dgm:scene3d>
+      <a:camera prst="orthographicFront"/>
+      <a:lightRig rig="threePt" dir="t"/>
+    </dgm:scene3d>
+    <dgm:sp3d/>
+    <dgm:txPr/>
+    <dgm:style>
+      <a:lnRef idx="2">
+        <a:scrgbClr r="0" g="0" b="0"/>
+      </a:lnRef>
+      <a:fillRef idx="1">
+        <a:scrgbClr r="0" g="0" b="0"/>
+      </a:fillRef>
+      <a:effectRef idx="0">
+        <a:scrgbClr r="0" g="0" b="0"/>
+      </a:effectRef>
+      <a:fontRef idx="minor">
+        <a:schemeClr val="tx1"/>
+      </a:fontRef>
+    </dgm:style>
+  </dgm:styleLbl>
+  <dgm:styleLbl name="alignNode1">
+    <dgm:scene3d>
+      <a:camera prst="orthographicFront"/>
+      <a:lightRig rig="threePt" dir="t"/>
+    </dgm:scene3d>
+    <dgm:sp3d/>
+    <dgm:txPr/>
+    <dgm:style>
+      <a:lnRef idx="2">
+        <a:scrgbClr r="0" g="0" b="0"/>
+      </a:lnRef>
+      <a:fillRef idx="1">
+        <a:scrgbClr r="0" g="0" b="0"/>
+      </a:fillRef>
+      <a:effectRef idx="0">
+        <a:scrgbClr r="0" g="0" b="0"/>
+      </a:effectRef>
+      <a:fontRef idx="minor">
+        <a:schemeClr val="lt1"/>
+      </a:fontRef>
+    </dgm:style>
+  </dgm:styleLbl>
+  <dgm:styleLbl name="node1">
+    <dgm:scene3d>
+      <a:camera prst="orthographicFront"/>
+      <a:lightRig rig="threePt" dir="t"/>
+    </dgm:scene3d>
+    <dgm:sp3d/>
+    <dgm:txPr/>
+    <dgm:style>
+      <a:lnRef idx="2">
+        <a:scrgbClr r="0" g="0" b="0"/>
+      </a:lnRef>
+      <a:fillRef idx="1">
+        <a:scrgbClr r="0" g="0" b="0"/>
+      </a:fillRef>
+      <a:effectRef idx="0">
+        <a:scrgbClr r="0" g="0" b="0"/>
+      </a:effectRef>
+      <a:fontRef idx="minor">
+        <a:schemeClr val="lt1"/>
+      </a:fontRef>
+    </dgm:style>
+  </dgm:styleLbl>
+  <dgm:styleLbl name="node2">
+    <dgm:scene3d>
+      <a:camera prst="orthographicFront"/>
+      <a:lightRig rig="threePt" dir="t"/>
+    </dgm:scene3d>
+    <dgm:sp3d/>
+    <dgm:txPr/>
+    <dgm:style>
+      <a:lnRef idx="2">
+        <a:scrgbClr r="0" g="0" b="0"/>
+      </a:lnRef>
+      <a:fillRef idx="1">
+        <a:scrgbClr r="0" g="0" b="0"/>
+      </a:fillRef>
+      <a:effectRef idx="0">
+        <a:scrgbClr r="0" g="0" b="0"/>
+      </a:effectRef>
+      <a:fontRef idx="minor">
+        <a:schemeClr val="lt1"/>
+      </a:fontRef>
+    </dgm:style>
+  </dgm:styleLbl>
+  <dgm:styleLbl name="node3">
+    <dgm:scene3d>
+      <a:camera prst="orthographicFront"/>
+      <a:lightRig rig="threePt" dir="t"/>
+    </dgm:scene3d>
+    <dgm:sp3d/>
+    <dgm:txPr/>
+    <dgm:style>
+      <a:lnRef idx="2">
+        <a:scrgbClr r="0" g="0" b="0"/>
+      </a:lnRef>
+      <a:fillRef idx="1">
+        <a:scrgbClr r="0" g="0" b="0"/>
+      </a:fillRef>
+      <a:effectRef idx="0">
+        <a:scrgbClr r="0" g="0" b="0"/>
+      </a:effectRef>
+      <a:fontRef idx="minor">
+        <a:schemeClr val="lt1"/>
+      </a:fontRef>
+    </dgm:style>
+  </dgm:styleLbl>
+  <dgm:styleLbl name="node4">
+    <dgm:scene3d>
+      <a:camera prst="orthographicFront"/>
+      <a:lightRig rig="threePt" dir="t"/>
+    </dgm:scene3d>
+    <dgm:sp3d/>
+    <dgm:txPr/>
+    <dgm:style>
+      <a:lnRef idx="2">
+        <a:scrgbClr r="0" g="0" b="0"/>
+      </a:lnRef>
+      <a:fillRef idx="1">
+        <a:scrgbClr r="0" g="0" b="0"/>
+      </a:fillRef>
+      <a:effectRef idx="0">
+        <a:scrgbClr r="0" g="0" b="0"/>
+      </a:effectRef>
+      <a:fontRef idx="minor">
+        <a:schemeClr val="lt1"/>
+      </a:fontRef>
+    </dgm:style>
+  </dgm:styleLbl>
+  <dgm:styleLbl name="fgImgPlace1">
+    <dgm:scene3d>
+      <a:camera prst="orthographicFront"/>
+      <a:lightRig rig="threePt" dir="t"/>
+    </dgm:scene3d>
+    <dgm:sp3d/>
+    <dgm:txPr/>
+    <dgm:style>
+      <a:lnRef idx="2">
+        <a:scrgbClr r="0" g="0" b="0"/>
+      </a:lnRef>
+      <a:fillRef idx="1">
+        <a:scrgbClr r="0" g="0" b="0"/>
+      </a:fillRef>
+      <a:effectRef idx="0">
+        <a:scrgbClr r="0" g="0" b="0"/>
+      </a:effectRef>
+      <a:fontRef idx="minor"/>
+    </dgm:style>
+  </dgm:styleLbl>
+  <dgm:styleLbl name="alignImgPlace1">
+    <dgm:scene3d>
+      <a:camera prst="orthographicFront"/>
+      <a:lightRig rig="threePt" dir="t"/>
+    </dgm:scene3d>
+    <dgm:sp3d/>
+    <dgm:txPr/>
+    <dgm:style>
+      <a:lnRef idx="2">
+        <a:scrgbClr r="0" g="0" b="0"/>
+      </a:lnRef>
+      <a:fillRef idx="1">
+        <a:scrgbClr r="0" g="0" b="0"/>
+      </a:fillRef>
+      <a:effectRef idx="0">
+        <a:scrgbClr r="0" g="0" b="0"/>
+      </a:effectRef>
+      <a:fontRef idx="minor"/>
+    </dgm:style>
+  </dgm:styleLbl>
+  <dgm:styleLbl name="bgImgPlace1">
+    <dgm:scene3d>
+      <a:camera prst="orthographicFront"/>
+      <a:lightRig rig="threePt" dir="t"/>
+    </dgm:scene3d>
+    <dgm:sp3d/>
+    <dgm:txPr/>
+    <dgm:style>
+      <a:lnRef idx="2">
+        <a:scrgbClr r="0" g="0" b="0"/>
+      </a:lnRef>
+      <a:fillRef idx="1">
+        <a:scrgbClr r="0" g="0" b="0"/>
+      </a:fillRef>
+      <a:effectRef idx="0">
+        <a:scrgbClr r="0" g="0" b="0"/>
+      </a:effectRef>
+      <a:fontRef idx="minor"/>
+    </dgm:style>
+  </dgm:styleLbl>
+  <dgm:styleLbl name="sibTrans2D1">
+    <dgm:scene3d>
+      <a:camera prst="orthographicFront"/>
+      <a:lightRig rig="threePt" dir="t"/>
+    </dgm:scene3d>
+    <dgm:sp3d/>
+    <dgm:txPr/>
+    <dgm:style>
+      <a:lnRef idx="0">
+        <a:scrgbClr r="0" g="0" b="0"/>
+      </a:lnRef>
+      <a:fillRef idx="1">
+        <a:scrgbClr r="0" g="0" b="0"/>
+      </a:fillRef>
+      <a:effectRef idx="0">
+        <a:scrgbClr r="0" g="0" b="0"/>
+      </a:effectRef>
+      <a:fontRef idx="minor">
+        <a:schemeClr val="lt1"/>
+      </a:fontRef>
+    </dgm:style>
+  </dgm:styleLbl>
+  <dgm:styleLbl name="fgSibTrans2D1">
+    <dgm:scene3d>
+      <a:camera prst="orthographicFront"/>
+      <a:lightRig rig="threePt" dir="t"/>
+    </dgm:scene3d>
+    <dgm:sp3d/>
+    <dgm:txPr/>
+    <dgm:style>
+      <a:lnRef idx="0">
+        <a:scrgbClr r="0" g="0" b="0"/>
+      </a:lnRef>
+      <a:fillRef idx="1">
+        <a:scrgbClr r="0" g="0" b="0"/>
+      </a:fillRef>
+      <a:effectRef idx="0">
+        <a:scrgbClr r="0" g="0" b="0"/>
+      </a:effectRef>
+      <a:fontRef idx="minor">
+        <a:schemeClr val="lt1"/>
+      </a:fontRef>
+    </dgm:style>
+  </dgm:styleLbl>
+  <dgm:styleLbl name="bgSibTrans2D1">
+    <dgm:scene3d>
+      <a:camera prst="orthographicFront"/>
+      <a:lightRig rig="threePt" dir="t"/>
+    </dgm:scene3d>
+    <dgm:sp3d/>
+    <dgm:txPr/>
+    <dgm:style>
+      <a:lnRef idx="0">
+        <a:scrgbClr r="0" g="0" b="0"/>
+      </a:lnRef>
+      <a:fillRef idx="1">
+        <a:scrgbClr r="0" g="0" b="0"/>
+      </a:fillRef>
+      <a:effectRef idx="0">
+        <a:scrgbClr r="0" g="0" b="0"/>
+      </a:effectRef>
+      <a:fontRef idx="minor">
+        <a:schemeClr val="lt1"/>
+      </a:fontRef>
+    </dgm:style>
+  </dgm:styleLbl>
+  <dgm:styleLbl name="sibTrans1D1">
+    <dgm:scene3d>
+      <a:camera prst="orthographicFront"/>
+      <a:lightRig rig="threePt" dir="t"/>
+    </dgm:scene3d>
+    <dgm:sp3d/>
+    <dgm:txPr/>
+    <dgm:style>
+      <a:lnRef idx="1">
+        <a:scrgbClr r="0" g="0" b="0"/>
+      </a:lnRef>
+      <a:fillRef idx="0">
+        <a:scrgbClr r="0" g="0" b="0"/>
+      </a:fillRef>
+      <a:effectRef idx="0">
+        <a:scrgbClr r="0" g="0" b="0"/>
+      </a:effectRef>
+      <a:fontRef idx="minor"/>
+    </dgm:style>
+  </dgm:styleLbl>
+  <dgm:styleLbl name="callout">
+    <dgm:scene3d>
+      <a:camera prst="orthographicFront"/>
+      <a:lightRig rig="threePt" dir="t"/>
+    </dgm:scene3d>
+    <dgm:sp3d/>
+    <dgm:txPr/>
+    <dgm:style>
+      <a:lnRef idx="2">
+        <a:scrgbClr r="0" g="0" b="0"/>
+      </a:lnRef>
+      <a:fillRef idx="1">
+        <a:scrgbClr r="0" g="0" b="0"/>
+      </a:fillRef>
+      <a:effectRef idx="0">
+        <a:scrgbClr r="0" g="0" b="0"/>
+      </a:effectRef>
+      <a:fontRef idx="minor"/>
+    </dgm:style>
+  </dgm:styleLbl>
+  <dgm:styleLbl name="asst0">
+    <dgm:scene3d>
+      <a:camera prst="orthographicFront"/>
+      <a:lightRig rig="threePt" dir="t"/>
+    </dgm:scene3d>
+    <dgm:sp3d/>
+    <dgm:txPr/>
+    <dgm:style>
+      <a:lnRef idx="2">
+        <a:scrgbClr r="0" g="0" b="0"/>
+      </a:lnRef>
+      <a:fillRef idx="1">
+        <a:scrgbClr r="0" g="0" b="0"/>
+      </a:fillRef>
+      <a:effectRef idx="0">
+        <a:scrgbClr r="0" g="0" b="0"/>
+      </a:effectRef>
+      <a:fontRef idx="minor">
+        <a:schemeClr val="lt1"/>
+      </a:fontRef>
+    </dgm:style>
+  </dgm:styleLbl>
+  <dgm:styleLbl name="asst1">
+    <dgm:scene3d>
+      <a:camera prst="orthographicFront"/>
+      <a:lightRig rig="threePt" dir="t"/>
+    </dgm:scene3d>
+    <dgm:sp3d/>
+    <dgm:txPr/>
+    <dgm:style>
+      <a:lnRef idx="2">
+        <a:scrgbClr r="0" g="0" b="0"/>
+      </a:lnRef>
+      <a:fillRef idx="1">
+        <a:scrgbClr r="0" g="0" b="0"/>
+      </a:fillRef>
+      <a:effectRef idx="0">
+        <a:scrgbClr r="0" g="0" b="0"/>
+      </a:effectRef>
+      <a:fontRef idx="minor">
+        <a:schemeClr val="lt1"/>
+      </a:fontRef>
+    </dgm:style>
+  </dgm:styleLbl>
+  <dgm:styleLbl name="asst2">
+    <dgm:scene3d>
+      <a:camera prst="orthographicFront"/>
+      <a:lightRig rig="threePt" dir="t"/>
+    </dgm:scene3d>
+    <dgm:sp3d/>
+    <dgm:txPr/>
+    <dgm:style>
+      <a:lnRef idx="2">
+        <a:scrgbClr r="0" g="0" b="0"/>
+      </a:lnRef>
+      <a:fillRef idx="1">
+        <a:scrgbClr r="0" g="0" b="0"/>
+      </a:fillRef>
+      <a:effectRef idx="0">
+        <a:scrgbClr r="0" g="0" b="0"/>
+      </a:effectRef>
+      <a:fontRef idx="minor">
+        <a:schemeClr val="lt1"/>
+      </a:fontRef>
+    </dgm:style>
+  </dgm:styleLbl>
+  <dgm:styleLbl name="asst3">
+    <dgm:scene3d>
+      <a:camera prst="orthographicFront"/>
+      <a:lightRig rig="threePt" dir="t"/>
+    </dgm:scene3d>
+    <dgm:sp3d/>
+    <dgm:txPr/>
+    <dgm:style>
+      <a:lnRef idx="2">
+        <a:scrgbClr r="0" g="0" b="0"/>
+      </a:lnRef>
+      <a:fillRef idx="1">
+        <a:scrgbClr r="0" g="0" b="0"/>
+      </a:fillRef>
+      <a:effectRef idx="0">
+        <a:scrgbClr r="0" g="0" b="0"/>
+      </a:effectRef>
+      <a:fontRef idx="minor">
+        <a:schemeClr val="lt1"/>
+      </a:fontRef>
+    </dgm:style>
+  </dgm:styleLbl>
+  <dgm:styleLbl name="asst4">
+    <dgm:scene3d>
+      <a:camera prst="orthographicFront"/>
+      <a:lightRig rig="threePt" dir="t"/>
+    </dgm:scene3d>
+    <dgm:sp3d/>
+    <dgm:txPr/>
+    <dgm:style>
+      <a:lnRef idx="2">
+        <a:scrgbClr r="0" g="0" b="0"/>
+      </a:lnRef>
+      <a:fillRef idx="1">
+        <a:scrgbClr r="0" g="0" b="0"/>
+      </a:fillRef>
+      <a:effectRef idx="0">
+        <a:scrgbClr r="0" g="0" b="0"/>
+      </a:effectRef>
+      <a:fontRef idx="minor">
+        <a:schemeClr val="lt1"/>
+      </a:fontRef>
+    </dgm:style>
+  </dgm:styleLbl>
+  <dgm:styleLbl name="parChTrans2D1">
+    <dgm:scene3d>
+      <a:camera prst="orthographicFront"/>
+      <a:lightRig rig="threePt" dir="t"/>
+    </dgm:scene3d>
+    <dgm:sp3d/>
+    <dgm:txPr/>
+    <dgm:style>
+      <a:lnRef idx="2">
+        <a:scrgbClr r="0" g="0" b="0"/>
+      </a:lnRef>
+      <a:fillRef idx="1">
+        <a:scrgbClr r="0" g="0" b="0"/>
+      </a:fillRef>
+      <a:effectRef idx="0">
+        <a:scrgbClr r="0" g="0" b="0"/>
+      </a:effectRef>
+      <a:fontRef idx="minor">
+        <a:schemeClr val="lt1"/>
+      </a:fontRef>
+    </dgm:style>
+  </dgm:styleLbl>
+  <dgm:styleLbl name="parChTrans2D2">
+    <dgm:scene3d>
+      <a:camera prst="orthographicFront"/>
+      <a:lightRig rig="threePt" dir="t"/>
+    </dgm:scene3d>
+    <dgm:sp3d/>
+    <dgm:txPr/>
+    <dgm:style>
+      <a:lnRef idx="2">
+        <a:scrgbClr r="0" g="0" b="0"/>
+      </a:lnRef>
+      <a:fillRef idx="1">
+        <a:scrgbClr r="0" g="0" b="0"/>
+      </a:fillRef>
+      <a:effectRef idx="0">
+        <a:scrgbClr r="0" g="0" b="0"/>
+      </a:effectRef>
+      <a:fontRef idx="minor">
+        <a:schemeClr val="lt1"/>
+      </a:fontRef>
+    </dgm:style>
+  </dgm:styleLbl>
+  <dgm:styleLbl name="parChTrans2D3">
+    <dgm:scene3d>
+      <a:camera prst="orthographicFront"/>
+      <a:lightRig rig="threePt" dir="t"/>
+    </dgm:scene3d>
+    <dgm:sp3d/>
+    <dgm:txPr/>
+    <dgm:style>
+      <a:lnRef idx="2">
+        <a:scrgbClr r="0" g="0" b="0"/>
+      </a:lnRef>
+      <a:fillRef idx="1">
+        <a:scrgbClr r="0" g="0" b="0"/>
+      </a:fillRef>
+      <a:effectRef idx="0">
+        <a:scrgbClr r="0" g="0" b="0"/>
+      </a:effectRef>
+      <a:fontRef idx="minor">
+        <a:schemeClr val="lt1"/>
+      </a:fontRef>
+    </dgm:style>
+  </dgm:styleLbl>
+  <dgm:styleLbl name="parChTrans2D4">
+    <dgm:scene3d>
+      <a:camera prst="orthographicFront"/>
+      <a:lightRig rig="threePt" dir="t"/>
+    </dgm:scene3d>
+    <dgm:sp3d/>
+    <dgm:txPr/>
+    <dgm:style>
+      <a:lnRef idx="2">
+        <a:scrgbClr r="0" g="0" b="0"/>
+      </a:lnRef>
+      <a:fillRef idx="1">
+        <a:scrgbClr r="0" g="0" b="0"/>
+      </a:fillRef>
+      <a:effectRef idx="0">
+        <a:scrgbClr r="0" g="0" b="0"/>
+      </a:effectRef>
+      <a:fontRef idx="minor">
+        <a:schemeClr val="lt1"/>
+      </a:fontRef>
+    </dgm:style>
+  </dgm:styleLbl>
+  <dgm:styleLbl name="parChTrans1D1">
+    <dgm:scene3d>
+      <a:camera prst="orthographicFront"/>
+      <a:lightRig rig="threePt" dir="t"/>
+    </dgm:scene3d>
+    <dgm:sp3d/>
+    <dgm:txPr/>
+    <dgm:style>
+      <a:lnRef idx="2">
+        <a:scrgbClr r="0" g="0" b="0"/>
+      </a:lnRef>
+      <a:fillRef idx="0">
+        <a:scrgbClr r="0" g="0" b="0"/>
+      </a:fillRef>
+      <a:effectRef idx="0">
+        <a:scrgbClr r="0" g="0" b="0"/>
+      </a:effectRef>
+      <a:fontRef idx="minor"/>
+    </dgm:style>
+  </dgm:styleLbl>
+  <dgm:styleLbl name="parChTrans1D2">
+    <dgm:scene3d>
+      <a:camera prst="orthographicFront"/>
+      <a:lightRig rig="threePt" dir="t"/>
+    </dgm:scene3d>
+    <dgm:sp3d/>
+    <dgm:txPr/>
+    <dgm:style>
+      <a:lnRef idx="2">
+        <a:scrgbClr r="0" g="0" b="0"/>
+      </a:lnRef>
+      <a:fillRef idx="0">
+        <a:scrgbClr r="0" g="0" b="0"/>
+      </a:fillRef>
+      <a:effectRef idx="0">
+        <a:scrgbClr r="0" g="0" b="0"/>
+      </a:effectRef>
+      <a:fontRef idx="minor"/>
+    </dgm:style>
+  </dgm:styleLbl>
+  <dgm:styleLbl name="parChTrans1D3">
+    <dgm:scene3d>
+      <a:camera prst="orthographicFront"/>
+      <a:lightRig rig="threePt" dir="t"/>
+    </dgm:scene3d>
+    <dgm:sp3d/>
+    <dgm:txPr/>
+    <dgm:style>
+      <a:lnRef idx="2">
+        <a:scrgbClr r="0" g="0" b="0"/>
+      </a:lnRef>
+      <a:fillRef idx="0">
+        <a:scrgbClr r="0" g="0" b="0"/>
+      </a:fillRef>
+      <a:effectRef idx="0">
+        <a:scrgbClr r="0" g="0" b="0"/>
+      </a:effectRef>
+      <a:fontRef idx="minor"/>
+    </dgm:style>
+  </dgm:styleLbl>
+  <dgm:styleLbl name="parChTrans1D4">
+    <dgm:scene3d>
+      <a:camera prst="orthographicFront"/>
+      <a:lightRig rig="threePt" dir="t"/>
+    </dgm:scene3d>
+    <dgm:sp3d/>
+    <dgm:txPr/>
+    <dgm:style>
+      <a:lnRef idx="2">
+        <a:scrgbClr r="0" g="0" b="0"/>
+      </a:lnRef>
+      <a:fillRef idx="0">
+        <a:scrgbClr r="0" g="0" b="0"/>
+      </a:fillRef>
+      <a:effectRef idx="0">
+        <a:scrgbClr r="0" g="0" b="0"/>
+      </a:effectRef>
+      <a:fontRef idx="minor"/>
+    </dgm:style>
+  </dgm:styleLbl>
+  <dgm:styleLbl name="fgAcc1">
+    <dgm:scene3d>
+      <a:camera prst="orthographicFront"/>
+      <a:lightRig rig="threePt" dir="t"/>
+    </dgm:scene3d>
+    <dgm:sp3d/>
+    <dgm:txPr/>
+    <dgm:style>
+      <a:lnRef idx="2">
+        <a:scrgbClr r="0" g="0" b="0"/>
+      </a:lnRef>
+      <a:fillRef idx="1">
+        <a:scrgbClr r="0" g="0" b="0"/>
+      </a:fillRef>
+      <a:effectRef idx="0">
+        <a:scrgbClr r="0" g="0" b="0"/>
+      </a:effectRef>
+      <a:fontRef idx="minor"/>
+    </dgm:style>
+  </dgm:styleLbl>
+  <dgm:styleLbl name="conFgAcc1">
+    <dgm:scene3d>
+      <a:camera prst="orthographicFront"/>
+      <a:lightRig rig="threePt" dir="t"/>
+    </dgm:scene3d>
+    <dgm:sp3d/>
+    <dgm:txPr/>
+    <dgm:style>
+      <a:lnRef idx="2">
+        <a:scrgbClr r="0" g="0" b="0"/>
+      </a:lnRef>
+      <a:fillRef idx="1">
+        <a:scrgbClr r="0" g="0" b="0"/>
+      </a:fillRef>
+      <a:effectRef idx="0">
+        <a:scrgbClr r="0" g="0" b="0"/>
+      </a:effectRef>
+      <a:fontRef idx="minor"/>
+    </dgm:style>
+  </dgm:styleLbl>
+  <dgm:styleLbl name="alignAcc1">
+    <dgm:scene3d>
+      <a:camera prst="orthographicFront"/>
+      <a:lightRig rig="threePt" dir="t"/>
+    </dgm:scene3d>
+    <dgm:sp3d/>
+    <dgm:txPr/>
+    <dgm:style>
+      <a:lnRef idx="2">
+        <a:scrgbClr r="0" g="0" b="0"/>
+      </a:lnRef>
+      <a:fillRef idx="1">
+        <a:scrgbClr r="0" g="0" b="0"/>
+      </a:fillRef>
+      <a:effectRef idx="0">
+        <a:scrgbClr r="0" g="0" b="0"/>
+      </a:effectRef>
+      <a:fontRef idx="minor"/>
+    </dgm:style>
+  </dgm:styleLbl>
+  <dgm:styleLbl name="trAlignAcc1">
+    <dgm:scene3d>
+      <a:camera prst="orthographicFront"/>
+      <a:lightRig rig="threePt" dir="t"/>
+    </dgm:scene3d>
+    <dgm:sp3d/>
+    <dgm:txPr/>
+    <dgm:style>
+      <a:lnRef idx="1">
+        <a:scrgbClr r="0" g="0" b="0"/>
+      </a:lnRef>
+      <a:fillRef idx="1">
+        <a:scrgbClr r="0" g="0" b="0"/>
+      </a:fillRef>
+      <a:effectRef idx="0">
+        <a:scrgbClr r="0" g="0" b="0"/>
+      </a:effectRef>
+      <a:fontRef idx="minor"/>
+    </dgm:style>
+  </dgm:styleLbl>
+  <dgm:styleLbl name="bgAcc1">
+    <dgm:scene3d>
+      <a:camera prst="orthographicFront"/>
+      <a:lightRig rig="threePt" dir="t"/>
+    </dgm:scene3d>
+    <dgm:sp3d/>
+    <dgm:txPr/>
+    <dgm:style>
+      <a:lnRef idx="2">
+        <a:scrgbClr r="0" g="0" b="0"/>
+      </a:lnRef>
+      <a:fillRef idx="1">
+        <a:scrgbClr r="0" g="0" b="0"/>
+      </a:fillRef>
+      <a:effectRef idx="0">
+        <a:scrgbClr r="0" g="0" b="0"/>
+      </a:effectRef>
+      <a:fontRef idx="minor"/>
+    </dgm:style>
+  </dgm:styleLbl>
+  <dgm:styleLbl name="solidFgAcc1">
+    <dgm:scene3d>
+      <a:camera prst="orthographicFront"/>
+      <a:lightRig rig="threePt" dir="t"/>
+    </dgm:scene3d>
+    <dgm:sp3d/>
+    <dgm:txPr/>
+    <dgm:style>
+      <a:lnRef idx="2">
+        <a:scrgbClr r="0" g="0" b="0"/>
+      </a:lnRef>
+      <a:fillRef idx="1">
+        <a:scrgbClr r="0" g="0" b="0"/>
+      </a:fillRef>
+      <a:effectRef idx="0">
+        <a:scrgbClr r="0" g="0" b="0"/>
+      </a:effectRef>
+      <a:fontRef idx="minor"/>
+    </dgm:style>
+  </dgm:styleLbl>
+  <dgm:styleLbl name="solidAlignAcc1">
+    <dgm:scene3d>
+      <a:camera prst="orthographicFront"/>
+      <a:lightRig rig="threePt" dir="t"/>
+    </dgm:scene3d>
+    <dgm:sp3d/>
+    <dgm:txPr/>
+    <dgm:style>
+      <a:lnRef idx="2">
+        <a:scrgbClr r="0" g="0" b="0"/>
+      </a:lnRef>
+      <a:fillRef idx="1">
+        <a:scrgbClr r="0" g="0" b="0"/>
+      </a:fillRef>
+      <a:effectRef idx="0">
+        <a:scrgbClr r="0" g="0" b="0"/>
+      </a:effectRef>
+      <a:fontRef idx="minor"/>
+    </dgm:style>
+  </dgm:styleLbl>
+  <dgm:styleLbl name="solidBgAcc1">
+    <dgm:scene3d>
+      <a:camera prst="orthographicFront"/>
+      <a:lightRig rig="threePt" dir="t"/>
+    </dgm:scene3d>
+    <dgm:sp3d/>
+    <dgm:txPr/>
+    <dgm:style>
+      <a:lnRef idx="2">
+        <a:scrgbClr r="0" g="0" b="0"/>
+      </a:lnRef>
+      <a:fillRef idx="1">
+        <a:scrgbClr r="0" g="0" b="0"/>
+      </a:fillRef>
+      <a:effectRef idx="0">
+        <a:scrgbClr r="0" g="0" b="0"/>
+      </a:effectRef>
+      <a:fontRef idx="minor"/>
+    </dgm:style>
+  </dgm:styleLbl>
+  <dgm:styleLbl name="fgAccFollowNode1">
+    <dgm:scene3d>
+      <a:camera prst="orthographicFront"/>
+      <a:lightRig rig="threePt" dir="t"/>
+    </dgm:scene3d>
+    <dgm:sp3d/>
+    <dgm:txPr/>
+    <dgm:style>
+      <a:lnRef idx="2">
+        <a:scrgbClr r="0" g="0" b="0"/>
+      </a:lnRef>
+      <a:fillRef idx="1">
+        <a:scrgbClr r="0" g="0" b="0"/>
+      </a:fillRef>
+      <a:effectRef idx="0">
+        <a:scrgbClr r="0" g="0" b="0"/>
+      </a:effectRef>
+      <a:fontRef idx="minor"/>
+    </dgm:style>
+  </dgm:styleLbl>
+  <dgm:styleLbl name="alignAccFollowNode1">
+    <dgm:scene3d>
+      <a:camera prst="orthographicFront"/>
+      <a:lightRig rig="threePt" dir="t"/>
+    </dgm:scene3d>
+    <dgm:sp3d/>
+    <dgm:txPr/>
+    <dgm:style>
+      <a:lnRef idx="2">
+        <a:scrgbClr r="0" g="0" b="0"/>
+      </a:lnRef>
+      <a:fillRef idx="1">
+        <a:scrgbClr r="0" g="0" b="0"/>
+      </a:fillRef>
+      <a:effectRef idx="0">
+        <a:scrgbClr r="0" g="0" b="0"/>
+      </a:effectRef>
+      <a:fontRef idx="minor"/>
+    </dgm:style>
+  </dgm:styleLbl>
+  <dgm:styleLbl name="bgAccFollowNode1">
+    <dgm:scene3d>
+      <a:camera prst="orthographicFront"/>
+      <a:lightRig rig="threePt" dir="t"/>
+    </dgm:scene3d>
+    <dgm:sp3d/>
+    <dgm:txPr/>
+    <dgm:style>
+      <a:lnRef idx="2">
+        <a:scrgbClr r="0" g="0" b="0"/>
+      </a:lnRef>
+      <a:fillRef idx="1">
+        <a:scrgbClr r="0" g="0" b="0"/>
+      </a:fillRef>
+      <a:effectRef idx="0">
+        <a:scrgbClr r="0" g="0" b="0"/>
+      </a:effectRef>
+      <a:fontRef idx="minor"/>
+    </dgm:style>
+  </dgm:styleLbl>
+  <dgm:styleLbl name="fgAcc0">
+    <dgm:scene3d>
+      <a:camera prst="orthographicFront"/>
+      <a:lightRig rig="threePt" dir="t"/>
+    </dgm:scene3d>
+    <dgm:sp3d/>
+    <dgm:txPr/>
+    <dgm:style>
+      <a:lnRef idx="2">
+        <a:scrgbClr r="0" g="0" b="0"/>
+      </a:lnRef>
+      <a:fillRef idx="1">
+        <a:scrgbClr r="0" g="0" b="0"/>
+      </a:fillRef>
+      <a:effectRef idx="0">
+        <a:scrgbClr r="0" g="0" b="0"/>
+      </a:effectRef>
+      <a:fontRef idx="minor"/>
+    </dgm:style>
+  </dgm:styleLbl>
+  <dgm:styleLbl name="fgAcc2">
+    <dgm:scene3d>
+      <a:camera prst="orthographicFront"/>
+      <a:lightRig rig="threePt" dir="t"/>
+    </dgm:scene3d>
+    <dgm:sp3d/>
+    <dgm:txPr/>
+    <dgm:style>
+      <a:lnRef idx="2">
+        <a:scrgbClr r="0" g="0" b="0"/>
+      </a:lnRef>
+      <a:fillRef idx="1">
+        <a:scrgbClr r="0" g="0" b="0"/>
+      </a:fillRef>
+      <a:effectRef idx="0">
+        <a:scrgbClr r="0" g="0" b="0"/>
+      </a:effectRef>
+      <a:fontRef idx="minor"/>
+    </dgm:style>
+  </dgm:styleLbl>
+  <dgm:styleLbl name="fgAcc3">
+    <dgm:scene3d>
+      <a:camera prst="orthographicFront"/>
+      <a:lightRig rig="threePt" dir="t"/>
+    </dgm:scene3d>
+    <dgm:sp3d/>
+    <dgm:txPr/>
+    <dgm:style>
+      <a:lnRef idx="2">
+        <a:scrgbClr r="0" g="0" b="0"/>
+      </a:lnRef>
+      <a:fillRef idx="1">
+        <a:scrgbClr r="0" g="0" b="0"/>
+      </a:fillRef>
+      <a:effectRef idx="0">
+        <a:scrgbClr r="0" g="0" b="0"/>
+      </a:effectRef>
+      <a:fontRef idx="minor"/>
+    </dgm:style>
+  </dgm:styleLbl>
+  <dgm:styleLbl name="fgAcc4">
+    <dgm:scene3d>
+      <a:camera prst="orthographicFront"/>
+      <a:lightRig rig="threePt" dir="t"/>
+    </dgm:scene3d>
+    <dgm:sp3d/>
+    <dgm:txPr/>
+    <dgm:style>
+      <a:lnRef idx="2">
+        <a:scrgbClr r="0" g="0" b="0"/>
+      </a:lnRef>
+      <a:fillRef idx="1">
+        <a:scrgbClr r="0" g="0" b="0"/>
+      </a:fillRef>
+      <a:effectRef idx="0">
+        <a:scrgbClr r="0" g="0" b="0"/>
+      </a:effectRef>
+      <a:fontRef idx="minor"/>
+    </dgm:style>
+  </dgm:styleLbl>
+  <dgm:styleLbl name="bgShp">
+    <dgm:scene3d>
+      <a:camera prst="orthographicFront"/>
+      <a:lightRig rig="threePt" dir="t"/>
+    </dgm:scene3d>
+    <dgm:sp3d/>
+    <dgm:txPr/>
+    <dgm:style>
+      <a:lnRef idx="0">
+        <a:scrgbClr r="0" g="0" b="0"/>
+      </a:lnRef>
+      <a:fillRef idx="1">
+        <a:scrgbClr r="0" g="0" b="0"/>
+      </a:fillRef>
+      <a:effectRef idx="0">
+        <a:scrgbClr r="0" g="0" b="0"/>
+      </a:effectRef>
+      <a:fontRef idx="minor"/>
+    </dgm:style>
+  </dgm:styleLbl>
+  <dgm:styleLbl name="dkBgShp">
+    <dgm:scene3d>
+      <a:camera prst="orthographicFront"/>
+      <a:lightRig rig="threePt" dir="t"/>
+    </dgm:scene3d>
+    <dgm:sp3d/>
+    <dgm:txPr/>
+    <dgm:style>
+      <a:lnRef idx="0">
+        <a:scrgbClr r="0" g="0" b="0"/>
+      </a:lnRef>
+      <a:fillRef idx="1">
+        <a:scrgbClr r="0" g="0" b="0"/>
+      </a:fillRef>
+      <a:effectRef idx="0">
+        <a:scrgbClr r="0" g="0" b="0"/>
+      </a:effectRef>
+      <a:fontRef idx="minor"/>
+    </dgm:style>
+  </dgm:styleLbl>
+  <dgm:styleLbl name="trBgShp">
+    <dgm:scene3d>
+      <a:camera prst="orthographicFront"/>
+      <a:lightRig rig="threePt" dir="t"/>
+    </dgm:scene3d>
+    <dgm:sp3d/>
+    <dgm:txPr/>
+    <dgm:style>
+      <a:lnRef idx="0">
+        <a:scrgbClr r="0" g="0" b="0"/>
+      </a:lnRef>
+      <a:fillRef idx="1">
+        <a:scrgbClr r="0" g="0" b="0"/>
+      </a:fillRef>
+      <a:effectRef idx="0">
+        <a:scrgbClr r="0" g="0" b="0"/>
+      </a:effectRef>
+      <a:fontRef idx="minor"/>
+    </dgm:style>
+  </dgm:styleLbl>
+  <dgm:styleLbl name="fgShp">
+    <dgm:scene3d>
+      <a:camera prst="orthographicFront"/>
+      <a:lightRig rig="threePt" dir="t"/>
+    </dgm:scene3d>
+    <dgm:sp3d/>
+    <dgm:txPr/>
+    <dgm:style>
+      <a:lnRef idx="2">
+        <a:scrgbClr r="0" g="0" b="0"/>
+      </a:lnRef>
+      <a:fillRef idx="1">
+        <a:scrgbClr r="0" g="0" b="0"/>
+      </a:fillRef>
+      <a:effectRef idx="0">
+        <a:scrgbClr r="0" g="0" b="0"/>
+      </a:effectRef>
+      <a:fontRef idx="minor"/>
+    </dgm:style>
+  </dgm:styleLbl>
+  <dgm:styleLbl name="revTx">
+    <dgm:scene3d>
+      <a:camera prst="orthographicFront"/>
+      <a:lightRig rig="threePt" dir="t"/>
+    </dgm:scene3d>
+    <dgm:sp3d/>
+    <dgm:txPr/>
+    <dgm:style>
+      <a:lnRef idx="0">
+        <a:scrgbClr r="0" g="0" b="0"/>
+      </a:lnRef>
+      <a:fillRef idx="0">
+        <a:scrgbClr r="0" g="0" b="0"/>
+      </a:fillRef>
+      <a:effectRef idx="0">
+        <a:scrgbClr r="0" g="0" b="0"/>
+      </a:effectRef>
+      <a:fontRef idx="minor"/>
+    </dgm:style>
+  </dgm:styleLbl>
+</dgm:styleDef>
+</file>
+
+<file path=ppt/notesMasters/notesMaster1.xml><?xml version="1.0" encoding="utf-8"?>
+<p:notesMaster xmlns:a="http://schemas.openxmlformats.org/drawingml/2006/main" xmlns:r="http://schemas.openxmlformats.org/officeDocument/2006/relationships" xmlns:p="http://schemas.openxmlformats.org/presentationml/2006/main">
+  <p:cSld>
+    <p:bg>
+      <p:bgRef idx="1001">
+        <a:schemeClr val="bg1"/>
+      </p:bgRef>
+    </p:bg>
+    <p:spTree>
+      <p:nvGrpSpPr>
+        <p:cNvPr id="1" name=""/>
+        <p:cNvGrpSpPr/>
+        <p:nvPr/>
+      </p:nvGrpSpPr>
+      <p:grpSpPr>
+        <a:xfrm>
+          <a:off x="0" y="0"/>
+          <a:ext cx="0" cy="0"/>
+          <a:chOff x="0" y="0"/>
+          <a:chExt cx="0" cy="0"/>
+        </a:xfrm>
+      </p:grpSpPr>
+      <p:sp>
+        <p:nvSpPr>
+          <p:cNvPr id="2" name="Header Placeholder 1"/>
+          <p:cNvSpPr>
+            <a:spLocks noGrp="1"/>
+          </p:cNvSpPr>
+          <p:nvPr>
+            <p:ph type="hdr" sz="quarter"/>
+          </p:nvPr>
+        </p:nvSpPr>
+        <p:spPr>
+          <a:xfrm>
+            <a:off x="0" y="0"/>
+            <a:ext cx="2971800" cy="458788"/>
+          </a:xfrm>
+          <a:prstGeom prst="rect">
+            <a:avLst/>
+          </a:prstGeom>
+        </p:spPr>
+        <p:txBody>
+          <a:bodyPr vert="horz" lIns="91440" tIns="45720" rIns="91440" bIns="45720" rtlCol="0"/>
+          <a:lstStyle>
+            <a:lvl1pPr algn="l">
+              <a:defRPr sz="1200"/>
+            </a:lvl1pPr>
+          </a:lstStyle>
+          <a:p>
+            <a:endParaRPr lang="en-US"/>
+          </a:p>
+        </p:txBody>
+      </p:sp>
+      <p:sp>
+        <p:nvSpPr>
+          <p:cNvPr id="3" name="Date Placeholder 2"/>
+          <p:cNvSpPr>
+            <a:spLocks noGrp="1"/>
+          </p:cNvSpPr>
+          <p:nvPr>
+            <p:ph type="dt" idx="1"/>
+          </p:nvPr>
+        </p:nvSpPr>
+        <p:spPr>
+          <a:xfrm>
+            <a:off x="3884613" y="0"/>
+            <a:ext cx="2971800" cy="458788"/>
+          </a:xfrm>
+          <a:prstGeom prst="rect">
+            <a:avLst/>
+          </a:prstGeom>
+        </p:spPr>
+        <p:txBody>
+          <a:bodyPr vert="horz" lIns="91440" tIns="45720" rIns="91440" bIns="45720" rtlCol="0"/>
+          <a:lstStyle>
+            <a:lvl1pPr algn="r">
+              <a:defRPr sz="1200"/>
+            </a:lvl1pPr>
+          </a:lstStyle>
+          <a:p>
+            <a:fld id="{20A53592-64BC-4405-AB9D-E05EEAB94994}" type="datetimeFigureOut">
+              <a:rPr lang="en-US" smtClean="0"/>
+              <a:t>5/4/2025</a:t>
+            </a:fld>
+            <a:endParaRPr lang="en-US"/>
+          </a:p>
+        </p:txBody>
+      </p:sp>
+      <p:sp>
+        <p:nvSpPr>
+          <p:cNvPr id="4" name="Slide Image Placeholder 3"/>
+          <p:cNvSpPr>
+            <a:spLocks noGrp="1" noRot="1" noChangeAspect="1"/>
+          </p:cNvSpPr>
+          <p:nvPr>
+            <p:ph type="sldImg" idx="2"/>
+          </p:nvPr>
+        </p:nvSpPr>
+        <p:spPr>
+          <a:xfrm>
+            <a:off x="685800" y="1143000"/>
+            <a:ext cx="5486400" cy="3086100"/>
+          </a:xfrm>
+          <a:prstGeom prst="rect">
+            <a:avLst/>
+          </a:prstGeom>
+          <a:noFill/>
+          <a:ln w="12700">
+            <a:solidFill>
+              <a:prstClr val="black"/>
+            </a:solidFill>
+          </a:ln>
+        </p:spPr>
+        <p:txBody>
+          <a:bodyPr vert="horz" lIns="91440" tIns="45720" rIns="91440" bIns="45720" rtlCol="0" anchor="ctr"/>
+          <a:lstStyle/>
+          <a:p>
+            <a:endParaRPr lang="en-US"/>
+          </a:p>
+        </p:txBody>
+      </p:sp>
+      <p:sp>
+        <p:nvSpPr>
+          <p:cNvPr id="5" name="Notes Placeholder 4"/>
+          <p:cNvSpPr>
+            <a:spLocks noGrp="1"/>
+          </p:cNvSpPr>
+          <p:nvPr>
+            <p:ph type="body" sz="quarter" idx="3"/>
+          </p:nvPr>
+        </p:nvSpPr>
+        <p:spPr>
+          <a:xfrm>
+            <a:off x="685800" y="4400550"/>
+            <a:ext cx="5486400" cy="3600450"/>
+          </a:xfrm>
+          <a:prstGeom prst="rect">
+            <a:avLst/>
+          </a:prstGeom>
+        </p:spPr>
+        <p:txBody>
+          <a:bodyPr vert="horz" lIns="91440" tIns="45720" rIns="91440" bIns="45720" rtlCol="0"/>
+          <a:lstStyle/>
+          <a:p>
+            <a:pPr lvl="0"/>
+            <a:r>
+              <a:rPr lang="en-US"/>
+              <a:t>Click to edit Master text styles</a:t>
+            </a:r>
+          </a:p>
+          <a:p>
+            <a:pPr lvl="1"/>
+            <a:r>
+              <a:rPr lang="en-US"/>
+              <a:t>Second level</a:t>
+            </a:r>
+          </a:p>
+          <a:p>
+            <a:pPr lvl="2"/>
+            <a:r>
+              <a:rPr lang="en-US"/>
+              <a:t>Third level</a:t>
+            </a:r>
+          </a:p>
+          <a:p>
+            <a:pPr lvl="3"/>
+            <a:r>
+              <a:rPr lang="en-US"/>
+              <a:t>Fourth level</a:t>
+            </a:r>
+          </a:p>
+          <a:p>
+            <a:pPr lvl="4"/>
+            <a:r>
+              <a:rPr lang="en-US"/>
+              <a:t>Fifth level</a:t>
+            </a:r>
+          </a:p>
+        </p:txBody>
+      </p:sp>
+      <p:sp>
+        <p:nvSpPr>
+          <p:cNvPr id="6" name="Footer Placeholder 5"/>
+          <p:cNvSpPr>
+            <a:spLocks noGrp="1"/>
+          </p:cNvSpPr>
+          <p:nvPr>
+            <p:ph type="ftr" sz="quarter" idx="4"/>
+          </p:nvPr>
+        </p:nvSpPr>
+        <p:spPr>
+          <a:xfrm>
+            <a:off x="0" y="8685213"/>
+            <a:ext cx="2971800" cy="458787"/>
+          </a:xfrm>
+          <a:prstGeom prst="rect">
+            <a:avLst/>
+          </a:prstGeom>
+        </p:spPr>
+        <p:txBody>
+          <a:bodyPr vert="horz" lIns="91440" tIns="45720" rIns="91440" bIns="45720" rtlCol="0" anchor="b"/>
+          <a:lstStyle>
+            <a:lvl1pPr algn="l">
+              <a:defRPr sz="1200"/>
+            </a:lvl1pPr>
+          </a:lstStyle>
+          <a:p>
+            <a:endParaRPr lang="en-US"/>
+          </a:p>
+        </p:txBody>
+      </p:sp>
+      <p:sp>
+        <p:nvSpPr>
+          <p:cNvPr id="7" name="Slide Number Placeholder 6"/>
+          <p:cNvSpPr>
+            <a:spLocks noGrp="1"/>
+          </p:cNvSpPr>
+          <p:nvPr>
+            <p:ph type="sldNum" sz="quarter" idx="5"/>
+          </p:nvPr>
+        </p:nvSpPr>
+        <p:spPr>
+          <a:xfrm>
+            <a:off x="3884613" y="8685213"/>
+            <a:ext cx="2971800" cy="458787"/>
+          </a:xfrm>
+          <a:prstGeom prst="rect">
+            <a:avLst/>
+          </a:prstGeom>
+        </p:spPr>
+        <p:txBody>
+          <a:bodyPr vert="horz" lIns="91440" tIns="45720" rIns="91440" bIns="45720" rtlCol="0" anchor="b"/>
+          <a:lstStyle>
+            <a:lvl1pPr algn="r">
+              <a:defRPr sz="1200"/>
+            </a:lvl1pPr>
+          </a:lstStyle>
+          <a:p>
+            <a:fld id="{BA727504-312F-4A03-9D0F-66824F1BC73C}" type="slidenum">
+              <a:rPr lang="en-US" smtClean="0"/>
+              <a:t>‹#›</a:t>
+            </a:fld>
+            <a:endParaRPr lang="en-US"/>
+          </a:p>
+        </p:txBody>
+      </p:sp>
+    </p:spTree>
+    <p:extLst>
+      <p:ext uri="{BB962C8B-B14F-4D97-AF65-F5344CB8AC3E}">
+        <p14:creationId xmlns:p14="http://schemas.microsoft.com/office/powerpoint/2010/main" val="753057144"/>
+      </p:ext>
+    </p:extLst>
+  </p:cSld>
+  <p:clrMap bg1="lt1" tx1="dk1" bg2="lt2" tx2="dk2" accent1="accent1" accent2="accent2" accent3="accent3" accent4="accent4" accent5="accent5" accent6="accent6" hlink="hlink" folHlink="folHlink"/>
+  <p:notesStyle>
+    <a:lvl1pPr marL="0" algn="l" defTabSz="914400" rtl="0" eaLnBrk="1" latinLnBrk="0" hangingPunct="1">
+      <a:defRPr sz="1200" kern="1200">
+        <a:solidFill>
+          <a:schemeClr val="tx1"/>
+        </a:solidFill>
+        <a:latin typeface="+mn-lt"/>
+        <a:ea typeface="+mn-ea"/>
+        <a:cs typeface="+mn-cs"/>
+      </a:defRPr>
+    </a:lvl1pPr>
+    <a:lvl2pPr marL="457200" algn="l" defTabSz="914400" rtl="0" eaLnBrk="1" latinLnBrk="0" hangingPunct="1">
+      <a:defRPr sz="1200" kern="1200">
+        <a:solidFill>
+          <a:schemeClr val="tx1"/>
+        </a:solidFill>
+        <a:latin typeface="+mn-lt"/>
+        <a:ea typeface="+mn-ea"/>
+        <a:cs typeface="+mn-cs"/>
+      </a:defRPr>
+    </a:lvl2pPr>
+    <a:lvl3pPr marL="914400" algn="l" defTabSz="914400" rtl="0" eaLnBrk="1" latinLnBrk="0" hangingPunct="1">
+      <a:defRPr sz="1200" kern="1200">
+        <a:solidFill>
+          <a:schemeClr val="tx1"/>
+        </a:solidFill>
+        <a:latin typeface="+mn-lt"/>
+        <a:ea typeface="+mn-ea"/>
+        <a:cs typeface="+mn-cs"/>
+      </a:defRPr>
+    </a:lvl3pPr>
+    <a:lvl4pPr marL="1371600" algn="l" defTabSz="914400" rtl="0" eaLnBrk="1" latinLnBrk="0" hangingPunct="1">
+      <a:defRPr sz="1200" kern="1200">
+        <a:solidFill>
+          <a:schemeClr val="tx1"/>
+        </a:solidFill>
+        <a:latin typeface="+mn-lt"/>
+        <a:ea typeface="+mn-ea"/>
+        <a:cs typeface="+mn-cs"/>
+      </a:defRPr>
+    </a:lvl4pPr>
+    <a:lvl5pPr marL="1828800" algn="l" defTabSz="914400" rtl="0" eaLnBrk="1" latinLnBrk="0" hangingPunct="1">
+      <a:defRPr sz="1200" kern="1200">
+        <a:solidFill>
+          <a:schemeClr val="tx1"/>
+        </a:solidFill>
+        <a:latin typeface="+mn-lt"/>
+        <a:ea typeface="+mn-ea"/>
+        <a:cs typeface="+mn-cs"/>
+      </a:defRPr>
+    </a:lvl5pPr>
+    <a:lvl6pPr marL="2286000" algn="l" defTabSz="914400" rtl="0" eaLnBrk="1" latinLnBrk="0" hangingPunct="1">
+      <a:defRPr sz="1200" kern="1200">
+        <a:solidFill>
+          <a:schemeClr val="tx1"/>
+        </a:solidFill>
+        <a:latin typeface="+mn-lt"/>
+        <a:ea typeface="+mn-ea"/>
+        <a:cs typeface="+mn-cs"/>
+      </a:defRPr>
+    </a:lvl6pPr>
+    <a:lvl7pPr marL="2743200" algn="l" defTabSz="914400" rtl="0" eaLnBrk="1" latinLnBrk="0" hangingPunct="1">
+      <a:defRPr sz="1200" kern="1200">
+        <a:solidFill>
+          <a:schemeClr val="tx1"/>
+        </a:solidFill>
+        <a:latin typeface="+mn-lt"/>
+        <a:ea typeface="+mn-ea"/>
+        <a:cs typeface="+mn-cs"/>
+      </a:defRPr>
+    </a:lvl7pPr>
+    <a:lvl8pPr marL="3200400" algn="l" defTabSz="914400" rtl="0" eaLnBrk="1" latinLnBrk="0" hangingPunct="1">
+      <a:defRPr sz="1200" kern="1200">
+        <a:solidFill>
+          <a:schemeClr val="tx1"/>
+        </a:solidFill>
+        <a:latin typeface="+mn-lt"/>
+        <a:ea typeface="+mn-ea"/>
+        <a:cs typeface="+mn-cs"/>
+      </a:defRPr>
+    </a:lvl8pPr>
+    <a:lvl9pPr marL="3657600" algn="l" defTabSz="914400" rtl="0" eaLnBrk="1" latinLnBrk="0" hangingPunct="1">
+      <a:defRPr sz="1200" kern="1200">
+        <a:solidFill>
+          <a:schemeClr val="tx1"/>
+        </a:solidFill>
+        <a:latin typeface="+mn-lt"/>
+        <a:ea typeface="+mn-ea"/>
+        <a:cs typeface="+mn-cs"/>
+      </a:defRPr>
+    </a:lvl9pPr>
+  </p:notesStyle>
+</p:notesMaster>
+</file>
+
+<file path=ppt/notesSlides/notesSlide1.xml><?xml version="1.0" encoding="utf-8"?>
+<p:notes xmlns:a="http://schemas.openxmlformats.org/drawingml/2006/main" xmlns:r="http://schemas.openxmlformats.org/officeDocument/2006/relationships" xmlns:p="http://schemas.openxmlformats.org/presentationml/2006/main">
+  <p:cSld>
+    <p:spTree>
+      <p:nvGrpSpPr>
+        <p:cNvPr id="1" name=""/>
+        <p:cNvGrpSpPr/>
+        <p:nvPr/>
+      </p:nvGrpSpPr>
+      <p:grpSpPr>
+        <a:xfrm>
+          <a:off x="0" y="0"/>
+          <a:ext cx="0" cy="0"/>
+          <a:chOff x="0" y="0"/>
+          <a:chExt cx="0" cy="0"/>
+        </a:xfrm>
+      </p:grpSpPr>
+      <p:sp>
+        <p:nvSpPr>
+          <p:cNvPr id="2" name="Slide Image Placeholder 1"/>
+          <p:cNvSpPr>
+            <a:spLocks noGrp="1" noRot="1" noChangeAspect="1"/>
+          </p:cNvSpPr>
+          <p:nvPr>
+            <p:ph type="sldImg"/>
+          </p:nvPr>
+        </p:nvSpPr>
+        <p:spPr/>
+      </p:sp>
+      <p:sp>
+        <p:nvSpPr>
+          <p:cNvPr id="3" name="Notes Placeholder 2"/>
+          <p:cNvSpPr>
+            <a:spLocks noGrp="1"/>
+          </p:cNvSpPr>
+          <p:nvPr>
+            <p:ph type="body" idx="1"/>
+          </p:nvPr>
+        </p:nvSpPr>
+        <p:spPr/>
+        <p:txBody>
+          <a:bodyPr/>
+          <a:lstStyle/>
+          <a:p>
+            <a:endParaRPr lang="en-US" dirty="0"/>
+          </a:p>
+        </p:txBody>
+      </p:sp>
+      <p:sp>
+        <p:nvSpPr>
+          <p:cNvPr id="4" name="Slide Number Placeholder 3"/>
+          <p:cNvSpPr>
+            <a:spLocks noGrp="1"/>
+          </p:cNvSpPr>
+          <p:nvPr>
+            <p:ph type="sldNum" sz="quarter" idx="5"/>
+          </p:nvPr>
+        </p:nvSpPr>
+        <p:spPr/>
+        <p:txBody>
+          <a:bodyPr/>
+          <a:lstStyle/>
+          <a:p>
+            <a:fld id="{BA727504-312F-4A03-9D0F-66824F1BC73C}" type="slidenum">
+              <a:rPr lang="en-US" smtClean="0"/>
+              <a:t>7</a:t>
+            </a:fld>
+            <a:endParaRPr lang="en-US"/>
+          </a:p>
+        </p:txBody>
+      </p:sp>
+    </p:spTree>
+    <p:extLst>
+      <p:ext uri="{BB962C8B-B14F-4D97-AF65-F5344CB8AC3E}">
+        <p14:creationId xmlns:p14="http://schemas.microsoft.com/office/powerpoint/2010/main" val="3449497646"/>
+      </p:ext>
+    </p:extLst>
+  </p:cSld>
+  <p:clrMapOvr>
+    <a:masterClrMapping/>
+  </p:clrMapOvr>
+</p:notes>
 </file>
 
 <file path=ppt/slideLayouts/slideLayout1.xml><?xml version="1.0" encoding="utf-8"?>
@@ -24442,120 +28118,6 @@
 <file path=ppt/slides/slide6.xml><?xml version="1.0" encoding="utf-8"?>
 <p:sld xmlns:a="http://schemas.openxmlformats.org/drawingml/2006/main" xmlns:r="http://schemas.openxmlformats.org/officeDocument/2006/relationships" xmlns:p="http://schemas.openxmlformats.org/presentationml/2006/main">
   <p:cSld>
-    <p:spTree>
-      <p:nvGrpSpPr>
-        <p:cNvPr id="1" name=""/>
-        <p:cNvGrpSpPr/>
-        <p:nvPr/>
-      </p:nvGrpSpPr>
-      <p:grpSpPr>
-        <a:xfrm>
-          <a:off x="0" y="0"/>
-          <a:ext cx="0" cy="0"/>
-          <a:chOff x="0" y="0"/>
-          <a:chExt cx="0" cy="0"/>
-        </a:xfrm>
-      </p:grpSpPr>
-      <p:sp>
-        <p:nvSpPr>
-          <p:cNvPr id="2" name="Title 1">
-            <a:extLst>
-              <a:ext uri="{FF2B5EF4-FFF2-40B4-BE49-F238E27FC236}">
-                <a16:creationId xmlns:a16="http://schemas.microsoft.com/office/drawing/2014/main" id="{4211EA11-598B-0B74-9E30-AD6A608E675A}"/>
-              </a:ext>
-            </a:extLst>
-          </p:cNvPr>
-          <p:cNvSpPr>
-            <a:spLocks noGrp="1"/>
-          </p:cNvSpPr>
-          <p:nvPr>
-            <p:ph type="title"/>
-          </p:nvPr>
-        </p:nvSpPr>
-        <p:spPr/>
-        <p:txBody>
-          <a:bodyPr/>
-          <a:lstStyle/>
-          <a:p>
-            <a:r>
-              <a:rPr lang="en-US" dirty="0"/>
-              <a:t>Lessons Learned: Patrick</a:t>
-            </a:r>
-          </a:p>
-        </p:txBody>
-      </p:sp>
-      <p:sp>
-        <p:nvSpPr>
-          <p:cNvPr id="3" name="Content Placeholder 2">
-            <a:extLst>
-              <a:ext uri="{FF2B5EF4-FFF2-40B4-BE49-F238E27FC236}">
-                <a16:creationId xmlns:a16="http://schemas.microsoft.com/office/drawing/2014/main" id="{1D4F2EAF-F5A3-60C5-9486-CA1C78F3E677}"/>
-              </a:ext>
-            </a:extLst>
-          </p:cNvPr>
-          <p:cNvSpPr>
-            <a:spLocks noGrp="1"/>
-          </p:cNvSpPr>
-          <p:nvPr>
-            <p:ph idx="1"/>
-          </p:nvPr>
-        </p:nvSpPr>
-        <p:spPr/>
-        <p:txBody>
-          <a:bodyPr/>
-          <a:lstStyle/>
-          <a:p>
-            <a:r>
-              <a:rPr lang="en-US" dirty="0"/>
-              <a:t>There are still skills to work on</a:t>
-            </a:r>
-          </a:p>
-          <a:p>
-            <a:pPr lvl="1"/>
-            <a:endParaRPr lang="en-US" dirty="0"/>
-          </a:p>
-          <a:p>
-            <a:pPr lvl="1"/>
-            <a:r>
-              <a:rPr lang="en-US" dirty="0"/>
-              <a:t>Communication</a:t>
-            </a:r>
-          </a:p>
-          <a:p>
-            <a:pPr lvl="1"/>
-            <a:r>
-              <a:rPr lang="en-US" dirty="0"/>
-              <a:t>Acting in a timely manner</a:t>
-            </a:r>
-          </a:p>
-          <a:p>
-            <a:pPr lvl="1"/>
-            <a:endParaRPr lang="en-US" dirty="0"/>
-          </a:p>
-          <a:p>
-            <a:r>
-              <a:rPr lang="en-US" dirty="0"/>
-              <a:t>Relying on others has become easier</a:t>
-            </a:r>
-          </a:p>
-        </p:txBody>
-      </p:sp>
-    </p:spTree>
-    <p:extLst>
-      <p:ext uri="{BB962C8B-B14F-4D97-AF65-F5344CB8AC3E}">
-        <p14:creationId xmlns:p14="http://schemas.microsoft.com/office/powerpoint/2010/main" val="1628270987"/>
-      </p:ext>
-    </p:extLst>
-  </p:cSld>
-  <p:clrMapOvr>
-    <a:masterClrMapping/>
-  </p:clrMapOvr>
-</p:sld>
-</file>
-
-<file path=ppt/slides/slide7.xml><?xml version="1.0" encoding="utf-8"?>
-<p:sld xmlns:a="http://schemas.openxmlformats.org/drawingml/2006/main" xmlns:r="http://schemas.openxmlformats.org/officeDocument/2006/relationships" xmlns:p="http://schemas.openxmlformats.org/presentationml/2006/main">
-  <p:cSld>
     <p:bg>
       <p:bgPr>
         <a:solidFill>
@@ -25173,6 +28735,419 @@
       <p:bldP spid="8" grpId="0"/>
     </p:bldLst>
   </p:timing>
+</p:sld>
+</file>
+
+<file path=ppt/slides/slide7.xml><?xml version="1.0" encoding="utf-8"?>
+<p:sld xmlns:a="http://schemas.openxmlformats.org/drawingml/2006/main" xmlns:r="http://schemas.openxmlformats.org/officeDocument/2006/relationships" xmlns:p="http://schemas.openxmlformats.org/presentationml/2006/main">
+  <p:cSld>
+    <p:bg>
+      <p:bgRef idx="1003">
+        <a:schemeClr val="bg2"/>
+      </p:bgRef>
+    </p:bg>
+    <p:spTree>
+      <p:nvGrpSpPr>
+        <p:cNvPr id="1" name="">
+          <a:extLst>
+            <a:ext uri="{FF2B5EF4-FFF2-40B4-BE49-F238E27FC236}">
+              <a16:creationId xmlns:a16="http://schemas.microsoft.com/office/drawing/2014/main" id="{9B8BEC0D-CFA0-FA04-D2B2-E1FD8E6522E3}"/>
+            </a:ext>
+          </a:extLst>
+        </p:cNvPr>
+        <p:cNvGrpSpPr/>
+        <p:nvPr/>
+      </p:nvGrpSpPr>
+      <p:grpSpPr>
+        <a:xfrm>
+          <a:off x="0" y="0"/>
+          <a:ext cx="0" cy="0"/>
+          <a:chOff x="0" y="0"/>
+          <a:chExt cx="0" cy="0"/>
+        </a:xfrm>
+      </p:grpSpPr>
+      <p:sp useBgFill="1">
+        <p:nvSpPr>
+          <p:cNvPr id="9" name="Rectangle 8">
+            <a:extLst>
+              <a:ext uri="{FF2B5EF4-FFF2-40B4-BE49-F238E27FC236}">
+                <a16:creationId xmlns:a16="http://schemas.microsoft.com/office/drawing/2014/main" id="{B528151F-2DF6-ED20-DB4E-1D1132F77386}"/>
+              </a:ext>
+              <a:ext uri="{C183D7F6-B498-43B3-948B-1728B52AA6E4}">
+                <adec:decorative xmlns:adec="http://schemas.microsoft.com/office/drawing/2017/decorative" val="1"/>
+              </a:ext>
+            </a:extLst>
+          </p:cNvPr>
+          <p:cNvSpPr>
+            <a:spLocks noGrp="1" noRot="1" noChangeAspect="1" noMove="1" noResize="1" noEditPoints="1" noAdjustHandles="1" noChangeArrowheads="1" noChangeShapeType="1" noTextEdit="1"/>
+          </p:cNvSpPr>
+          <p:nvPr>
+            <p:extLst>
+              <p:ext uri="{386F3935-93C4-4BCD-93E2-E3B085C9AB24}">
+                <p16:designElem xmlns:p16="http://schemas.microsoft.com/office/powerpoint/2015/main" val="1"/>
+              </p:ext>
+            </p:extLst>
+          </p:nvPr>
+        </p:nvSpPr>
+        <p:spPr>
+          <a:xfrm>
+            <a:off x="0" y="0"/>
+            <a:ext cx="12192000" cy="6858000"/>
+          </a:xfrm>
+          <a:prstGeom prst="rect">
+            <a:avLst/>
+          </a:prstGeom>
+          <a:ln w="12700" cap="flat" cmpd="sng" algn="ctr">
+            <a:noFill/>
+            <a:prstDash val="solid"/>
+            <a:miter lim="800000"/>
+          </a:ln>
+          <a:effectLst/>
+          <a:extLst>
+            <a:ext uri="{91240B29-F687-4F45-9708-019B960494DF}">
+              <a14:hiddenLine xmlns:a14="http://schemas.microsoft.com/office/drawing/2010/main" w="12700" cap="flat" cmpd="sng" algn="ctr">
+                <a:solidFill>
+                  <a:schemeClr val="accent1">
+                    <a:shade val="50000"/>
+                  </a:schemeClr>
+                </a:solidFill>
+                <a:prstDash val="solid"/>
+                <a:miter lim="800000"/>
+              </a14:hiddenLine>
+            </a:ext>
+          </a:extLst>
+        </p:spPr>
+        <p:style>
+          <a:lnRef idx="2">
+            <a:schemeClr val="accent1">
+              <a:shade val="50000"/>
+            </a:schemeClr>
+          </a:lnRef>
+          <a:fillRef idx="1">
+            <a:schemeClr val="accent1"/>
+          </a:fillRef>
+          <a:effectRef idx="0">
+            <a:schemeClr val="accent1"/>
+          </a:effectRef>
+          <a:fontRef idx="minor">
+            <a:schemeClr val="lt1"/>
+          </a:fontRef>
+        </p:style>
+        <p:txBody>
+          <a:bodyPr rtlCol="0" anchor="ctr"/>
+          <a:lstStyle/>
+          <a:p>
+            <a:pPr algn="ctr"/>
+            <a:endParaRPr lang="en-US"/>
+          </a:p>
+        </p:txBody>
+      </p:sp>
+      <p:sp>
+        <p:nvSpPr>
+          <p:cNvPr id="11" name="Rectangle 10">
+            <a:extLst>
+              <a:ext uri="{FF2B5EF4-FFF2-40B4-BE49-F238E27FC236}">
+                <a16:creationId xmlns:a16="http://schemas.microsoft.com/office/drawing/2014/main" id="{A2D26B7C-0681-7264-942F-9E8C63EA6430}"/>
+              </a:ext>
+              <a:ext uri="{C183D7F6-B498-43B3-948B-1728B52AA6E4}">
+                <adec:decorative xmlns:adec="http://schemas.microsoft.com/office/drawing/2017/decorative" val="1"/>
+              </a:ext>
+            </a:extLst>
+          </p:cNvPr>
+          <p:cNvSpPr>
+            <a:spLocks noGrp="1" noRot="1" noChangeAspect="1" noMove="1" noResize="1" noEditPoints="1" noAdjustHandles="1" noChangeArrowheads="1" noChangeShapeType="1" noTextEdit="1"/>
+          </p:cNvSpPr>
+          <p:nvPr>
+            <p:extLst>
+              <p:ext uri="{386F3935-93C4-4BCD-93E2-E3B085C9AB24}">
+                <p16:designElem xmlns:p16="http://schemas.microsoft.com/office/powerpoint/2015/main" val="1"/>
+              </p:ext>
+            </p:extLst>
+          </p:nvPr>
+        </p:nvSpPr>
+        <p:spPr>
+          <a:xfrm flipH="1">
+            <a:off x="2" y="0"/>
+            <a:ext cx="12191998" cy="1575955"/>
+          </a:xfrm>
+          <a:prstGeom prst="rect">
+            <a:avLst/>
+          </a:prstGeom>
+          <a:gradFill>
+            <a:gsLst>
+              <a:gs pos="0">
+                <a:srgbClr val="000000">
+                  <a:alpha val="96000"/>
+                </a:srgbClr>
+              </a:gs>
+              <a:gs pos="100000">
+                <a:schemeClr val="accent1">
+                  <a:lumMod val="75000"/>
+                </a:schemeClr>
+              </a:gs>
+            </a:gsLst>
+            <a:lin ang="8400000" scaled="0"/>
+          </a:gradFill>
+          <a:ln>
+            <a:noFill/>
+          </a:ln>
+        </p:spPr>
+        <p:style>
+          <a:lnRef idx="2">
+            <a:schemeClr val="accent1">
+              <a:shade val="50000"/>
+            </a:schemeClr>
+          </a:lnRef>
+          <a:fillRef idx="1">
+            <a:schemeClr val="accent1"/>
+          </a:fillRef>
+          <a:effectRef idx="0">
+            <a:schemeClr val="accent1"/>
+          </a:effectRef>
+          <a:fontRef idx="minor">
+            <a:schemeClr val="lt1"/>
+          </a:fontRef>
+        </p:style>
+        <p:txBody>
+          <a:bodyPr rtlCol="0" anchor="ctr"/>
+          <a:lstStyle/>
+          <a:p>
+            <a:pPr algn="ctr"/>
+            <a:endParaRPr lang="en-US"/>
+          </a:p>
+        </p:txBody>
+      </p:sp>
+      <p:sp>
+        <p:nvSpPr>
+          <p:cNvPr id="13" name="Rectangle 12">
+            <a:extLst>
+              <a:ext uri="{FF2B5EF4-FFF2-40B4-BE49-F238E27FC236}">
+                <a16:creationId xmlns:a16="http://schemas.microsoft.com/office/drawing/2014/main" id="{A7F6A69E-661C-3F54-2E34-4D3AA50C0D18}"/>
+              </a:ext>
+              <a:ext uri="{C183D7F6-B498-43B3-948B-1728B52AA6E4}">
+                <adec:decorative xmlns:adec="http://schemas.microsoft.com/office/drawing/2017/decorative" val="1"/>
+              </a:ext>
+            </a:extLst>
+          </p:cNvPr>
+          <p:cNvSpPr>
+            <a:spLocks noGrp="1" noRot="1" noChangeAspect="1" noMove="1" noResize="1" noEditPoints="1" noAdjustHandles="1" noChangeArrowheads="1" noChangeShapeType="1" noTextEdit="1"/>
+          </p:cNvSpPr>
+          <p:nvPr>
+            <p:extLst>
+              <p:ext uri="{386F3935-93C4-4BCD-93E2-E3B085C9AB24}">
+                <p16:designElem xmlns:p16="http://schemas.microsoft.com/office/powerpoint/2015/main" val="1"/>
+              </p:ext>
+            </p:extLst>
+          </p:nvPr>
+        </p:nvSpPr>
+        <p:spPr>
+          <a:xfrm rot="10800000" flipH="1">
+            <a:off x="8128857" y="0"/>
+            <a:ext cx="4063143" cy="1576412"/>
+          </a:xfrm>
+          <a:prstGeom prst="rect">
+            <a:avLst/>
+          </a:prstGeom>
+          <a:gradFill>
+            <a:gsLst>
+              <a:gs pos="19000">
+                <a:schemeClr val="accent1">
+                  <a:lumMod val="50000"/>
+                  <a:alpha val="68000"/>
+                </a:schemeClr>
+              </a:gs>
+              <a:gs pos="100000">
+                <a:schemeClr val="accent1">
+                  <a:alpha val="79000"/>
+                </a:schemeClr>
+              </a:gs>
+            </a:gsLst>
+            <a:lin ang="19200000" scaled="0"/>
+          </a:gradFill>
+          <a:ln>
+            <a:noFill/>
+          </a:ln>
+        </p:spPr>
+        <p:style>
+          <a:lnRef idx="2">
+            <a:schemeClr val="accent1">
+              <a:shade val="50000"/>
+            </a:schemeClr>
+          </a:lnRef>
+          <a:fillRef idx="1">
+            <a:schemeClr val="accent1"/>
+          </a:fillRef>
+          <a:effectRef idx="0">
+            <a:schemeClr val="accent1"/>
+          </a:effectRef>
+          <a:fontRef idx="minor">
+            <a:schemeClr val="lt1"/>
+          </a:fontRef>
+        </p:style>
+        <p:txBody>
+          <a:bodyPr rtlCol="0" anchor="ctr"/>
+          <a:lstStyle/>
+          <a:p>
+            <a:pPr algn="ctr"/>
+            <a:endParaRPr lang="en-US"/>
+          </a:p>
+        </p:txBody>
+      </p:sp>
+      <p:sp>
+        <p:nvSpPr>
+          <p:cNvPr id="15" name="Rectangle 14">
+            <a:extLst>
+              <a:ext uri="{FF2B5EF4-FFF2-40B4-BE49-F238E27FC236}">
+                <a16:creationId xmlns:a16="http://schemas.microsoft.com/office/drawing/2014/main" id="{B81B9186-32B0-45E2-0189-CC85C14E3E81}"/>
+              </a:ext>
+              <a:ext uri="{C183D7F6-B498-43B3-948B-1728B52AA6E4}">
+                <adec:decorative xmlns:adec="http://schemas.microsoft.com/office/drawing/2017/decorative" val="1"/>
+              </a:ext>
+            </a:extLst>
+          </p:cNvPr>
+          <p:cNvSpPr>
+            <a:spLocks noGrp="1" noRot="1" noChangeAspect="1" noMove="1" noResize="1" noEditPoints="1" noAdjustHandles="1" noChangeArrowheads="1" noChangeShapeType="1" noTextEdit="1"/>
+          </p:cNvSpPr>
+          <p:nvPr>
+            <p:extLst>
+              <p:ext uri="{386F3935-93C4-4BCD-93E2-E3B085C9AB24}">
+                <p16:designElem xmlns:p16="http://schemas.microsoft.com/office/powerpoint/2015/main" val="1"/>
+              </p:ext>
+            </p:extLst>
+          </p:nvPr>
+        </p:nvSpPr>
+        <p:spPr>
+          <a:xfrm rot="5400000">
+            <a:off x="5307777" y="-5307778"/>
+            <a:ext cx="1576446" cy="12192002"/>
+          </a:xfrm>
+          <a:prstGeom prst="rect">
+            <a:avLst/>
+          </a:prstGeom>
+          <a:gradFill>
+            <a:gsLst>
+              <a:gs pos="23000">
+                <a:schemeClr val="accent1">
+                  <a:alpha val="0"/>
+                </a:schemeClr>
+              </a:gs>
+              <a:gs pos="99000">
+                <a:srgbClr val="000000">
+                  <a:alpha val="74000"/>
+                </a:srgbClr>
+              </a:gs>
+            </a:gsLst>
+            <a:lin ang="20400000" scaled="0"/>
+          </a:gradFill>
+          <a:ln>
+            <a:noFill/>
+          </a:ln>
+        </p:spPr>
+        <p:style>
+          <a:lnRef idx="2">
+            <a:schemeClr val="accent1">
+              <a:shade val="50000"/>
+            </a:schemeClr>
+          </a:lnRef>
+          <a:fillRef idx="1">
+            <a:schemeClr val="accent1"/>
+          </a:fillRef>
+          <a:effectRef idx="0">
+            <a:schemeClr val="accent1"/>
+          </a:effectRef>
+          <a:fontRef idx="minor">
+            <a:schemeClr val="lt1"/>
+          </a:fontRef>
+        </p:style>
+        <p:txBody>
+          <a:bodyPr rtlCol="0" anchor="ctr"/>
+          <a:lstStyle/>
+          <a:p>
+            <a:pPr algn="ctr"/>
+            <a:endParaRPr lang="en-US" dirty="0"/>
+          </a:p>
+        </p:txBody>
+      </p:sp>
+      <p:sp>
+        <p:nvSpPr>
+          <p:cNvPr id="2" name="Title 1">
+            <a:extLst>
+              <a:ext uri="{FF2B5EF4-FFF2-40B4-BE49-F238E27FC236}">
+                <a16:creationId xmlns:a16="http://schemas.microsoft.com/office/drawing/2014/main" id="{32E9D5D3-2CE0-45BD-CA91-D94B08533CA2}"/>
+              </a:ext>
+            </a:extLst>
+          </p:cNvPr>
+          <p:cNvSpPr>
+            <a:spLocks noGrp="1"/>
+          </p:cNvSpPr>
+          <p:nvPr>
+            <p:ph type="title"/>
+          </p:nvPr>
+        </p:nvSpPr>
+        <p:spPr>
+          <a:xfrm>
+            <a:off x="1371597" y="348865"/>
+            <a:ext cx="10044023" cy="877729"/>
+          </a:xfrm>
+        </p:spPr>
+        <p:txBody>
+          <a:bodyPr anchor="ctr">
+            <a:normAutofit/>
+          </a:bodyPr>
+          <a:lstStyle/>
+          <a:p>
+            <a:r>
+              <a:rPr lang="en-US" sz="4000" dirty="0">
+                <a:solidFill>
+                  <a:srgbClr val="FFFFFF"/>
+                </a:solidFill>
+              </a:rPr>
+              <a:t>Lessons Learned: Patrick</a:t>
+            </a:r>
+          </a:p>
+        </p:txBody>
+      </p:sp>
+      <p:graphicFrame>
+        <p:nvGraphicFramePr>
+          <p:cNvPr id="5" name="Content Placeholder 2">
+            <a:extLst>
+              <a:ext uri="{FF2B5EF4-FFF2-40B4-BE49-F238E27FC236}">
+                <a16:creationId xmlns:a16="http://schemas.microsoft.com/office/drawing/2014/main" id="{791E7570-B0EB-C1B2-49CC-0398A96156DB}"/>
+              </a:ext>
+            </a:extLst>
+          </p:cNvPr>
+          <p:cNvGraphicFramePr>
+            <a:graphicFrameLocks noGrp="1"/>
+          </p:cNvGraphicFramePr>
+          <p:nvPr>
+            <p:ph idx="1"/>
+            <p:extLst>
+              <p:ext uri="{D42A27DB-BD31-4B8C-83A1-F6EECF244321}">
+                <p14:modId xmlns:p14="http://schemas.microsoft.com/office/powerpoint/2010/main" val="1699859545"/>
+              </p:ext>
+            </p:extLst>
+          </p:nvPr>
+        </p:nvGraphicFramePr>
+        <p:xfrm>
+          <a:off x="632085" y="2083082"/>
+          <a:ext cx="10927829" cy="4192805"/>
+        </p:xfrm>
+        <a:graphic>
+          <a:graphicData uri="http://schemas.openxmlformats.org/drawingml/2006/diagram">
+            <dgm:relIds xmlns:dgm="http://schemas.openxmlformats.org/drawingml/2006/diagram" xmlns:r="http://schemas.openxmlformats.org/officeDocument/2006/relationships" r:dm="rId4" r:lo="rId5" r:qs="rId6" r:cs="rId7"/>
+          </a:graphicData>
+        </a:graphic>
+      </p:graphicFrame>
+    </p:spTree>
+    <p:extLst>
+      <p:ext uri="{BB962C8B-B14F-4D97-AF65-F5344CB8AC3E}">
+        <p14:creationId xmlns:p14="http://schemas.microsoft.com/office/powerpoint/2010/main" val="2365307298"/>
+      </p:ext>
+    </p:extLst>
+  </p:cSld>
+  <p:clrMapOvr>
+    <a:overrideClrMapping bg1="lt1" tx1="dk1" bg2="lt2" tx2="dk2" accent1="accent1" accent2="accent2" accent3="accent3" accent4="accent4" accent5="accent5" accent6="accent6" hlink="hlink" folHlink="folHlink"/>
+  </p:clrMapOvr>
 </p:sld>
 </file>
 
@@ -26283,4 +30258,362 @@
     </a:ext>
   </a:extLst>
 </a:theme>
+</file>
+
+<file path=ppt/theme/theme3.xml><?xml version="1.0" encoding="utf-8"?>
+<a:theme xmlns:a="http://schemas.openxmlformats.org/drawingml/2006/main" name="Office Theme">
+  <a:themeElements>
+    <a:clrScheme name="Office">
+      <a:dk1>
+        <a:sysClr val="windowText" lastClr="000000"/>
+      </a:dk1>
+      <a:lt1>
+        <a:sysClr val="window" lastClr="FFFFFF"/>
+      </a:lt1>
+      <a:dk2>
+        <a:srgbClr val="0E2841"/>
+      </a:dk2>
+      <a:lt2>
+        <a:srgbClr val="E8E8E8"/>
+      </a:lt2>
+      <a:accent1>
+        <a:srgbClr val="156082"/>
+      </a:accent1>
+      <a:accent2>
+        <a:srgbClr val="E97132"/>
+      </a:accent2>
+      <a:accent3>
+        <a:srgbClr val="196B24"/>
+      </a:accent3>
+      <a:accent4>
+        <a:srgbClr val="0F9ED5"/>
+      </a:accent4>
+      <a:accent5>
+        <a:srgbClr val="A02B93"/>
+      </a:accent5>
+      <a:accent6>
+        <a:srgbClr val="4EA72E"/>
+      </a:accent6>
+      <a:hlink>
+        <a:srgbClr val="467886"/>
+      </a:hlink>
+      <a:folHlink>
+        <a:srgbClr val="96607D"/>
+      </a:folHlink>
+    </a:clrScheme>
+    <a:fontScheme name="Office">
+      <a:majorFont>
+        <a:latin typeface="Aptos Display" panose="02110004020202020204"/>
+        <a:ea typeface=""/>
+        <a:cs typeface=""/>
+        <a:font script="Jpan" typeface="游ゴシック Light"/>
+        <a:font script="Hang" typeface="맑은 고딕"/>
+        <a:font script="Hans" typeface="等线 Light"/>
+        <a:font script="Hant" typeface="新細明體"/>
+        <a:font script="Arab" typeface="Times New Roman"/>
+        <a:font script="Hebr" typeface="Times New Roman"/>
+        <a:font script="Thai" typeface="Angsana New"/>
+        <a:font script="Ethi" typeface="Nyala"/>
+        <a:font script="Beng" typeface="Vrinda"/>
+        <a:font script="Gujr" typeface="Shruti"/>
+        <a:font script="Khmr" typeface="MoolBoran"/>
+        <a:font script="Knda" typeface="Tunga"/>
+        <a:font script="Guru" typeface="Raavi"/>
+        <a:font script="Cans" typeface="Euphemia"/>
+        <a:font script="Cher" typeface="Plantagenet Cherokee"/>
+        <a:font script="Yiii" typeface="Microsoft Yi Baiti"/>
+        <a:font script="Tibt" typeface="Microsoft Himalaya"/>
+        <a:font script="Thaa" typeface="MV Boli"/>
+        <a:font script="Deva" typeface="Mangal"/>
+        <a:font script="Telu" typeface="Gautami"/>
+        <a:font script="Taml" typeface="Latha"/>
+        <a:font script="Syrc" typeface="Estrangelo Edessa"/>
+        <a:font script="Orya" typeface="Kalinga"/>
+        <a:font script="Mlym" typeface="Kartika"/>
+        <a:font script="Laoo" typeface="DokChampa"/>
+        <a:font script="Sinh" typeface="Iskoola Pota"/>
+        <a:font script="Mong" typeface="Mongolian Baiti"/>
+        <a:font script="Viet" typeface="Times New Roman"/>
+        <a:font script="Uigh" typeface="Microsoft Uighur"/>
+        <a:font script="Geor" typeface="Sylfaen"/>
+        <a:font script="Armn" typeface="Arial"/>
+        <a:font script="Bugi" typeface="Leelawadee UI"/>
+        <a:font script="Bopo" typeface="Microsoft JhengHei"/>
+        <a:font script="Java" typeface="Javanese Text"/>
+        <a:font script="Lisu" typeface="Segoe UI"/>
+        <a:font script="Mymr" typeface="Myanmar Text"/>
+        <a:font script="Nkoo" typeface="Ebrima"/>
+        <a:font script="Olck" typeface="Nirmala UI"/>
+        <a:font script="Osma" typeface="Ebrima"/>
+        <a:font script="Phag" typeface="Phagspa"/>
+        <a:font script="Syrn" typeface="Estrangelo Edessa"/>
+        <a:font script="Syrj" typeface="Estrangelo Edessa"/>
+        <a:font script="Syre" typeface="Estrangelo Edessa"/>
+        <a:font script="Sora" typeface="Nirmala UI"/>
+        <a:font script="Tale" typeface="Microsoft Tai Le"/>
+        <a:font script="Talu" typeface="Microsoft New Tai Lue"/>
+        <a:font script="Tfng" typeface="Ebrima"/>
+      </a:majorFont>
+      <a:minorFont>
+        <a:latin typeface="Aptos" panose="02110004020202020204"/>
+        <a:ea typeface=""/>
+        <a:cs typeface=""/>
+        <a:font script="Jpan" typeface="游ゴシック"/>
+        <a:font script="Hang" typeface="맑은 고딕"/>
+        <a:font script="Hans" typeface="等线"/>
+        <a:font script="Hant" typeface="新細明體"/>
+        <a:font script="Arab" typeface="Arial"/>
+        <a:font script="Hebr" typeface="Arial"/>
+        <a:font script="Thai" typeface="Cordia New"/>
+        <a:font script="Ethi" typeface="Nyala"/>
+        <a:font script="Beng" typeface="Vrinda"/>
+        <a:font script="Gujr" typeface="Shruti"/>
+        <a:font script="Khmr" typeface="DaunPenh"/>
+        <a:font script="Knda" typeface="Tunga"/>
+        <a:font script="Guru" typeface="Raavi"/>
+        <a:font script="Cans" typeface="Euphemia"/>
+        <a:font script="Cher" typeface="Plantagenet Cherokee"/>
+        <a:font script="Yiii" typeface="Microsoft Yi Baiti"/>
+        <a:font script="Tibt" typeface="Microsoft Himalaya"/>
+        <a:font script="Thaa" typeface="MV Boli"/>
+        <a:font script="Deva" typeface="Mangal"/>
+        <a:font script="Telu" typeface="Gautami"/>
+        <a:font script="Taml" typeface="Latha"/>
+        <a:font script="Syrc" typeface="Estrangelo Edessa"/>
+        <a:font script="Orya" typeface="Kalinga"/>
+        <a:font script="Mlym" typeface="Kartika"/>
+        <a:font script="Laoo" typeface="DokChampa"/>
+        <a:font script="Sinh" typeface="Iskoola Pota"/>
+        <a:font script="Mong" typeface="Mongolian Baiti"/>
+        <a:font script="Viet" typeface="Arial"/>
+        <a:font script="Uigh" typeface="Microsoft Uighur"/>
+        <a:font script="Geor" typeface="Sylfaen"/>
+        <a:font script="Armn" typeface="Arial"/>
+        <a:font script="Bugi" typeface="Leelawadee UI"/>
+        <a:font script="Bopo" typeface="Microsoft JhengHei"/>
+        <a:font script="Java" typeface="Javanese Text"/>
+        <a:font script="Lisu" typeface="Segoe UI"/>
+        <a:font script="Mymr" typeface="Myanmar Text"/>
+        <a:font script="Nkoo" typeface="Ebrima"/>
+        <a:font script="Olck" typeface="Nirmala UI"/>
+        <a:font script="Osma" typeface="Ebrima"/>
+        <a:font script="Phag" typeface="Phagspa"/>
+        <a:font script="Syrn" typeface="Estrangelo Edessa"/>
+        <a:font script="Syrj" typeface="Estrangelo Edessa"/>
+        <a:font script="Syre" typeface="Estrangelo Edessa"/>
+        <a:font script="Sora" typeface="Nirmala UI"/>
+        <a:font script="Tale" typeface="Microsoft Tai Le"/>
+        <a:font script="Talu" typeface="Microsoft New Tai Lue"/>
+        <a:font script="Tfng" typeface="Ebrima"/>
+      </a:minorFont>
+    </a:fontScheme>
+    <a:fmtScheme name="Office">
+      <a:fillStyleLst>
+        <a:solidFill>
+          <a:schemeClr val="phClr"/>
+        </a:solidFill>
+        <a:gradFill rotWithShape="1">
+          <a:gsLst>
+            <a:gs pos="0">
+              <a:schemeClr val="phClr">
+                <a:lumMod val="110000"/>
+                <a:satMod val="105000"/>
+                <a:tint val="67000"/>
+              </a:schemeClr>
+            </a:gs>
+            <a:gs pos="50000">
+              <a:schemeClr val="phClr">
+                <a:lumMod val="105000"/>
+                <a:satMod val="103000"/>
+                <a:tint val="73000"/>
+              </a:schemeClr>
+            </a:gs>
+            <a:gs pos="100000">
+              <a:schemeClr val="phClr">
+                <a:lumMod val="105000"/>
+                <a:satMod val="109000"/>
+                <a:tint val="81000"/>
+              </a:schemeClr>
+            </a:gs>
+          </a:gsLst>
+          <a:lin ang="5400000" scaled="0"/>
+        </a:gradFill>
+        <a:gradFill rotWithShape="1">
+          <a:gsLst>
+            <a:gs pos="0">
+              <a:schemeClr val="phClr">
+                <a:satMod val="103000"/>
+                <a:lumMod val="102000"/>
+                <a:tint val="94000"/>
+              </a:schemeClr>
+            </a:gs>
+            <a:gs pos="50000">
+              <a:schemeClr val="phClr">
+                <a:satMod val="110000"/>
+                <a:lumMod val="100000"/>
+                <a:shade val="100000"/>
+              </a:schemeClr>
+            </a:gs>
+            <a:gs pos="100000">
+              <a:schemeClr val="phClr">
+                <a:lumMod val="99000"/>
+                <a:satMod val="120000"/>
+                <a:shade val="78000"/>
+              </a:schemeClr>
+            </a:gs>
+          </a:gsLst>
+          <a:lin ang="5400000" scaled="0"/>
+        </a:gradFill>
+      </a:fillStyleLst>
+      <a:lnStyleLst>
+        <a:ln w="12700" cap="flat" cmpd="sng" algn="ctr">
+          <a:solidFill>
+            <a:schemeClr val="phClr"/>
+          </a:solidFill>
+          <a:prstDash val="solid"/>
+          <a:miter lim="800000"/>
+        </a:ln>
+        <a:ln w="19050" cap="flat" cmpd="sng" algn="ctr">
+          <a:solidFill>
+            <a:schemeClr val="phClr"/>
+          </a:solidFill>
+          <a:prstDash val="solid"/>
+          <a:miter lim="800000"/>
+        </a:ln>
+        <a:ln w="25400" cap="flat" cmpd="sng" algn="ctr">
+          <a:solidFill>
+            <a:schemeClr val="phClr"/>
+          </a:solidFill>
+          <a:prstDash val="solid"/>
+          <a:miter lim="800000"/>
+        </a:ln>
+      </a:lnStyleLst>
+      <a:effectStyleLst>
+        <a:effectStyle>
+          <a:effectLst/>
+        </a:effectStyle>
+        <a:effectStyle>
+          <a:effectLst/>
+        </a:effectStyle>
+        <a:effectStyle>
+          <a:effectLst>
+            <a:outerShdw blurRad="57150" dist="19050" dir="5400000" algn="ctr" rotWithShape="0">
+              <a:srgbClr val="000000">
+                <a:alpha val="63000"/>
+              </a:srgbClr>
+            </a:outerShdw>
+          </a:effectLst>
+        </a:effectStyle>
+      </a:effectStyleLst>
+      <a:bgFillStyleLst>
+        <a:solidFill>
+          <a:schemeClr val="phClr"/>
+        </a:solidFill>
+        <a:solidFill>
+          <a:schemeClr val="phClr">
+            <a:tint val="95000"/>
+            <a:satMod val="170000"/>
+          </a:schemeClr>
+        </a:solidFill>
+        <a:gradFill rotWithShape="1">
+          <a:gsLst>
+            <a:gs pos="0">
+              <a:schemeClr val="phClr">
+                <a:tint val="93000"/>
+                <a:satMod val="150000"/>
+                <a:shade val="98000"/>
+                <a:lumMod val="102000"/>
+              </a:schemeClr>
+            </a:gs>
+            <a:gs pos="50000">
+              <a:schemeClr val="phClr">
+                <a:tint val="98000"/>
+                <a:satMod val="130000"/>
+                <a:shade val="90000"/>
+                <a:lumMod val="103000"/>
+              </a:schemeClr>
+            </a:gs>
+            <a:gs pos="100000">
+              <a:schemeClr val="phClr">
+                <a:shade val="63000"/>
+                <a:satMod val="120000"/>
+              </a:schemeClr>
+            </a:gs>
+          </a:gsLst>
+          <a:lin ang="5400000" scaled="0"/>
+        </a:gradFill>
+      </a:bgFillStyleLst>
+    </a:fmtScheme>
+  </a:themeElements>
+  <a:objectDefaults>
+    <a:lnDef>
+      <a:spPr/>
+      <a:bodyPr/>
+      <a:lstStyle/>
+      <a:style>
+        <a:lnRef idx="2">
+          <a:schemeClr val="accent1"/>
+        </a:lnRef>
+        <a:fillRef idx="0">
+          <a:schemeClr val="accent1"/>
+        </a:fillRef>
+        <a:effectRef idx="1">
+          <a:schemeClr val="accent1"/>
+        </a:effectRef>
+        <a:fontRef idx="minor">
+          <a:schemeClr val="tx1"/>
+        </a:fontRef>
+      </a:style>
+    </a:lnDef>
+  </a:objectDefaults>
+  <a:extraClrSchemeLst/>
+  <a:extLst>
+    <a:ext uri="{05A4C25C-085E-4340-85A3-A5531E510DB2}">
+      <thm15:themeFamily xmlns:thm15="http://schemas.microsoft.com/office/thememl/2012/main" name="Office Theme" id="{2E142A2C-CD16-42D6-873A-C26D2A0506FA}" vid="{1BDDFF52-6CD6-40A5-AB3C-68EB2F1E4D0A}"/>
+    </a:ext>
+  </a:extLst>
+</a:theme>
+</file>
+
+<file path=ppt/theme/themeOverride1.xml><?xml version="1.0" encoding="utf-8"?>
+<a:themeOverride xmlns:a="http://schemas.openxmlformats.org/drawingml/2006/main">
+  <a:clrScheme name="Office 2007 - 2010">
+    <a:dk1>
+      <a:sysClr val="windowText" lastClr="000000"/>
+    </a:dk1>
+    <a:lt1>
+      <a:sysClr val="window" lastClr="FFFFFF"/>
+    </a:lt1>
+    <a:dk2>
+      <a:srgbClr val="1F497D"/>
+    </a:dk2>
+    <a:lt2>
+      <a:srgbClr val="EEECE1"/>
+    </a:lt2>
+    <a:accent1>
+      <a:srgbClr val="4F81BD"/>
+    </a:accent1>
+    <a:accent2>
+      <a:srgbClr val="C0504D"/>
+    </a:accent2>
+    <a:accent3>
+      <a:srgbClr val="9BBB59"/>
+    </a:accent3>
+    <a:accent4>
+      <a:srgbClr val="8064A2"/>
+    </a:accent4>
+    <a:accent5>
+      <a:srgbClr val="4BACC6"/>
+    </a:accent5>
+    <a:accent6>
+      <a:srgbClr val="F79646"/>
+    </a:accent6>
+    <a:hlink>
+      <a:srgbClr val="0000FF"/>
+    </a:hlink>
+    <a:folHlink>
+      <a:srgbClr val="800080"/>
+    </a:folHlink>
+  </a:clrScheme>
+</a:themeOverride>
 </file>
</xml_diff>